<commit_message>
Added some example regex, metacharacter table, state machine figure
</commit_message>
<xml_diff>
--- a/2017/computing_workgroup/regex/regular_expressions.pptx
+++ b/2017/computing_workgroup/regex/regular_expressions.pptx
@@ -5,7 +5,7 @@
     <p:sldMasterId id="2147483648" r:id="rId1"/>
   </p:sldMasterIdLst>
   <p:notesMasterIdLst>
-    <p:notesMasterId r:id="rId18"/>
+    <p:notesMasterId r:id="rId22"/>
   </p:notesMasterIdLst>
   <p:sldIdLst>
     <p:sldId id="256" r:id="rId2"/>
@@ -13,17 +13,21 @@
     <p:sldId id="370" r:id="rId4"/>
     <p:sldId id="343" r:id="rId5"/>
     <p:sldId id="371" r:id="rId6"/>
-    <p:sldId id="374" r:id="rId7"/>
-    <p:sldId id="378" r:id="rId8"/>
-    <p:sldId id="377" r:id="rId9"/>
-    <p:sldId id="376" r:id="rId10"/>
-    <p:sldId id="375" r:id="rId11"/>
-    <p:sldId id="373" r:id="rId12"/>
-    <p:sldId id="368" r:id="rId13"/>
-    <p:sldId id="341" r:id="rId14"/>
-    <p:sldId id="339" r:id="rId15"/>
-    <p:sldId id="366" r:id="rId16"/>
-    <p:sldId id="340" r:id="rId17"/>
+    <p:sldId id="379" r:id="rId7"/>
+    <p:sldId id="380" r:id="rId8"/>
+    <p:sldId id="381" r:id="rId9"/>
+    <p:sldId id="374" r:id="rId10"/>
+    <p:sldId id="382" r:id="rId11"/>
+    <p:sldId id="383" r:id="rId12"/>
+    <p:sldId id="377" r:id="rId13"/>
+    <p:sldId id="376" r:id="rId14"/>
+    <p:sldId id="375" r:id="rId15"/>
+    <p:sldId id="373" r:id="rId16"/>
+    <p:sldId id="368" r:id="rId17"/>
+    <p:sldId id="341" r:id="rId18"/>
+    <p:sldId id="339" r:id="rId19"/>
+    <p:sldId id="366" r:id="rId20"/>
+    <p:sldId id="340" r:id="rId21"/>
   </p:sldIdLst>
   <p:sldSz cx="9144000" cy="6858000" type="screen4x3"/>
   <p:notesSz cx="6858000" cy="9144000"/>
@@ -223,7 +227,7 @@
           <a:p>
             <a:fld id="{6096A192-89F2-44C6-B07F-1B83CE44D511}" type="datetimeFigureOut">
               <a:rPr lang="en-US" smtClean="0"/>
-              <a:t>1/20/2017</a:t>
+              <a:t>1/22/2017</a:t>
             </a:fld>
             <a:endParaRPr lang="en-US"/>
           </a:p>
@@ -784,7 +788,7 @@
           <a:p>
             <a:fld id="{7181039F-CB0C-E14D-A7EF-3BACE2CEF4EA}" type="datetimeFigureOut">
               <a:rPr lang="en-US" smtClean="0"/>
-              <a:t>1/20/2017</a:t>
+              <a:t>1/22/2017</a:t>
             </a:fld>
             <a:endParaRPr lang="en-US"/>
           </a:p>
@@ -1044,7 +1048,7 @@
           <a:p>
             <a:fld id="{7181039F-CB0C-E14D-A7EF-3BACE2CEF4EA}" type="datetimeFigureOut">
               <a:rPr lang="en-US" smtClean="0"/>
-              <a:t>1/20/2017</a:t>
+              <a:t>1/22/2017</a:t>
             </a:fld>
             <a:endParaRPr lang="en-US"/>
           </a:p>
@@ -1309,7 +1313,7 @@
           <a:p>
             <a:fld id="{7181039F-CB0C-E14D-A7EF-3BACE2CEF4EA}" type="datetimeFigureOut">
               <a:rPr lang="en-US" smtClean="0"/>
-              <a:t>1/20/2017</a:t>
+              <a:t>1/22/2017</a:t>
             </a:fld>
             <a:endParaRPr lang="en-US"/>
           </a:p>
@@ -1472,7 +1476,7 @@
           <a:p>
             <a:fld id="{7181039F-CB0C-E14D-A7EF-3BACE2CEF4EA}" type="datetimeFigureOut">
               <a:rPr lang="en-US" smtClean="0"/>
-              <a:t>1/20/2017</a:t>
+              <a:t>1/22/2017</a:t>
             </a:fld>
             <a:endParaRPr lang="en-US"/>
           </a:p>
@@ -1749,7 +1753,7 @@
           <a:p>
             <a:fld id="{7181039F-CB0C-E14D-A7EF-3BACE2CEF4EA}" type="datetimeFigureOut">
               <a:rPr lang="en-US" smtClean="0"/>
-              <a:t>1/20/2017</a:t>
+              <a:t>1/22/2017</a:t>
             </a:fld>
             <a:endParaRPr lang="en-US"/>
           </a:p>
@@ -2008,7 +2012,7 @@
           <a:p>
             <a:fld id="{7181039F-CB0C-E14D-A7EF-3BACE2CEF4EA}" type="datetimeFigureOut">
               <a:rPr lang="en-US" smtClean="0"/>
-              <a:t>1/20/2017</a:t>
+              <a:t>1/22/2017</a:t>
             </a:fld>
             <a:endParaRPr lang="en-US"/>
           </a:p>
@@ -2221,7 +2225,7 @@
           <a:p>
             <a:fld id="{7181039F-CB0C-E14D-A7EF-3BACE2CEF4EA}" type="datetimeFigureOut">
               <a:rPr lang="en-US" smtClean="0"/>
-              <a:t>1/20/2017</a:t>
+              <a:t>1/22/2017</a:t>
             </a:fld>
             <a:endParaRPr lang="en-US"/>
           </a:p>
@@ -3141,63 +3145,108 @@
         </p:nvSpPr>
         <p:spPr/>
         <p:txBody>
+          <a:bodyPr/>
+          <a:lstStyle/>
+          <a:p>
+            <a:r>
+              <a:rPr lang="en-US" dirty="0" smtClean="0"/>
+              <a:t>What are regular expressions (regex)?</a:t>
+            </a:r>
+            <a:endParaRPr lang="en-US" dirty="0"/>
+          </a:p>
+        </p:txBody>
+      </p:sp>
+      <p:sp>
+        <p:nvSpPr>
+          <p:cNvPr id="3" name="Content Placeholder 2"/>
+          <p:cNvSpPr>
+            <a:spLocks noGrp="1"/>
+          </p:cNvSpPr>
+          <p:nvPr>
+            <p:ph idx="1"/>
+          </p:nvPr>
+        </p:nvSpPr>
+        <p:spPr>
+          <a:xfrm>
+            <a:off x="460436" y="2053202"/>
+            <a:ext cx="8229600" cy="1490410"/>
+          </a:xfrm>
+        </p:spPr>
+        <p:txBody>
           <a:bodyPr>
-            <a:normAutofit fontScale="90000"/>
+            <a:normAutofit lnSpcReduction="10000"/>
           </a:bodyPr>
           <a:lstStyle/>
           <a:p>
             <a:r>
               <a:rPr lang="en-US" dirty="0" smtClean="0"/>
-              <a:t>What are regular expressions </a:t>
-            </a:r>
-            <a:r>
-              <a:rPr lang="en-US" i="1" dirty="0" smtClean="0"/>
-              <a:t>not </a:t>
-            </a:r>
-            <a:r>
-              <a:rPr lang="en-US" dirty="0" smtClean="0"/>
-              <a:t>useful for?</a:t>
-            </a:r>
-            <a:endParaRPr lang="en-US" dirty="0"/>
-          </a:p>
-        </p:txBody>
-      </p:sp>
-      <p:sp>
-        <p:nvSpPr>
-          <p:cNvPr id="3" name="Content Placeholder 2"/>
-          <p:cNvSpPr>
-            <a:spLocks noGrp="1"/>
-          </p:cNvSpPr>
-          <p:nvPr>
-            <p:ph idx="1"/>
-          </p:nvPr>
-        </p:nvSpPr>
-        <p:spPr/>
-        <p:txBody>
-          <a:bodyPr>
-            <a:normAutofit/>
-          </a:bodyPr>
-          <a:lstStyle/>
-          <a:p>
-            <a:r>
-              <a:rPr lang="en-US" dirty="0" smtClean="0"/>
-              <a:t>Prime number sieve</a:t>
-            </a:r>
-          </a:p>
-          <a:p>
-            <a:pPr lvl="1"/>
-            <a:r>
-              <a:rPr lang="en-US" dirty="0" smtClean="0"/>
-              <a:t>The right tool for the right job!</a:t>
+              <a:t>Consider the state machine describing the regular expression /(</a:t>
+            </a:r>
+            <a:r>
+              <a:rPr lang="en-US" dirty="0" err="1" smtClean="0"/>
+              <a:t>a|b</a:t>
+            </a:r>
+            <a:r>
+              <a:rPr lang="en-US" dirty="0" smtClean="0"/>
+              <a:t>)*</a:t>
+            </a:r>
+            <a:r>
+              <a:rPr lang="en-US" dirty="0" err="1" smtClean="0"/>
+              <a:t>abb</a:t>
+            </a:r>
+            <a:r>
+              <a:rPr lang="en-US" dirty="0" smtClean="0"/>
+              <a:t>/. At any step, we can take an arrow if we match its target</a:t>
             </a:r>
             <a:endParaRPr lang="en-US" dirty="0" smtClean="0"/>
           </a:p>
         </p:txBody>
       </p:sp>
+      <p:pic>
+        <p:nvPicPr>
+          <p:cNvPr id="1026" name="Picture 2" descr="https://www.gamedev.net/uploads/monthly_06_2013/ccs-209764-0-73208900-1370053817.jpg"/>
+          <p:cNvPicPr>
+            <a:picLocks noChangeAspect="1" noChangeArrowheads="1"/>
+          </p:cNvPicPr>
+          <p:nvPr/>
+        </p:nvPicPr>
+        <p:blipFill>
+          <a:blip r:embed="rId2">
+            <a:extLst>
+              <a:ext uri="{28A0092B-C50C-407E-A947-70E740481C1C}">
+                <a14:useLocalDpi xmlns:a14="http://schemas.microsoft.com/office/drawing/2010/main" val="0"/>
+              </a:ext>
+            </a:extLst>
+          </a:blip>
+          <a:srcRect/>
+          <a:stretch>
+            <a:fillRect/>
+          </a:stretch>
+        </p:blipFill>
+        <p:spPr bwMode="auto">
+          <a:xfrm>
+            <a:off x="453964" y="3743881"/>
+            <a:ext cx="8232836" cy="2586483"/>
+          </a:xfrm>
+          <a:prstGeom prst="rect">
+            <a:avLst/>
+          </a:prstGeom>
+          <a:noFill/>
+          <a:extLst>
+            <a:ext uri="{909E8E84-426E-40DD-AFC4-6F175D3DCCD1}">
+              <a14:hiddenFill xmlns:a14="http://schemas.microsoft.com/office/drawing/2010/main">
+                <a:solidFill>
+                  <a:srgbClr val="FFFFFF"/>
+                </a:solidFill>
+              </a14:hiddenFill>
+            </a:ext>
+          </a:extLst>
+        </p:spPr>
+      </p:pic>
     </p:spTree>
     <p:extLst>
       <p:ext uri="{BB962C8B-B14F-4D97-AF65-F5344CB8AC3E}">
-        <p14:creationId xmlns:p14="http://schemas.microsoft.com/office/powerpoint/2010/main" val="1627161319"/>
+        <p14:creationId xmlns:p14="http://schemas.microsoft.com/office/powerpoint/2010/main" val="500270609"/>
       </p:ext>
     </p:extLst>
   </p:cSld>
@@ -3248,7 +3297,7 @@
           <a:p>
             <a:r>
               <a:rPr lang="en-US" dirty="0" smtClean="0"/>
-              <a:t>Regular expression examples</a:t>
+              <a:t>What are regular expressions (regex)?</a:t>
             </a:r>
             <a:endParaRPr lang="en-US" dirty="0"/>
           </a:p>
@@ -3264,57 +3313,95 @@
             <p:ph idx="1"/>
           </p:nvPr>
         </p:nvSpPr>
-        <p:spPr/>
+        <p:spPr>
+          <a:xfrm>
+            <a:off x="460436" y="2053202"/>
+            <a:ext cx="8229600" cy="1490410"/>
+          </a:xfrm>
+        </p:spPr>
         <p:txBody>
           <a:bodyPr>
-            <a:normAutofit/>
+            <a:normAutofit lnSpcReduction="10000"/>
           </a:bodyPr>
           <a:lstStyle/>
           <a:p>
             <a:r>
               <a:rPr lang="en-US" dirty="0" smtClean="0"/>
-              <a:t>grep</a:t>
-            </a:r>
-          </a:p>
-          <a:p>
-            <a:r>
-              <a:rPr lang="en-US" dirty="0" err="1" smtClean="0"/>
-              <a:t>sed</a:t>
-            </a:r>
-            <a:endParaRPr lang="en-US" dirty="0" smtClean="0"/>
-          </a:p>
-          <a:p>
-            <a:r>
-              <a:rPr lang="en-US" dirty="0" err="1" smtClean="0"/>
-              <a:t>awk</a:t>
-            </a:r>
-            <a:endParaRPr lang="en-US" dirty="0" smtClean="0"/>
-          </a:p>
-          <a:p>
-            <a:pPr lvl="1"/>
-            <a:r>
-              <a:rPr lang="en-US" dirty="0" smtClean="0"/>
-              <a:t>Peter</a:t>
-            </a:r>
-          </a:p>
-          <a:p>
-            <a:r>
-              <a:rPr lang="en-US" dirty="0" smtClean="0"/>
-              <a:t>Python `re` module</a:t>
-            </a:r>
-          </a:p>
-          <a:p>
-            <a:endParaRPr lang="en-US" dirty="0" smtClean="0"/>
-          </a:p>
-          <a:p>
-            <a:endParaRPr lang="en-US" dirty="0" smtClean="0"/>
-          </a:p>
-        </p:txBody>
-      </p:sp>
+              <a:t>This regex matches </a:t>
+            </a:r>
+            <a:r>
+              <a:rPr lang="en-US" i="1" dirty="0" err="1" smtClean="0"/>
+              <a:t>aaabb</a:t>
+            </a:r>
+            <a:r>
+              <a:rPr lang="en-US" dirty="0" smtClean="0"/>
+              <a:t> and </a:t>
+            </a:r>
+            <a:r>
+              <a:rPr lang="en-US" i="1" dirty="0" err="1" smtClean="0"/>
+              <a:t>abaabb</a:t>
+            </a:r>
+            <a:r>
+              <a:rPr lang="en-US" dirty="0" smtClean="0"/>
+              <a:t>, but not </a:t>
+            </a:r>
+            <a:r>
+              <a:rPr lang="en-US" i="1" dirty="0" err="1" smtClean="0"/>
+              <a:t>baab</a:t>
+            </a:r>
+            <a:r>
+              <a:rPr lang="en-US" dirty="0" smtClean="0"/>
+              <a:t>, because we get ‘stuck’ in state 2.</a:t>
+            </a:r>
+            <a:endParaRPr lang="en-US" i="1" dirty="0" smtClean="0"/>
+          </a:p>
+        </p:txBody>
+      </p:sp>
+      <p:pic>
+        <p:nvPicPr>
+          <p:cNvPr id="1026" name="Picture 2" descr="https://www.gamedev.net/uploads/monthly_06_2013/ccs-209764-0-73208900-1370053817.jpg"/>
+          <p:cNvPicPr>
+            <a:picLocks noChangeAspect="1" noChangeArrowheads="1"/>
+          </p:cNvPicPr>
+          <p:nvPr/>
+        </p:nvPicPr>
+        <p:blipFill>
+          <a:blip r:embed="rId2">
+            <a:extLst>
+              <a:ext uri="{28A0092B-C50C-407E-A947-70E740481C1C}">
+                <a14:useLocalDpi xmlns:a14="http://schemas.microsoft.com/office/drawing/2010/main" val="0"/>
+              </a:ext>
+            </a:extLst>
+          </a:blip>
+          <a:srcRect/>
+          <a:stretch>
+            <a:fillRect/>
+          </a:stretch>
+        </p:blipFill>
+        <p:spPr bwMode="auto">
+          <a:xfrm>
+            <a:off x="453964" y="3743881"/>
+            <a:ext cx="8232836" cy="2586483"/>
+          </a:xfrm>
+          <a:prstGeom prst="rect">
+            <a:avLst/>
+          </a:prstGeom>
+          <a:noFill/>
+          <a:extLst>
+            <a:ext uri="{909E8E84-426E-40DD-AFC4-6F175D3DCCD1}">
+              <a14:hiddenFill xmlns:a14="http://schemas.microsoft.com/office/drawing/2010/main">
+                <a:solidFill>
+                  <a:srgbClr val="FFFFFF"/>
+                </a:solidFill>
+              </a14:hiddenFill>
+            </a:ext>
+          </a:extLst>
+        </p:spPr>
+      </p:pic>
     </p:spTree>
     <p:extLst>
       <p:ext uri="{BB962C8B-B14F-4D97-AF65-F5344CB8AC3E}">
-        <p14:creationId xmlns:p14="http://schemas.microsoft.com/office/powerpoint/2010/main" val="966442407"/>
+        <p14:creationId xmlns:p14="http://schemas.microsoft.com/office/powerpoint/2010/main" val="1435432782"/>
       </p:ext>
     </p:extLst>
   </p:cSld>
@@ -3365,15 +3452,7 @@
           <a:p>
             <a:r>
               <a:rPr lang="en-US" dirty="0" smtClean="0"/>
-              <a:t>Things I </a:t>
-            </a:r>
-            <a:r>
-              <a:rPr lang="en-US" i="1" dirty="0" smtClean="0"/>
-              <a:t>didn’t</a:t>
-            </a:r>
-            <a:r>
-              <a:rPr lang="en-US" dirty="0" smtClean="0"/>
-              <a:t> mention…</a:t>
+              <a:t>What are regular expressions (regex)?</a:t>
             </a:r>
             <a:endParaRPr lang="en-US" dirty="0"/>
           </a:p>
@@ -3391,20 +3470,55 @@
         </p:nvSpPr>
         <p:spPr/>
         <p:txBody>
-          <a:bodyPr/>
+          <a:bodyPr>
+            <a:normAutofit/>
+          </a:bodyPr>
           <a:lstStyle/>
           <a:p>
-            <a:pPr marL="0" indent="0">
-              <a:buNone/>
-            </a:pPr>
+            <a:r>
+              <a:rPr lang="en-US" dirty="0" smtClean="0"/>
+              <a:t>A couple different flavors with differences</a:t>
+            </a:r>
+          </a:p>
+          <a:p>
+            <a:pPr lvl="1"/>
+            <a:r>
+              <a:rPr lang="en-US" dirty="0" smtClean="0"/>
+              <a:t>i.e. POSIX has [:alpha:] and [:blank:], vim uses \a and \s</a:t>
+            </a:r>
+          </a:p>
+          <a:p>
+            <a:r>
+              <a:rPr lang="en-US" dirty="0" smtClean="0"/>
+              <a:t>Extensions give much more powerful tools like </a:t>
+            </a:r>
+            <a:r>
+              <a:rPr lang="en-US" dirty="0" err="1" smtClean="0"/>
+              <a:t>backreference</a:t>
+            </a:r>
+            <a:r>
+              <a:rPr lang="en-US" dirty="0" smtClean="0"/>
+              <a:t>, but </a:t>
+            </a:r>
+            <a:r>
+              <a:rPr lang="en-US" u="sng" dirty="0" smtClean="0"/>
+              <a:t>these generally discard the regularity of the grammar</a:t>
+            </a:r>
             <a:endParaRPr lang="en-US" dirty="0" smtClean="0"/>
+          </a:p>
+          <a:p>
+            <a:pPr lvl="1"/>
+            <a:r>
+              <a:rPr lang="en-US" dirty="0" smtClean="0"/>
+              <a:t>As a result, relying heavily on these can result in a much slower expression evaluation</a:t>
+            </a:r>
           </a:p>
         </p:txBody>
       </p:sp>
     </p:spTree>
     <p:extLst>
       <p:ext uri="{BB962C8B-B14F-4D97-AF65-F5344CB8AC3E}">
-        <p14:creationId xmlns:p14="http://schemas.microsoft.com/office/powerpoint/2010/main" val="3192961759"/>
+        <p14:creationId xmlns:p14="http://schemas.microsoft.com/office/powerpoint/2010/main" val="1032991498"/>
       </p:ext>
     </p:extLst>
   </p:cSld>
@@ -3455,7 +3569,7 @@
           <a:p>
             <a:r>
               <a:rPr lang="en-US" dirty="0" smtClean="0"/>
-              <a:t>Useful resources</a:t>
+              <a:t>What are regular expressions useful for?</a:t>
             </a:r>
             <a:endParaRPr lang="en-US" dirty="0"/>
           </a:p>
@@ -3479,20 +3593,45 @@
           <a:lstStyle/>
           <a:p>
             <a:r>
-              <a:rPr lang="en-US" dirty="0">
-                <a:hlinkClick r:id="rId2"/>
-              </a:rPr>
-              <a:t>http://www.regular-expressions.info</a:t>
-            </a:r>
-            <a:r>
-              <a:rPr lang="en-US" dirty="0" smtClean="0">
-                <a:hlinkClick r:id="rId2"/>
-              </a:rPr>
-              <a:t>/</a:t>
-            </a:r>
-            <a:endParaRPr lang="en-US" dirty="0" smtClean="0"/>
-          </a:p>
-          <a:p>
+              <a:rPr lang="en-US" dirty="0" smtClean="0"/>
+              <a:t>Searching for a vague target</a:t>
+            </a:r>
+          </a:p>
+          <a:p>
+            <a:pPr lvl="1"/>
+            <a:r>
+              <a:rPr lang="en-US" dirty="0" smtClean="0"/>
+              <a:t>If you know the </a:t>
+            </a:r>
+            <a:r>
+              <a:rPr lang="en-US" i="1" dirty="0" smtClean="0"/>
+              <a:t>structure</a:t>
+            </a:r>
+            <a:r>
+              <a:rPr lang="en-US" dirty="0" smtClean="0"/>
+              <a:t> of a string, you can encode this information into your search</a:t>
+            </a:r>
+          </a:p>
+          <a:p>
+            <a:r>
+              <a:rPr lang="en-US" dirty="0" smtClean="0"/>
+              <a:t>Search-and-replace</a:t>
+            </a:r>
+          </a:p>
+          <a:p>
+            <a:pPr lvl="1"/>
+            <a:r>
+              <a:rPr lang="en-US" dirty="0" err="1" smtClean="0"/>
+              <a:t>Sed</a:t>
+            </a:r>
+            <a:r>
+              <a:rPr lang="en-US" dirty="0" smtClean="0"/>
+              <a:t>, vim, </a:t>
+            </a:r>
+            <a:r>
+              <a:rPr lang="en-US" dirty="0" err="1" smtClean="0"/>
+              <a:t>awk</a:t>
+            </a:r>
             <a:endParaRPr lang="en-US" dirty="0" smtClean="0"/>
           </a:p>
         </p:txBody>
@@ -3500,7 +3639,7 @@
     </p:spTree>
     <p:extLst>
       <p:ext uri="{BB962C8B-B14F-4D97-AF65-F5344CB8AC3E}">
-        <p14:creationId xmlns:p14="http://schemas.microsoft.com/office/powerpoint/2010/main" val="3584811499"/>
+        <p14:creationId xmlns:p14="http://schemas.microsoft.com/office/powerpoint/2010/main" val="2627175943"/>
       </p:ext>
     </p:extLst>
   </p:cSld>
@@ -3544,28 +3683,64 @@
             <p:ph type="title"/>
           </p:nvPr>
         </p:nvSpPr>
-        <p:spPr>
-          <a:xfrm>
-            <a:off x="457200" y="2874722"/>
-            <a:ext cx="8229600" cy="803756"/>
-          </a:xfrm>
-        </p:spPr>
-        <p:txBody>
-          <a:bodyPr/>
+        <p:spPr/>
+        <p:txBody>
+          <a:bodyPr>
+            <a:normAutofit fontScale="90000"/>
+          </a:bodyPr>
           <a:lstStyle/>
           <a:p>
             <a:r>
               <a:rPr lang="en-US" dirty="0" smtClean="0"/>
-              <a:t>Thank you!</a:t>
+              <a:t>What are regular expressions </a:t>
+            </a:r>
+            <a:r>
+              <a:rPr lang="en-US" i="1" dirty="0" smtClean="0"/>
+              <a:t>not </a:t>
+            </a:r>
+            <a:r>
+              <a:rPr lang="en-US" dirty="0" smtClean="0"/>
+              <a:t>useful for?</a:t>
             </a:r>
             <a:endParaRPr lang="en-US" dirty="0"/>
+          </a:p>
+        </p:txBody>
+      </p:sp>
+      <p:sp>
+        <p:nvSpPr>
+          <p:cNvPr id="3" name="Content Placeholder 2"/>
+          <p:cNvSpPr>
+            <a:spLocks noGrp="1"/>
+          </p:cNvSpPr>
+          <p:nvPr>
+            <p:ph idx="1"/>
+          </p:nvPr>
+        </p:nvSpPr>
+        <p:spPr/>
+        <p:txBody>
+          <a:bodyPr>
+            <a:normAutofit/>
+          </a:bodyPr>
+          <a:lstStyle/>
+          <a:p>
+            <a:r>
+              <a:rPr lang="en-US" dirty="0" smtClean="0"/>
+              <a:t>Prime number sieve</a:t>
+            </a:r>
+          </a:p>
+          <a:p>
+            <a:pPr lvl="1"/>
+            <a:r>
+              <a:rPr lang="en-US" dirty="0" smtClean="0"/>
+              <a:t>The right tool for the right job!</a:t>
+            </a:r>
           </a:p>
         </p:txBody>
       </p:sp>
     </p:spTree>
     <p:extLst>
       <p:ext uri="{BB962C8B-B14F-4D97-AF65-F5344CB8AC3E}">
-        <p14:creationId xmlns:p14="http://schemas.microsoft.com/office/powerpoint/2010/main" val="1844849267"/>
+        <p14:creationId xmlns:p14="http://schemas.microsoft.com/office/powerpoint/2010/main" val="1627161319"/>
       </p:ext>
     </p:extLst>
   </p:cSld>
@@ -3609,28 +3784,80 @@
             <p:ph type="title"/>
           </p:nvPr>
         </p:nvSpPr>
-        <p:spPr>
-          <a:xfrm>
-            <a:off x="457200" y="2874722"/>
-            <a:ext cx="8229600" cy="803756"/>
-          </a:xfrm>
-        </p:spPr>
+        <p:spPr/>
         <p:txBody>
           <a:bodyPr/>
           <a:lstStyle/>
           <a:p>
             <a:r>
               <a:rPr lang="en-US" dirty="0" smtClean="0"/>
-              <a:t>Feedback?</a:t>
+              <a:t>Regular expression examples</a:t>
             </a:r>
             <a:endParaRPr lang="en-US" dirty="0"/>
+          </a:p>
+        </p:txBody>
+      </p:sp>
+      <p:sp>
+        <p:nvSpPr>
+          <p:cNvPr id="3" name="Content Placeholder 2"/>
+          <p:cNvSpPr>
+            <a:spLocks noGrp="1"/>
+          </p:cNvSpPr>
+          <p:nvPr>
+            <p:ph idx="1"/>
+          </p:nvPr>
+        </p:nvSpPr>
+        <p:spPr/>
+        <p:txBody>
+          <a:bodyPr>
+            <a:normAutofit/>
+          </a:bodyPr>
+          <a:lstStyle/>
+          <a:p>
+            <a:r>
+              <a:rPr lang="en-US" dirty="0" smtClean="0"/>
+              <a:t>grep</a:t>
+            </a:r>
+          </a:p>
+          <a:p>
+            <a:r>
+              <a:rPr lang="en-US" dirty="0" err="1" smtClean="0"/>
+              <a:t>sed</a:t>
+            </a:r>
+            <a:endParaRPr lang="en-US" dirty="0" smtClean="0"/>
+          </a:p>
+          <a:p>
+            <a:r>
+              <a:rPr lang="en-US" dirty="0" err="1" smtClean="0"/>
+              <a:t>awk</a:t>
+            </a:r>
+            <a:endParaRPr lang="en-US" dirty="0" smtClean="0"/>
+          </a:p>
+          <a:p>
+            <a:pPr lvl="1"/>
+            <a:r>
+              <a:rPr lang="en-US" dirty="0" smtClean="0"/>
+              <a:t>Peter</a:t>
+            </a:r>
+          </a:p>
+          <a:p>
+            <a:r>
+              <a:rPr lang="en-US" dirty="0" smtClean="0"/>
+              <a:t>Python `re` module</a:t>
+            </a:r>
+          </a:p>
+          <a:p>
+            <a:endParaRPr lang="en-US" dirty="0" smtClean="0"/>
+          </a:p>
+          <a:p>
+            <a:endParaRPr lang="en-US" dirty="0" smtClean="0"/>
           </a:p>
         </p:txBody>
       </p:sp>
     </p:spTree>
     <p:extLst>
       <p:ext uri="{BB962C8B-B14F-4D97-AF65-F5344CB8AC3E}">
-        <p14:creationId xmlns:p14="http://schemas.microsoft.com/office/powerpoint/2010/main" val="891265136"/>
+        <p14:creationId xmlns:p14="http://schemas.microsoft.com/office/powerpoint/2010/main" val="966442407"/>
       </p:ext>
     </p:extLst>
   </p:cSld>
@@ -3681,7 +3908,15 @@
           <a:p>
             <a:r>
               <a:rPr lang="en-US" dirty="0" smtClean="0"/>
-              <a:t>Backup Slides</a:t>
+              <a:t>Things I </a:t>
+            </a:r>
+            <a:r>
+              <a:rPr lang="en-US" i="1" dirty="0" smtClean="0"/>
+              <a:t>didn’t</a:t>
+            </a:r>
+            <a:r>
+              <a:rPr lang="en-US" dirty="0" smtClean="0"/>
+              <a:t> mention…</a:t>
             </a:r>
             <a:endParaRPr lang="en-US" dirty="0"/>
           </a:p>
@@ -3705,14 +3940,240 @@
             <a:pPr marL="0" indent="0">
               <a:buNone/>
             </a:pPr>
-            <a:endParaRPr lang="en-US" dirty="0"/>
+            <a:endParaRPr lang="en-US" dirty="0" smtClean="0"/>
           </a:p>
         </p:txBody>
       </p:sp>
     </p:spTree>
     <p:extLst>
       <p:ext uri="{BB962C8B-B14F-4D97-AF65-F5344CB8AC3E}">
-        <p14:creationId xmlns:p14="http://schemas.microsoft.com/office/powerpoint/2010/main" val="1589961851"/>
+        <p14:creationId xmlns:p14="http://schemas.microsoft.com/office/powerpoint/2010/main" val="3192961759"/>
+      </p:ext>
+    </p:extLst>
+  </p:cSld>
+  <p:clrMapOvr>
+    <a:masterClrMapping/>
+  </p:clrMapOvr>
+  <p:timing>
+    <p:tnLst>
+      <p:par>
+        <p:cTn id="1" dur="indefinite" restart="never" nodeType="tmRoot"/>
+      </p:par>
+    </p:tnLst>
+  </p:timing>
+</p:sld>
+</file>
+
+<file path=ppt/slides/slide17.xml><?xml version="1.0" encoding="utf-8"?>
+<p:sld xmlns:a="http://schemas.openxmlformats.org/drawingml/2006/main" xmlns:r="http://schemas.openxmlformats.org/officeDocument/2006/relationships" xmlns:p="http://schemas.openxmlformats.org/presentationml/2006/main">
+  <p:cSld>
+    <p:spTree>
+      <p:nvGrpSpPr>
+        <p:cNvPr id="1" name=""/>
+        <p:cNvGrpSpPr/>
+        <p:nvPr/>
+      </p:nvGrpSpPr>
+      <p:grpSpPr>
+        <a:xfrm>
+          <a:off x="0" y="0"/>
+          <a:ext cx="0" cy="0"/>
+          <a:chOff x="0" y="0"/>
+          <a:chExt cx="0" cy="0"/>
+        </a:xfrm>
+      </p:grpSpPr>
+      <p:sp>
+        <p:nvSpPr>
+          <p:cNvPr id="2" name="Title 1"/>
+          <p:cNvSpPr>
+            <a:spLocks noGrp="1"/>
+          </p:cNvSpPr>
+          <p:nvPr>
+            <p:ph type="title"/>
+          </p:nvPr>
+        </p:nvSpPr>
+        <p:spPr/>
+        <p:txBody>
+          <a:bodyPr/>
+          <a:lstStyle/>
+          <a:p>
+            <a:r>
+              <a:rPr lang="en-US" dirty="0" smtClean="0"/>
+              <a:t>Useful resources</a:t>
+            </a:r>
+            <a:endParaRPr lang="en-US" dirty="0"/>
+          </a:p>
+        </p:txBody>
+      </p:sp>
+      <p:sp>
+        <p:nvSpPr>
+          <p:cNvPr id="3" name="Content Placeholder 2"/>
+          <p:cNvSpPr>
+            <a:spLocks noGrp="1"/>
+          </p:cNvSpPr>
+          <p:nvPr>
+            <p:ph idx="1"/>
+          </p:nvPr>
+        </p:nvSpPr>
+        <p:spPr/>
+        <p:txBody>
+          <a:bodyPr>
+            <a:normAutofit/>
+          </a:bodyPr>
+          <a:lstStyle/>
+          <a:p>
+            <a:r>
+              <a:rPr lang="en-US" dirty="0">
+                <a:hlinkClick r:id="rId2"/>
+              </a:rPr>
+              <a:t>http://www.regular-expressions.info</a:t>
+            </a:r>
+            <a:r>
+              <a:rPr lang="en-US" dirty="0" smtClean="0">
+                <a:hlinkClick r:id="rId2"/>
+              </a:rPr>
+              <a:t>/</a:t>
+            </a:r>
+            <a:endParaRPr lang="en-US" dirty="0" smtClean="0"/>
+          </a:p>
+          <a:p>
+            <a:endParaRPr lang="en-US" dirty="0" smtClean="0"/>
+          </a:p>
+        </p:txBody>
+      </p:sp>
+    </p:spTree>
+    <p:extLst>
+      <p:ext uri="{BB962C8B-B14F-4D97-AF65-F5344CB8AC3E}">
+        <p14:creationId xmlns:p14="http://schemas.microsoft.com/office/powerpoint/2010/main" val="3584811499"/>
+      </p:ext>
+    </p:extLst>
+  </p:cSld>
+  <p:clrMapOvr>
+    <a:masterClrMapping/>
+  </p:clrMapOvr>
+  <p:timing>
+    <p:tnLst>
+      <p:par>
+        <p:cTn id="1" dur="indefinite" restart="never" nodeType="tmRoot"/>
+      </p:par>
+    </p:tnLst>
+  </p:timing>
+</p:sld>
+</file>
+
+<file path=ppt/slides/slide18.xml><?xml version="1.0" encoding="utf-8"?>
+<p:sld xmlns:a="http://schemas.openxmlformats.org/drawingml/2006/main" xmlns:r="http://schemas.openxmlformats.org/officeDocument/2006/relationships" xmlns:p="http://schemas.openxmlformats.org/presentationml/2006/main">
+  <p:cSld>
+    <p:spTree>
+      <p:nvGrpSpPr>
+        <p:cNvPr id="1" name=""/>
+        <p:cNvGrpSpPr/>
+        <p:nvPr/>
+      </p:nvGrpSpPr>
+      <p:grpSpPr>
+        <a:xfrm>
+          <a:off x="0" y="0"/>
+          <a:ext cx="0" cy="0"/>
+          <a:chOff x="0" y="0"/>
+          <a:chExt cx="0" cy="0"/>
+        </a:xfrm>
+      </p:grpSpPr>
+      <p:sp>
+        <p:nvSpPr>
+          <p:cNvPr id="2" name="Title 1"/>
+          <p:cNvSpPr>
+            <a:spLocks noGrp="1"/>
+          </p:cNvSpPr>
+          <p:nvPr>
+            <p:ph type="title"/>
+          </p:nvPr>
+        </p:nvSpPr>
+        <p:spPr>
+          <a:xfrm>
+            <a:off x="457200" y="2874722"/>
+            <a:ext cx="8229600" cy="803756"/>
+          </a:xfrm>
+        </p:spPr>
+        <p:txBody>
+          <a:bodyPr/>
+          <a:lstStyle/>
+          <a:p>
+            <a:r>
+              <a:rPr lang="en-US" dirty="0" smtClean="0"/>
+              <a:t>Thank you!</a:t>
+            </a:r>
+            <a:endParaRPr lang="en-US" dirty="0"/>
+          </a:p>
+        </p:txBody>
+      </p:sp>
+    </p:spTree>
+    <p:extLst>
+      <p:ext uri="{BB962C8B-B14F-4D97-AF65-F5344CB8AC3E}">
+        <p14:creationId xmlns:p14="http://schemas.microsoft.com/office/powerpoint/2010/main" val="1844849267"/>
+      </p:ext>
+    </p:extLst>
+  </p:cSld>
+  <p:clrMapOvr>
+    <a:masterClrMapping/>
+  </p:clrMapOvr>
+  <p:timing>
+    <p:tnLst>
+      <p:par>
+        <p:cTn id="1" dur="indefinite" restart="never" nodeType="tmRoot"/>
+      </p:par>
+    </p:tnLst>
+  </p:timing>
+</p:sld>
+</file>
+
+<file path=ppt/slides/slide19.xml><?xml version="1.0" encoding="utf-8"?>
+<p:sld xmlns:a="http://schemas.openxmlformats.org/drawingml/2006/main" xmlns:r="http://schemas.openxmlformats.org/officeDocument/2006/relationships" xmlns:p="http://schemas.openxmlformats.org/presentationml/2006/main">
+  <p:cSld>
+    <p:spTree>
+      <p:nvGrpSpPr>
+        <p:cNvPr id="1" name=""/>
+        <p:cNvGrpSpPr/>
+        <p:nvPr/>
+      </p:nvGrpSpPr>
+      <p:grpSpPr>
+        <a:xfrm>
+          <a:off x="0" y="0"/>
+          <a:ext cx="0" cy="0"/>
+          <a:chOff x="0" y="0"/>
+          <a:chExt cx="0" cy="0"/>
+        </a:xfrm>
+      </p:grpSpPr>
+      <p:sp>
+        <p:nvSpPr>
+          <p:cNvPr id="2" name="Title 1"/>
+          <p:cNvSpPr>
+            <a:spLocks noGrp="1"/>
+          </p:cNvSpPr>
+          <p:nvPr>
+            <p:ph type="title"/>
+          </p:nvPr>
+        </p:nvSpPr>
+        <p:spPr>
+          <a:xfrm>
+            <a:off x="457200" y="2874722"/>
+            <a:ext cx="8229600" cy="803756"/>
+          </a:xfrm>
+        </p:spPr>
+        <p:txBody>
+          <a:bodyPr/>
+          <a:lstStyle/>
+          <a:p>
+            <a:r>
+              <a:rPr lang="en-US" dirty="0" smtClean="0"/>
+              <a:t>Feedback?</a:t>
+            </a:r>
+            <a:endParaRPr lang="en-US" dirty="0"/>
+          </a:p>
+        </p:txBody>
+      </p:sp>
+    </p:spTree>
+    <p:extLst>
+      <p:ext uri="{BB962C8B-B14F-4D97-AF65-F5344CB8AC3E}">
+        <p14:creationId xmlns:p14="http://schemas.microsoft.com/office/powerpoint/2010/main" val="891265136"/>
       </p:ext>
     </p:extLst>
   </p:cSld>
@@ -3840,10 +4301,142 @@
           </a:p>
         </p:txBody>
       </p:sp>
+      <p:sp>
+        <p:nvSpPr>
+          <p:cNvPr id="6" name="TextBox 5"/>
+          <p:cNvSpPr txBox="1"/>
+          <p:nvPr/>
+        </p:nvSpPr>
+        <p:spPr>
+          <a:xfrm>
+            <a:off x="2573867" y="6369351"/>
+            <a:ext cx="3996265" cy="276999"/>
+          </a:xfrm>
+          <a:prstGeom prst="rect">
+            <a:avLst/>
+          </a:prstGeom>
+          <a:noFill/>
+        </p:spPr>
+        <p:txBody>
+          <a:bodyPr wrap="square" rtlCol="0">
+            <a:spAutoFit/>
+          </a:bodyPr>
+          <a:lstStyle/>
+          <a:p>
+            <a:r>
+              <a:rPr lang="en-US" sz="1200" dirty="0" smtClean="0"/>
+              <a:t>Image from </a:t>
+            </a:r>
+            <a:r>
+              <a:rPr lang="en-US" sz="1200" dirty="0">
+                <a:hlinkClick r:id="rId3"/>
+              </a:rPr>
+              <a:t>https://xkcd.com/208</a:t>
+            </a:r>
+            <a:r>
+              <a:rPr lang="en-US" sz="1200" dirty="0" smtClean="0">
+                <a:hlinkClick r:id="rId3"/>
+              </a:rPr>
+              <a:t>/</a:t>
+            </a:r>
+            <a:r>
+              <a:rPr lang="en-US" sz="1200" dirty="0" smtClean="0"/>
+              <a:t> under </a:t>
+            </a:r>
+            <a:r>
+              <a:rPr lang="en-US" sz="1200" dirty="0" smtClean="0"/>
+              <a:t>CC BY-NC 2.5</a:t>
+            </a:r>
+            <a:endParaRPr lang="en-US" sz="1200" dirty="0"/>
+          </a:p>
+        </p:txBody>
+      </p:sp>
     </p:spTree>
     <p:extLst>
       <p:ext uri="{BB962C8B-B14F-4D97-AF65-F5344CB8AC3E}">
         <p14:creationId xmlns:p14="http://schemas.microsoft.com/office/powerpoint/2010/main" val="239801139"/>
+      </p:ext>
+    </p:extLst>
+  </p:cSld>
+  <p:clrMapOvr>
+    <a:masterClrMapping/>
+  </p:clrMapOvr>
+  <p:timing>
+    <p:tnLst>
+      <p:par>
+        <p:cTn id="1" dur="indefinite" restart="never" nodeType="tmRoot"/>
+      </p:par>
+    </p:tnLst>
+  </p:timing>
+</p:sld>
+</file>
+
+<file path=ppt/slides/slide20.xml><?xml version="1.0" encoding="utf-8"?>
+<p:sld xmlns:a="http://schemas.openxmlformats.org/drawingml/2006/main" xmlns:r="http://schemas.openxmlformats.org/officeDocument/2006/relationships" xmlns:p="http://schemas.openxmlformats.org/presentationml/2006/main">
+  <p:cSld>
+    <p:spTree>
+      <p:nvGrpSpPr>
+        <p:cNvPr id="1" name=""/>
+        <p:cNvGrpSpPr/>
+        <p:nvPr/>
+      </p:nvGrpSpPr>
+      <p:grpSpPr>
+        <a:xfrm>
+          <a:off x="0" y="0"/>
+          <a:ext cx="0" cy="0"/>
+          <a:chOff x="0" y="0"/>
+          <a:chExt cx="0" cy="0"/>
+        </a:xfrm>
+      </p:grpSpPr>
+      <p:sp>
+        <p:nvSpPr>
+          <p:cNvPr id="2" name="Title 1"/>
+          <p:cNvSpPr>
+            <a:spLocks noGrp="1"/>
+          </p:cNvSpPr>
+          <p:nvPr>
+            <p:ph type="title"/>
+          </p:nvPr>
+        </p:nvSpPr>
+        <p:spPr/>
+        <p:txBody>
+          <a:bodyPr/>
+          <a:lstStyle/>
+          <a:p>
+            <a:r>
+              <a:rPr lang="en-US" dirty="0" smtClean="0"/>
+              <a:t>Backup Slides</a:t>
+            </a:r>
+            <a:endParaRPr lang="en-US" dirty="0"/>
+          </a:p>
+        </p:txBody>
+      </p:sp>
+      <p:sp>
+        <p:nvSpPr>
+          <p:cNvPr id="3" name="Content Placeholder 2"/>
+          <p:cNvSpPr>
+            <a:spLocks noGrp="1"/>
+          </p:cNvSpPr>
+          <p:nvPr>
+            <p:ph idx="1"/>
+          </p:nvPr>
+        </p:nvSpPr>
+        <p:spPr/>
+        <p:txBody>
+          <a:bodyPr/>
+          <a:lstStyle/>
+          <a:p>
+            <a:pPr marL="0" indent="0">
+              <a:buNone/>
+            </a:pPr>
+            <a:endParaRPr lang="en-US" dirty="0"/>
+          </a:p>
+        </p:txBody>
+      </p:sp>
+    </p:spTree>
+    <p:extLst>
+      <p:ext uri="{BB962C8B-B14F-4D97-AF65-F5344CB8AC3E}">
+        <p14:creationId xmlns:p14="http://schemas.microsoft.com/office/powerpoint/2010/main" val="1589961851"/>
       </p:ext>
     </p:extLst>
   </p:cSld>
@@ -3972,6 +4565,56 @@
           </a:extLst>
         </p:spPr>
       </p:pic>
+      <p:sp>
+        <p:nvSpPr>
+          <p:cNvPr id="6" name="TextBox 5"/>
+          <p:cNvSpPr txBox="1"/>
+          <p:nvPr/>
+        </p:nvSpPr>
+        <p:spPr>
+          <a:xfrm>
+            <a:off x="2573866" y="5141684"/>
+            <a:ext cx="3996265" cy="276999"/>
+          </a:xfrm>
+          <a:prstGeom prst="rect">
+            <a:avLst/>
+          </a:prstGeom>
+          <a:noFill/>
+        </p:spPr>
+        <p:txBody>
+          <a:bodyPr wrap="square" rtlCol="0">
+            <a:spAutoFit/>
+          </a:bodyPr>
+          <a:lstStyle/>
+          <a:p>
+            <a:r>
+              <a:rPr lang="en-US" sz="1200" dirty="0" smtClean="0"/>
+              <a:t>Image from </a:t>
+            </a:r>
+            <a:r>
+              <a:rPr lang="en-US" sz="1200" dirty="0">
+                <a:hlinkClick r:id="rId3"/>
+              </a:rPr>
+              <a:t>https://xkcd.com/1171</a:t>
+            </a:r>
+            <a:r>
+              <a:rPr lang="en-US" sz="1200" dirty="0" smtClean="0">
+                <a:hlinkClick r:id="rId3"/>
+              </a:rPr>
+              <a:t>/</a:t>
+            </a:r>
+            <a:r>
+              <a:rPr lang="en-US" sz="1200" dirty="0" smtClean="0"/>
+              <a:t> under </a:t>
+            </a:r>
+            <a:r>
+              <a:rPr lang="en-US" sz="1200" dirty="0" smtClean="0"/>
+              <a:t>CC BY-NC 2.5</a:t>
+            </a:r>
+            <a:endParaRPr lang="en-US" sz="1200" dirty="0"/>
+          </a:p>
+        </p:txBody>
+      </p:sp>
     </p:spTree>
     <p:extLst>
       <p:ext uri="{BB962C8B-B14F-4D97-AF65-F5344CB8AC3E}">
@@ -4072,7 +4715,6 @@
               <a:rPr lang="en-US" dirty="0" smtClean="0"/>
               <a:t>Hands on!</a:t>
             </a:r>
-            <a:endParaRPr lang="en-US" dirty="0" smtClean="0"/>
           </a:p>
         </p:txBody>
       </p:sp>
@@ -4155,9 +4797,41 @@
           <a:p>
             <a:r>
               <a:rPr lang="en-US" dirty="0" smtClean="0"/>
-              <a:t>Need an example pattern to pick apart</a:t>
-            </a:r>
-            <a:endParaRPr lang="en-US" dirty="0" smtClean="0"/>
+              <a:t>Many operations boil down to searching for strings and then Doing Something™ (printing, replacing, etc.) with that string</a:t>
+            </a:r>
+          </a:p>
+          <a:p>
+            <a:endParaRPr lang="en-US" dirty="0"/>
+          </a:p>
+          <a:p>
+            <a:r>
+              <a:rPr lang="en-US" dirty="0" smtClean="0"/>
+              <a:t>Wikipedia: </a:t>
+            </a:r>
+            <a:r>
+              <a:rPr lang="en-US" i="1" dirty="0" smtClean="0"/>
+              <a:t>“A </a:t>
+            </a:r>
+            <a:r>
+              <a:rPr lang="en-US" i="1" dirty="0"/>
+              <a:t>regular </a:t>
+            </a:r>
+            <a:r>
+              <a:rPr lang="en-US" i="1" dirty="0" smtClean="0"/>
+              <a:t>expression…is </a:t>
+            </a:r>
+            <a:r>
+              <a:rPr lang="en-US" i="1" dirty="0"/>
+              <a:t>an expression used to </a:t>
+            </a:r>
+            <a:r>
+              <a:rPr lang="en-US" b="1" i="1" dirty="0"/>
+              <a:t>specify a set of strings</a:t>
+            </a:r>
+            <a:r>
+              <a:rPr lang="en-US" i="1" dirty="0"/>
+              <a:t>”</a:t>
+            </a:r>
           </a:p>
         </p:txBody>
       </p:sp>
@@ -4215,7 +4889,11 @@
           <a:p>
             <a:r>
               <a:rPr lang="en-US" dirty="0" smtClean="0"/>
-              <a:t>What are regular expressions (regex)?</a:t>
+              <a:t>What are regular </a:t>
+            </a:r>
+            <a:r>
+              <a:rPr lang="en-US" dirty="0" smtClean="0"/>
+              <a:t>expressions?</a:t>
             </a:r>
             <a:endParaRPr lang="en-US" dirty="0"/>
           </a:p>
@@ -4240,77 +4918,73 @@
           <a:p>
             <a:r>
               <a:rPr lang="en-US" dirty="0" smtClean="0"/>
-              <a:t>A regex pattern </a:t>
-            </a:r>
-            <a:r>
-              <a:rPr lang="en-US" b="1" dirty="0" smtClean="0"/>
-              <a:t>matches</a:t>
-            </a:r>
-            <a:r>
-              <a:rPr lang="en-US" b="1" dirty="0" smtClean="0"/>
-              <a:t> </a:t>
-            </a:r>
-            <a:r>
-              <a:rPr lang="en-US" b="1" dirty="0"/>
-              <a:t>a target </a:t>
-            </a:r>
-            <a:r>
-              <a:rPr lang="en-US" b="1" dirty="0" smtClean="0"/>
-              <a:t>string</a:t>
-            </a:r>
-            <a:r>
-              <a:rPr lang="en-US" dirty="0" smtClean="0"/>
-              <a:t>.</a:t>
-            </a:r>
-          </a:p>
-          <a:p>
-            <a:r>
-              <a:rPr lang="en-US" dirty="0" smtClean="0"/>
-              <a:t>The </a:t>
-            </a:r>
+              <a:t>Simplest way is to list each member of the set:</a:t>
+            </a:r>
+          </a:p>
+          <a:p>
+            <a:pPr lvl="1"/>
+            <a:r>
+              <a:rPr lang="en-US" dirty="0" smtClean="0"/>
+              <a:t>/</a:t>
+            </a:r>
+            <a:r>
+              <a:rPr lang="en-US" dirty="0" err="1" smtClean="0"/>
+              <a:t>grey|gray</a:t>
+            </a:r>
+            <a:r>
+              <a:rPr lang="en-US" dirty="0" smtClean="0"/>
+              <a:t>/ defines the set containing the strings “grey” and “gray”</a:t>
+            </a:r>
+          </a:p>
+          <a:p>
+            <a:r>
+              <a:rPr lang="en-US" b="1" dirty="0" err="1" smtClean="0"/>
+              <a:t>Metacharacters</a:t>
+            </a:r>
+            <a:r>
+              <a:rPr lang="en-US" dirty="0" smtClean="0"/>
+              <a:t> let us be more concise:</a:t>
+            </a:r>
+            <a:endParaRPr lang="en-US" b="1" dirty="0" smtClean="0"/>
+          </a:p>
+          <a:p>
+            <a:pPr lvl="1"/>
             <a:r>
               <a:rPr lang="en-US" dirty="0"/>
-              <a:t>pattern is composed of a sequence of </a:t>
-            </a:r>
-            <a:r>
-              <a:rPr lang="en-US" b="1" dirty="0"/>
-              <a:t>atoms</a:t>
-            </a:r>
-            <a:r>
-              <a:rPr lang="en-US" dirty="0"/>
-              <a:t>. </a:t>
-            </a:r>
-            <a:endParaRPr lang="en-US" dirty="0" smtClean="0"/>
+              <a:t>/</a:t>
+            </a:r>
+            <a:r>
+              <a:rPr lang="en-US" dirty="0" smtClean="0"/>
+              <a:t>gr[</a:t>
+            </a:r>
+            <a:r>
+              <a:rPr lang="en-US" dirty="0" err="1" smtClean="0"/>
+              <a:t>ea</a:t>
+            </a:r>
+            <a:r>
+              <a:rPr lang="en-US" dirty="0" smtClean="0"/>
+              <a:t>]y/ and /gr(</a:t>
+            </a:r>
+            <a:r>
+              <a:rPr lang="en-US" dirty="0" err="1" smtClean="0"/>
+              <a:t>e|a</a:t>
+            </a:r>
+            <a:r>
+              <a:rPr lang="en-US" dirty="0" smtClean="0"/>
+              <a:t>)y/ define the same set of strings!</a:t>
+            </a:r>
+            <a:endParaRPr lang="en-US" dirty="0"/>
           </a:p>
           <a:p>
             <a:pPr lvl="1"/>
-            <a:r>
-              <a:rPr lang="en-US" dirty="0" smtClean="0"/>
-              <a:t>An </a:t>
-            </a:r>
-            <a:r>
-              <a:rPr lang="en-US" dirty="0"/>
-              <a:t>atom is a single point within the regex pattern which it tries to match to the target string</a:t>
-            </a:r>
-            <a:r>
-              <a:rPr lang="en-US" dirty="0" smtClean="0"/>
-              <a:t>.</a:t>
-            </a:r>
-          </a:p>
-          <a:p>
-            <a:pPr lvl="1"/>
-            <a:r>
-              <a:rPr lang="en-US" dirty="0" smtClean="0"/>
-              <a:t>Example, a single literal character like ‘a’</a:t>
-            </a:r>
-            <a:endParaRPr lang="en-US" dirty="0" smtClean="0"/>
+            <a:endParaRPr lang="en-US" dirty="0"/>
           </a:p>
         </p:txBody>
       </p:sp>
     </p:spTree>
     <p:extLst>
       <p:ext uri="{BB962C8B-B14F-4D97-AF65-F5344CB8AC3E}">
-        <p14:creationId xmlns:p14="http://schemas.microsoft.com/office/powerpoint/2010/main" val="3347239108"/>
+        <p14:creationId xmlns:p14="http://schemas.microsoft.com/office/powerpoint/2010/main" val="1551721637"/>
       </p:ext>
     </p:extLst>
   </p:cSld>
@@ -4361,7 +5035,11 @@
           <a:p>
             <a:r>
               <a:rPr lang="en-US" dirty="0" smtClean="0"/>
-              <a:t>What are regular expressions (regex)?</a:t>
+              <a:t>What are regular </a:t>
+            </a:r>
+            <a:r>
+              <a:rPr lang="en-US" dirty="0" smtClean="0"/>
+              <a:t>expressions?</a:t>
             </a:r>
             <a:endParaRPr lang="en-US" dirty="0"/>
           </a:p>
@@ -4385,8 +5063,103 @@
           <a:lstStyle/>
           <a:p>
             <a:r>
-              <a:rPr lang="en-US" dirty="0" smtClean="0"/>
-              <a:t>State machine picture of example regex</a:t>
+              <a:rPr lang="en-US" dirty="0" err="1" smtClean="0"/>
+              <a:t>Metacharacters</a:t>
+            </a:r>
+            <a:r>
+              <a:rPr lang="en-US" dirty="0" smtClean="0"/>
+              <a:t> let us describe </a:t>
+            </a:r>
+            <a:r>
+              <a:rPr lang="en-US" u="sng" dirty="0" smtClean="0"/>
+              <a:t>large</a:t>
+            </a:r>
+            <a:r>
+              <a:rPr lang="en-US" dirty="0" smtClean="0"/>
+              <a:t> sets of strings based on their structure</a:t>
+            </a:r>
+          </a:p>
+          <a:p>
+            <a:pPr lvl="1"/>
+            <a:r>
+              <a:rPr lang="en-US" dirty="0" smtClean="0"/>
+              <a:t>/</a:t>
+            </a:r>
+            <a:r>
+              <a:rPr lang="en-US" dirty="0" err="1" smtClean="0"/>
+              <a:t>Galile</a:t>
+            </a:r>
+            <a:r>
+              <a:rPr lang="en-US" dirty="0" smtClean="0"/>
+              <a:t>./ matches “</a:t>
+            </a:r>
+            <a:r>
+              <a:rPr lang="en-US" i="1" dirty="0" smtClean="0"/>
+              <a:t>Galileo,” </a:t>
+            </a:r>
+            <a:r>
+              <a:rPr lang="en-US" dirty="0" smtClean="0"/>
+              <a:t>“</a:t>
+            </a:r>
+            <a:r>
+              <a:rPr lang="en-US" i="1" dirty="0" smtClean="0"/>
+              <a:t>Galilei”, </a:t>
+            </a:r>
+            <a:r>
+              <a:rPr lang="en-US" dirty="0" smtClean="0"/>
+              <a:t>but also </a:t>
+            </a:r>
+            <a:r>
+              <a:rPr lang="en-US" i="1" dirty="0" smtClean="0"/>
+              <a:t>“Galilea,”</a:t>
+            </a:r>
+            <a:r>
+              <a:rPr lang="en-US" dirty="0" smtClean="0"/>
+              <a:t> </a:t>
+            </a:r>
+            <a:r>
+              <a:rPr lang="en-US" i="1" dirty="0" smtClean="0"/>
+              <a:t>“</a:t>
+            </a:r>
+            <a:r>
+              <a:rPr lang="en-US" i="1" dirty="0" err="1" smtClean="0"/>
+              <a:t>Galile</a:t>
+            </a:r>
+            <a:r>
+              <a:rPr lang="en-US" i="1" dirty="0"/>
+              <a:t>%</a:t>
+            </a:r>
+            <a:r>
+              <a:rPr lang="en-US" i="1" dirty="0" smtClean="0"/>
+              <a:t>”</a:t>
+            </a:r>
+            <a:r>
+              <a:rPr lang="en-US" dirty="0" smtClean="0"/>
+              <a:t>, and so on using the ‘.’ </a:t>
+            </a:r>
+            <a:r>
+              <a:rPr lang="en-US" dirty="0" err="1" smtClean="0"/>
+              <a:t>metacharacter</a:t>
+            </a:r>
+            <a:r>
+              <a:rPr lang="en-US" dirty="0" smtClean="0"/>
+              <a:t>, which stands for </a:t>
+            </a:r>
+            <a:r>
+              <a:rPr lang="en-US" u="sng" dirty="0" smtClean="0"/>
+              <a:t>any</a:t>
+            </a:r>
+            <a:r>
+              <a:rPr lang="en-US" u="sng" dirty="0"/>
+              <a:t> </a:t>
+            </a:r>
+            <a:r>
+              <a:rPr lang="en-US" u="sng" dirty="0" smtClean="0"/>
+              <a:t>single</a:t>
+            </a:r>
+            <a:r>
+              <a:rPr lang="en-US" dirty="0" smtClean="0"/>
+              <a:t> character.</a:t>
             </a:r>
           </a:p>
         </p:txBody>
@@ -4394,7 +5167,7 @@
     </p:spTree>
     <p:extLst>
       <p:ext uri="{BB962C8B-B14F-4D97-AF65-F5344CB8AC3E}">
-        <p14:creationId xmlns:p14="http://schemas.microsoft.com/office/powerpoint/2010/main" val="2733361118"/>
+        <p14:creationId xmlns:p14="http://schemas.microsoft.com/office/powerpoint/2010/main" val="1495750192"/>
       </p:ext>
     </p:extLst>
   </p:cSld>
@@ -4445,7 +5218,11 @@
           <a:p>
             <a:r>
               <a:rPr lang="en-US" dirty="0" smtClean="0"/>
-              <a:t>What are regular expressions (regex)?</a:t>
+              <a:t>What are regular </a:t>
+            </a:r>
+            <a:r>
+              <a:rPr lang="en-US" dirty="0" smtClean="0"/>
+              <a:t>expressions?</a:t>
             </a:r>
             <a:endParaRPr lang="en-US" dirty="0"/>
           </a:p>
@@ -4469,50 +5246,72 @@
           <a:lstStyle/>
           <a:p>
             <a:r>
-              <a:rPr lang="en-US" dirty="0" smtClean="0"/>
-              <a:t>A couple different flavors with differences</a:t>
+              <a:rPr lang="en-US" dirty="0" err="1" smtClean="0"/>
+              <a:t>Metacharacters</a:t>
+            </a:r>
+            <a:r>
+              <a:rPr lang="en-US" dirty="0" smtClean="0"/>
+              <a:t> let us describe </a:t>
+            </a:r>
+            <a:r>
+              <a:rPr lang="en-US" u="sng" dirty="0" smtClean="0"/>
+              <a:t>large</a:t>
+            </a:r>
+            <a:r>
+              <a:rPr lang="en-US" dirty="0" smtClean="0"/>
+              <a:t> sets of strings based on their structure</a:t>
             </a:r>
           </a:p>
           <a:p>
             <a:pPr lvl="1"/>
             <a:r>
-              <a:rPr lang="en-US" dirty="0" smtClean="0"/>
-              <a:t>i.e. POSIX has [:alpha:] and [:blank:], vim uses \a and \s</a:t>
-            </a:r>
-          </a:p>
-          <a:p>
-            <a:r>
-              <a:rPr lang="en-US" dirty="0" smtClean="0"/>
-              <a:t>Extensions give much more powerful tools like </a:t>
-            </a:r>
-            <a:r>
-              <a:rPr lang="en-US" dirty="0" err="1" smtClean="0"/>
-              <a:t>backreference</a:t>
-            </a:r>
-            <a:r>
-              <a:rPr lang="en-US" dirty="0" smtClean="0"/>
-              <a:t>, but </a:t>
-            </a:r>
-            <a:r>
-              <a:rPr lang="en-US" u="sng" dirty="0" smtClean="0"/>
-              <a:t>these generally discard the regularity of the grammar</a:t>
-            </a:r>
-            <a:endParaRPr lang="en-US" dirty="0" smtClean="0"/>
-          </a:p>
-          <a:p>
-            <a:pPr lvl="1"/>
-            <a:r>
-              <a:rPr lang="en-US" dirty="0" smtClean="0"/>
-              <a:t>As a result, relying heavily on these can result in a much slower expression evaluation</a:t>
-            </a:r>
-            <a:endParaRPr lang="en-US" dirty="0" smtClean="0"/>
+              <a:rPr lang="en-US" dirty="0"/>
+              <a:t>/</a:t>
+            </a:r>
+            <a:r>
+              <a:rPr lang="en-US" dirty="0" err="1"/>
+              <a:t>Galile</a:t>
+            </a:r>
+            <a:r>
+              <a:rPr lang="en-US" dirty="0"/>
+              <a:t>.*/ matches </a:t>
+            </a:r>
+            <a:r>
+              <a:rPr lang="en-US" i="1" dirty="0"/>
+              <a:t>“</a:t>
+            </a:r>
+            <a:r>
+              <a:rPr lang="en-US" i="1" dirty="0" err="1"/>
+              <a:t>Galile</a:t>
+            </a:r>
+            <a:r>
+              <a:rPr lang="en-US" i="1" dirty="0"/>
+              <a:t>, Galileo, Galilei, Galileo </a:t>
+            </a:r>
+            <a:r>
+              <a:rPr lang="en-US" i="1" dirty="0" err="1"/>
+              <a:t>Galileo</a:t>
+            </a:r>
+            <a:r>
+              <a:rPr lang="en-US" i="1" dirty="0"/>
+              <a:t>, Galileo Galilei,”</a:t>
+            </a:r>
+            <a:r>
+              <a:rPr lang="en-US" dirty="0"/>
+              <a:t> etc. using the ‘*’ character, which matches </a:t>
+            </a:r>
+            <a:r>
+              <a:rPr lang="en-US" u="sng" dirty="0"/>
+              <a:t>any number of repeats</a:t>
+            </a:r>
+            <a:endParaRPr lang="en-US" dirty="0"/>
           </a:p>
         </p:txBody>
       </p:sp>
     </p:spTree>
     <p:extLst>
       <p:ext uri="{BB962C8B-B14F-4D97-AF65-F5344CB8AC3E}">
-        <p14:creationId xmlns:p14="http://schemas.microsoft.com/office/powerpoint/2010/main" val="1032991498"/>
+        <p14:creationId xmlns:p14="http://schemas.microsoft.com/office/powerpoint/2010/main" val="1608953091"/>
       </p:ext>
     </p:extLst>
   </p:cSld>
@@ -4563,78 +5362,505 @@
           <a:p>
             <a:r>
               <a:rPr lang="en-US" dirty="0" smtClean="0"/>
-              <a:t>What are regular expressions useful for?</a:t>
+              <a:t>What are regular expressions (regex)?</a:t>
             </a:r>
             <a:endParaRPr lang="en-US" dirty="0"/>
           </a:p>
         </p:txBody>
       </p:sp>
-      <p:sp>
-        <p:nvSpPr>
-          <p:cNvPr id="3" name="Content Placeholder 2"/>
-          <p:cNvSpPr>
-            <a:spLocks noGrp="1"/>
-          </p:cNvSpPr>
-          <p:nvPr>
-            <p:ph idx="1"/>
-          </p:nvPr>
-        </p:nvSpPr>
-        <p:spPr/>
-        <p:txBody>
-          <a:bodyPr>
-            <a:normAutofit/>
-          </a:bodyPr>
-          <a:lstStyle/>
-          <a:p>
-            <a:r>
-              <a:rPr lang="en-US" dirty="0" smtClean="0"/>
-              <a:t>Searching for a vague target</a:t>
-            </a:r>
-          </a:p>
-          <a:p>
-            <a:pPr lvl="1"/>
-            <a:r>
-              <a:rPr lang="en-US" dirty="0" smtClean="0"/>
-              <a:t>If you know the </a:t>
-            </a:r>
-            <a:r>
-              <a:rPr lang="en-US" i="1" dirty="0" smtClean="0"/>
-              <a:t>structure</a:t>
-            </a:r>
-            <a:r>
-              <a:rPr lang="en-US" dirty="0" smtClean="0"/>
-              <a:t> of a string, you can encode this information into your search</a:t>
-            </a:r>
-            <a:endParaRPr lang="en-US" dirty="0" smtClean="0"/>
-          </a:p>
-          <a:p>
-            <a:r>
-              <a:rPr lang="en-US" dirty="0" smtClean="0"/>
-              <a:t>Search-and-replace</a:t>
-            </a:r>
-          </a:p>
-          <a:p>
-            <a:pPr lvl="1"/>
-            <a:r>
-              <a:rPr lang="en-US" dirty="0" err="1" smtClean="0"/>
-              <a:t>Sed</a:t>
-            </a:r>
-            <a:r>
-              <a:rPr lang="en-US" dirty="0" smtClean="0"/>
-              <a:t>, vim, </a:t>
-            </a:r>
-            <a:r>
-              <a:rPr lang="en-US" dirty="0" err="1" smtClean="0"/>
-              <a:t>awk</a:t>
-            </a:r>
-            <a:endParaRPr lang="en-US" dirty="0" smtClean="0"/>
-          </a:p>
-        </p:txBody>
-      </p:sp>
+      <p:graphicFrame>
+        <p:nvGraphicFramePr>
+          <p:cNvPr id="4" name="Table 3"/>
+          <p:cNvGraphicFramePr>
+            <a:graphicFrameLocks noGrp="1"/>
+          </p:cNvGraphicFramePr>
+          <p:nvPr>
+            <p:extLst>
+              <p:ext uri="{D42A27DB-BD31-4B8C-83A1-F6EECF244321}">
+                <p14:modId xmlns:p14="http://schemas.microsoft.com/office/powerpoint/2010/main" val="3541944056"/>
+              </p:ext>
+            </p:extLst>
+          </p:nvPr>
+        </p:nvGraphicFramePr>
+        <p:xfrm>
+          <a:off x="489246" y="2238998"/>
+          <a:ext cx="8165507" cy="4361747"/>
+        </p:xfrm>
+        <a:graphic>
+          <a:graphicData uri="http://schemas.openxmlformats.org/drawingml/2006/table">
+            <a:tbl>
+              <a:tblPr firstRow="1" bandRow="1">
+                <a:tableStyleId>{D7AC3CCA-C797-4891-BE02-D94E43425B78}</a:tableStyleId>
+              </a:tblPr>
+              <a:tblGrid>
+                <a:gridCol w="675118"/>
+                <a:gridCol w="3638372"/>
+                <a:gridCol w="1102408"/>
+                <a:gridCol w="2749609"/>
+              </a:tblGrid>
+              <a:tr h="359739">
+                <a:tc>
+                  <a:txBody>
+                    <a:bodyPr/>
+                    <a:lstStyle/>
+                    <a:p>
+                      <a:pPr algn="ctr"/>
+                      <a:r>
+                        <a:rPr lang="en-US" b="0" dirty="0" smtClean="0"/>
+                        <a:t>.</a:t>
+                      </a:r>
+                      <a:endParaRPr lang="en-US" b="0" dirty="0"/>
+                    </a:p>
+                  </a:txBody>
+                  <a:tcPr anchor="ctr"/>
+                </a:tc>
+                <a:tc>
+                  <a:txBody>
+                    <a:bodyPr/>
+                    <a:lstStyle/>
+                    <a:p>
+                      <a:pPr algn="ctr"/>
+                      <a:r>
+                        <a:rPr lang="en-US" b="0" dirty="0" smtClean="0"/>
+                        <a:t>Any character </a:t>
+                      </a:r>
+                      <a:endParaRPr lang="en-US" b="0" dirty="0"/>
+                    </a:p>
+                  </a:txBody>
+                  <a:tcPr anchor="ctr"/>
+                </a:tc>
+                <a:tc>
+                  <a:txBody>
+                    <a:bodyPr/>
+                    <a:lstStyle/>
+                    <a:p>
+                      <a:pPr algn="ctr"/>
+                      <a:r>
+                        <a:rPr lang="en-US" b="0" dirty="0" smtClean="0"/>
+                        <a:t>(  )</a:t>
+                      </a:r>
+                      <a:endParaRPr lang="en-US" b="0" dirty="0"/>
+                    </a:p>
+                  </a:txBody>
+                  <a:tcPr anchor="ctr"/>
+                </a:tc>
+                <a:tc>
+                  <a:txBody>
+                    <a:bodyPr/>
+                    <a:lstStyle/>
+                    <a:p>
+                      <a:pPr algn="ctr"/>
+                      <a:r>
+                        <a:rPr lang="en-US" b="0" dirty="0" smtClean="0"/>
+                        <a:t>A group </a:t>
+                      </a:r>
+                      <a:r>
+                        <a:rPr lang="en-US" b="0" baseline="0" dirty="0" smtClean="0"/>
+                        <a:t>for nesting expressions</a:t>
+                      </a:r>
+                      <a:endParaRPr lang="en-US" b="0" dirty="0"/>
+                    </a:p>
+                  </a:txBody>
+                  <a:tcPr anchor="ctr"/>
+                </a:tc>
+              </a:tr>
+              <a:tr h="887027">
+                <a:tc>
+                  <a:txBody>
+                    <a:bodyPr/>
+                    <a:lstStyle/>
+                    <a:p>
+                      <a:pPr algn="ctr"/>
+                      <a:r>
+                        <a:rPr lang="en-US" dirty="0" smtClean="0"/>
+                        <a:t>[  ]</a:t>
+                      </a:r>
+                      <a:endParaRPr lang="en-US" dirty="0"/>
+                    </a:p>
+                  </a:txBody>
+                  <a:tcPr anchor="ctr"/>
+                </a:tc>
+                <a:tc>
+                  <a:txBody>
+                    <a:bodyPr/>
+                    <a:lstStyle/>
+                    <a:p>
+                      <a:pPr algn="ctr"/>
+                      <a:r>
+                        <a:rPr lang="en-US" dirty="0" smtClean="0"/>
+                        <a:t>Group of</a:t>
+                      </a:r>
+                      <a:r>
+                        <a:rPr lang="en-US" baseline="0" dirty="0" smtClean="0"/>
+                        <a:t> </a:t>
+                      </a:r>
+                      <a:r>
+                        <a:rPr lang="en-US" dirty="0" smtClean="0"/>
+                        <a:t>chars</a:t>
+                      </a:r>
+                      <a:r>
+                        <a:rPr lang="en-US" baseline="0" dirty="0" smtClean="0"/>
+                        <a:t> to match:</a:t>
+                      </a:r>
+                      <a:r>
+                        <a:rPr lang="en-US" dirty="0" smtClean="0"/>
+                        <a:t> [</a:t>
+                      </a:r>
+                      <a:r>
+                        <a:rPr lang="en-US" dirty="0" err="1" smtClean="0"/>
+                        <a:t>xXy</a:t>
+                      </a:r>
+                      <a:r>
+                        <a:rPr lang="en-US" dirty="0" smtClean="0"/>
+                        <a:t>] matches ‘x,’ ‘X’ or ‘y’</a:t>
+                      </a:r>
+                      <a:endParaRPr lang="en-US" dirty="0"/>
+                    </a:p>
+                  </a:txBody>
+                  <a:tcPr anchor="ctr"/>
+                </a:tc>
+                <a:tc>
+                  <a:txBody>
+                    <a:bodyPr/>
+                    <a:lstStyle/>
+                    <a:p>
+                      <a:pPr algn="ctr"/>
+                      <a:r>
+                        <a:rPr lang="en-US" dirty="0" smtClean="0"/>
+                        <a:t>\1,</a:t>
+                      </a:r>
+                      <a:r>
+                        <a:rPr lang="en-US" baseline="0" dirty="0" smtClean="0"/>
+                        <a:t> \2, etc.</a:t>
+                      </a:r>
+                      <a:endParaRPr lang="en-US" dirty="0"/>
+                    </a:p>
+                  </a:txBody>
+                  <a:tcPr anchor="ctr"/>
+                </a:tc>
+                <a:tc>
+                  <a:txBody>
+                    <a:bodyPr/>
+                    <a:lstStyle/>
+                    <a:p>
+                      <a:pPr algn="ctr"/>
+                      <a:r>
+                        <a:rPr lang="en-US" dirty="0" smtClean="0"/>
+                        <a:t>A reference to the </a:t>
+                      </a:r>
+                      <a:r>
+                        <a:rPr lang="en-US" i="1" dirty="0" smtClean="0"/>
+                        <a:t>nth</a:t>
+                      </a:r>
+                      <a:r>
+                        <a:rPr lang="en-US" i="0" baseline="0" dirty="0" smtClean="0"/>
+                        <a:t> group</a:t>
+                      </a:r>
+                      <a:endParaRPr lang="en-US" dirty="0"/>
+                    </a:p>
+                  </a:txBody>
+                  <a:tcPr anchor="ctr"/>
+                </a:tc>
+              </a:tr>
+              <a:tr h="620919">
+                <a:tc>
+                  <a:txBody>
+                    <a:bodyPr/>
+                    <a:lstStyle/>
+                    <a:p>
+                      <a:pPr algn="ctr"/>
+                      <a:r>
+                        <a:rPr lang="en-US" dirty="0" smtClean="0"/>
+                        <a:t>[^  ]</a:t>
+                      </a:r>
+                      <a:endParaRPr lang="en-US" dirty="0"/>
+                    </a:p>
+                  </a:txBody>
+                  <a:tcPr anchor="ctr"/>
+                </a:tc>
+                <a:tc>
+                  <a:txBody>
+                    <a:bodyPr/>
+                    <a:lstStyle/>
+                    <a:p>
+                      <a:pPr algn="ctr"/>
+                      <a:r>
+                        <a:rPr lang="en-US" dirty="0" smtClean="0"/>
+                        <a:t>Group of chars </a:t>
+                      </a:r>
+                      <a:r>
+                        <a:rPr lang="en-US" u="sng" dirty="0" smtClean="0"/>
+                        <a:t>not</a:t>
+                      </a:r>
+                      <a:r>
+                        <a:rPr lang="en-US" u="none" dirty="0" smtClean="0"/>
+                        <a:t> to match</a:t>
+                      </a:r>
+                      <a:endParaRPr lang="en-US" dirty="0"/>
+                    </a:p>
+                  </a:txBody>
+                  <a:tcPr anchor="ctr"/>
+                </a:tc>
+                <a:tc>
+                  <a:txBody>
+                    <a:bodyPr/>
+                    <a:lstStyle/>
+                    <a:p>
+                      <a:pPr algn="ctr"/>
+                      <a:r>
+                        <a:rPr lang="en-US" dirty="0" smtClean="0"/>
+                        <a:t>*</a:t>
+                      </a:r>
+                      <a:endParaRPr lang="en-US" dirty="0"/>
+                    </a:p>
+                  </a:txBody>
+                  <a:tcPr anchor="ctr"/>
+                </a:tc>
+                <a:tc>
+                  <a:txBody>
+                    <a:bodyPr/>
+                    <a:lstStyle/>
+                    <a:p>
+                      <a:pPr algn="ctr"/>
+                      <a:r>
+                        <a:rPr lang="en-US" dirty="0" smtClean="0"/>
+                        <a:t>Match the preceding element 0 or more times</a:t>
+                      </a:r>
+                      <a:endParaRPr lang="en-US" dirty="0"/>
+                    </a:p>
+                  </a:txBody>
+                  <a:tcPr anchor="ctr"/>
+                </a:tc>
+              </a:tr>
+              <a:tr h="620919">
+                <a:tc>
+                  <a:txBody>
+                    <a:bodyPr/>
+                    <a:lstStyle/>
+                    <a:p>
+                      <a:pPr algn="ctr"/>
+                      <a:r>
+                        <a:rPr lang="en-US" dirty="0" smtClean="0"/>
+                        <a:t>^</a:t>
+                      </a:r>
+                      <a:endParaRPr lang="en-US" dirty="0"/>
+                    </a:p>
+                  </a:txBody>
+                  <a:tcPr anchor="ctr"/>
+                </a:tc>
+                <a:tc>
+                  <a:txBody>
+                    <a:bodyPr/>
+                    <a:lstStyle/>
+                    <a:p>
+                      <a:pPr algn="ctr"/>
+                      <a:r>
+                        <a:rPr lang="en-US" dirty="0" smtClean="0"/>
+                        <a:t>Matches the</a:t>
+                      </a:r>
+                      <a:r>
+                        <a:rPr lang="en-US" baseline="0" dirty="0" smtClean="0"/>
+                        <a:t> start of the string</a:t>
+                      </a:r>
+                      <a:endParaRPr lang="en-US" dirty="0"/>
+                    </a:p>
+                  </a:txBody>
+                  <a:tcPr anchor="ctr"/>
+                </a:tc>
+                <a:tc>
+                  <a:txBody>
+                    <a:bodyPr/>
+                    <a:lstStyle/>
+                    <a:p>
+                      <a:pPr algn="ctr"/>
+                      <a:r>
+                        <a:rPr lang="en-US" dirty="0" smtClean="0"/>
+                        <a:t>{m,</a:t>
+                      </a:r>
+                      <a:r>
+                        <a:rPr lang="en-US" baseline="0" dirty="0" smtClean="0"/>
+                        <a:t> n}</a:t>
+                      </a:r>
+                      <a:endParaRPr lang="en-US" dirty="0"/>
+                    </a:p>
+                  </a:txBody>
+                  <a:tcPr anchor="ctr"/>
+                </a:tc>
+                <a:tc>
+                  <a:txBody>
+                    <a:bodyPr/>
+                    <a:lstStyle/>
+                    <a:p>
+                      <a:pPr algn="ctr"/>
+                      <a:r>
+                        <a:rPr lang="en-US" dirty="0" smtClean="0"/>
+                        <a:t>Match the preceding element at</a:t>
+                      </a:r>
+                      <a:r>
+                        <a:rPr lang="en-US" baseline="0" dirty="0" smtClean="0"/>
+                        <a:t> least m times, at most n</a:t>
+                      </a:r>
+                      <a:endParaRPr lang="en-US" dirty="0"/>
+                    </a:p>
+                  </a:txBody>
+                  <a:tcPr anchor="ctr"/>
+                </a:tc>
+              </a:tr>
+              <a:tr h="620919">
+                <a:tc>
+                  <a:txBody>
+                    <a:bodyPr/>
+                    <a:lstStyle/>
+                    <a:p>
+                      <a:pPr algn="ctr"/>
+                      <a:r>
+                        <a:rPr lang="en-US" dirty="0" smtClean="0"/>
+                        <a:t>$</a:t>
+                      </a:r>
+                      <a:endParaRPr lang="en-US" dirty="0"/>
+                    </a:p>
+                  </a:txBody>
+                  <a:tcPr anchor="ctr"/>
+                </a:tc>
+                <a:tc>
+                  <a:txBody>
+                    <a:bodyPr/>
+                    <a:lstStyle/>
+                    <a:p>
+                      <a:pPr algn="ctr"/>
+                      <a:r>
+                        <a:rPr lang="en-US" dirty="0" smtClean="0"/>
+                        <a:t>Matches the end of the string</a:t>
+                      </a:r>
+                      <a:endParaRPr lang="en-US" dirty="0"/>
+                    </a:p>
+                  </a:txBody>
+                  <a:tcPr anchor="ctr"/>
+                </a:tc>
+                <a:tc>
+                  <a:txBody>
+                    <a:bodyPr/>
+                    <a:lstStyle/>
+                    <a:p>
+                      <a:pPr algn="ctr"/>
+                      <a:r>
+                        <a:rPr lang="en-US" dirty="0" smtClean="0"/>
+                        <a:t>?</a:t>
+                      </a:r>
+                      <a:endParaRPr lang="en-US" dirty="0"/>
+                    </a:p>
+                  </a:txBody>
+                  <a:tcPr anchor="ctr"/>
+                </a:tc>
+                <a:tc>
+                  <a:txBody>
+                    <a:bodyPr/>
+                    <a:lstStyle/>
+                    <a:p>
+                      <a:pPr algn="ctr"/>
+                      <a:r>
+                        <a:rPr lang="en-US" dirty="0" smtClean="0"/>
+                        <a:t>Match the preceding 0</a:t>
+                      </a:r>
+                      <a:r>
+                        <a:rPr lang="en-US" baseline="0" dirty="0" smtClean="0"/>
+                        <a:t> or 1 time</a:t>
+                      </a:r>
+                      <a:endParaRPr lang="en-US" dirty="0"/>
+                    </a:p>
+                  </a:txBody>
+                  <a:tcPr anchor="ctr"/>
+                </a:tc>
+              </a:tr>
+              <a:tr h="359739">
+                <a:tc>
+                  <a:txBody>
+                    <a:bodyPr/>
+                    <a:lstStyle/>
+                    <a:p>
+                      <a:pPr marL="0" marR="0" indent="0" algn="ctr" defTabSz="457200" rtl="0" eaLnBrk="1" fontAlgn="auto" latinLnBrk="0" hangingPunct="1">
+                        <a:lnSpc>
+                          <a:spcPct val="100000"/>
+                        </a:lnSpc>
+                        <a:spcBef>
+                          <a:spcPts val="0"/>
+                        </a:spcBef>
+                        <a:spcAft>
+                          <a:spcPts val="0"/>
+                        </a:spcAft>
+                        <a:buClrTx/>
+                        <a:buSzTx/>
+                        <a:buFontTx/>
+                        <a:buNone/>
+                        <a:tabLst/>
+                        <a:defRPr/>
+                      </a:pPr>
+                      <a:r>
+                        <a:rPr lang="en-US" dirty="0" smtClean="0"/>
+                        <a:t>|</a:t>
+                      </a:r>
+                    </a:p>
+                  </a:txBody>
+                  <a:tcPr anchor="ctr"/>
+                </a:tc>
+                <a:tc>
+                  <a:txBody>
+                    <a:bodyPr/>
+                    <a:lstStyle/>
+                    <a:p>
+                      <a:pPr algn="ctr"/>
+                      <a:r>
+                        <a:rPr lang="en-US" dirty="0" smtClean="0"/>
+                        <a:t>Boolean OR</a:t>
+                      </a:r>
+                      <a:endParaRPr lang="en-US" dirty="0"/>
+                    </a:p>
+                  </a:txBody>
+                  <a:tcPr anchor="ctr"/>
+                </a:tc>
+                <a:tc>
+                  <a:txBody>
+                    <a:bodyPr/>
+                    <a:lstStyle/>
+                    <a:p>
+                      <a:pPr algn="ctr"/>
+                      <a:r>
+                        <a:rPr lang="en-US" dirty="0" smtClean="0"/>
+                        <a:t>+</a:t>
+                      </a:r>
+                      <a:endParaRPr lang="en-US" dirty="0"/>
+                    </a:p>
+                  </a:txBody>
+                  <a:tcPr anchor="ctr"/>
+                </a:tc>
+                <a:tc>
+                  <a:txBody>
+                    <a:bodyPr/>
+                    <a:lstStyle/>
+                    <a:p>
+                      <a:pPr algn="ctr"/>
+                      <a:r>
+                        <a:rPr lang="en-US" dirty="0" smtClean="0"/>
+                        <a:t>Match the preceding 1 or</a:t>
+                      </a:r>
+                      <a:r>
+                        <a:rPr lang="en-US" baseline="0" dirty="0" smtClean="0"/>
+                        <a:t> more times</a:t>
+                      </a:r>
+                      <a:endParaRPr lang="en-US" dirty="0"/>
+                    </a:p>
+                  </a:txBody>
+                  <a:tcPr anchor="ctr"/>
+                </a:tc>
+              </a:tr>
+            </a:tbl>
+          </a:graphicData>
+        </a:graphic>
+      </p:graphicFrame>
     </p:spTree>
     <p:extLst>
       <p:ext uri="{BB962C8B-B14F-4D97-AF65-F5344CB8AC3E}">
-        <p14:creationId xmlns:p14="http://schemas.microsoft.com/office/powerpoint/2010/main" val="2627175943"/>
+        <p14:creationId xmlns:p14="http://schemas.microsoft.com/office/powerpoint/2010/main" val="3347239108"/>
       </p:ext>
     </p:extLst>
   </p:cSld>

</xml_diff>

<commit_message>
Added resources, a few more organizational notes
</commit_message>
<xml_diff>
--- a/2017/computing_workgroup/regex/regular_expressions.pptx
+++ b/2017/computing_workgroup/regex/regular_expressions.pptx
@@ -5,7 +5,7 @@
     <p:sldMasterId id="2147483648" r:id="rId1"/>
   </p:sldMasterIdLst>
   <p:notesMasterIdLst>
-    <p:notesMasterId r:id="rId22"/>
+    <p:notesMasterId r:id="rId24"/>
   </p:notesMasterIdLst>
   <p:sldIdLst>
     <p:sldId id="256" r:id="rId2"/>
@@ -21,13 +21,15 @@
     <p:sldId id="383" r:id="rId12"/>
     <p:sldId id="377" r:id="rId13"/>
     <p:sldId id="376" r:id="rId14"/>
-    <p:sldId id="375" r:id="rId15"/>
+    <p:sldId id="384" r:id="rId15"/>
     <p:sldId id="373" r:id="rId16"/>
-    <p:sldId id="368" r:id="rId17"/>
-    <p:sldId id="341" r:id="rId18"/>
-    <p:sldId id="339" r:id="rId19"/>
-    <p:sldId id="366" r:id="rId20"/>
-    <p:sldId id="340" r:id="rId21"/>
+    <p:sldId id="375" r:id="rId17"/>
+    <p:sldId id="368" r:id="rId18"/>
+    <p:sldId id="341" r:id="rId19"/>
+    <p:sldId id="385" r:id="rId20"/>
+    <p:sldId id="339" r:id="rId21"/>
+    <p:sldId id="366" r:id="rId22"/>
+    <p:sldId id="340" r:id="rId23"/>
   </p:sldIdLst>
   <p:sldSz cx="9144000" cy="6858000" type="screen4x3"/>
   <p:notesSz cx="6858000" cy="9144000"/>
@@ -3150,7 +3152,7 @@
           <a:p>
             <a:r>
               <a:rPr lang="en-US" dirty="0" smtClean="0"/>
-              <a:t>What are regular expressions (regex)?</a:t>
+              <a:t>A word on regex implementation</a:t>
             </a:r>
             <a:endParaRPr lang="en-US" dirty="0"/>
           </a:p>
@@ -3180,7 +3182,7 @@
           <a:p>
             <a:r>
               <a:rPr lang="en-US" dirty="0" smtClean="0"/>
-              <a:t>Consider the state machine describing the regular expression /(</a:t>
+              <a:t>Below is a state machine describing the regular expression /(</a:t>
             </a:r>
             <a:r>
               <a:rPr lang="en-US" dirty="0" err="1" smtClean="0"/>
@@ -3296,8 +3298,8 @@
           <a:lstStyle/>
           <a:p>
             <a:r>
-              <a:rPr lang="en-US" dirty="0" smtClean="0"/>
-              <a:t>What are regular expressions (regex)?</a:t>
+              <a:rPr lang="en-US" dirty="0"/>
+              <a:t>A word on regex implementation</a:t>
             </a:r>
             <a:endParaRPr lang="en-US" dirty="0"/>
           </a:p>
@@ -3452,7 +3454,11 @@
           <a:p>
             <a:r>
               <a:rPr lang="en-US" dirty="0" smtClean="0"/>
-              <a:t>What are regular expressions (regex)?</a:t>
+              <a:t>What are regular </a:t>
+            </a:r>
+            <a:r>
+              <a:rPr lang="en-US" dirty="0" smtClean="0"/>
+              <a:t>expressions?</a:t>
             </a:r>
             <a:endParaRPr lang="en-US" dirty="0"/>
           </a:p>
@@ -3477,20 +3483,11 @@
           <a:p>
             <a:r>
               <a:rPr lang="en-US" dirty="0" smtClean="0"/>
-              <a:t>A couple different flavors with differences</a:t>
-            </a:r>
-          </a:p>
-          <a:p>
-            <a:pPr lvl="1"/>
-            <a:r>
-              <a:rPr lang="en-US" dirty="0" smtClean="0"/>
-              <a:t>i.e. POSIX has [:alpha:] and [:blank:], vim uses \a and \s</a:t>
-            </a:r>
-          </a:p>
-          <a:p>
-            <a:r>
-              <a:rPr lang="en-US" dirty="0" smtClean="0"/>
-              <a:t>Extensions give much more powerful tools like </a:t>
+              <a:t>Extensions </a:t>
+            </a:r>
+            <a:r>
+              <a:rPr lang="en-US" dirty="0" smtClean="0"/>
+              <a:t>give much more powerful tools like </a:t>
             </a:r>
             <a:r>
               <a:rPr lang="en-US" dirty="0" err="1" smtClean="0"/>
@@ -3685,22 +3682,12 @@
         </p:nvSpPr>
         <p:spPr/>
         <p:txBody>
-          <a:bodyPr>
-            <a:normAutofit fontScale="90000"/>
-          </a:bodyPr>
+          <a:bodyPr/>
           <a:lstStyle/>
           <a:p>
             <a:r>
               <a:rPr lang="en-US" dirty="0" smtClean="0"/>
-              <a:t>What are regular expressions </a:t>
-            </a:r>
-            <a:r>
-              <a:rPr lang="en-US" i="1" dirty="0" smtClean="0"/>
-              <a:t>not </a:t>
-            </a:r>
-            <a:r>
-              <a:rPr lang="en-US" dirty="0" smtClean="0"/>
-              <a:t>useful for?</a:t>
+              <a:t>What are regular expressions useful for?</a:t>
             </a:r>
             <a:endParaRPr lang="en-US" dirty="0"/>
           </a:p>
@@ -3725,22 +3712,75 @@
           <a:p>
             <a:r>
               <a:rPr lang="en-US" dirty="0" smtClean="0"/>
-              <a:t>Prime number sieve</a:t>
+              <a:t>Hands-on examples, one or two with grep and </a:t>
+            </a:r>
+            <a:r>
+              <a:rPr lang="en-US" dirty="0" err="1" smtClean="0"/>
+              <a:t>sed</a:t>
+            </a:r>
+            <a:r>
+              <a:rPr lang="en-US" dirty="0" smtClean="0"/>
+              <a:t>, two with Python</a:t>
             </a:r>
           </a:p>
           <a:p>
             <a:pPr lvl="1"/>
             <a:r>
-              <a:rPr lang="en-US" dirty="0" smtClean="0"/>
-              <a:t>The right tool for the right job!</a:t>
-            </a:r>
+              <a:rPr lang="en-US" dirty="0"/>
+              <a:t>Matching a time</a:t>
+            </a:r>
+          </a:p>
+          <a:p>
+            <a:pPr lvl="1"/>
+            <a:r>
+              <a:rPr lang="en-US" dirty="0" smtClean="0"/>
+              <a:t>Matching a mm/</a:t>
+            </a:r>
+            <a:r>
+              <a:rPr lang="en-US" dirty="0" err="1" smtClean="0"/>
+              <a:t>dd</a:t>
+            </a:r>
+            <a:r>
+              <a:rPr lang="en-US" dirty="0" smtClean="0"/>
+              <a:t>/</a:t>
+            </a:r>
+            <a:r>
+              <a:rPr lang="en-US" dirty="0" err="1" smtClean="0"/>
+              <a:t>yyyy</a:t>
+            </a:r>
+            <a:r>
+              <a:rPr lang="en-US" dirty="0" smtClean="0"/>
+              <a:t> date</a:t>
+            </a:r>
+          </a:p>
+          <a:p>
+            <a:pPr lvl="1"/>
+            <a:r>
+              <a:rPr lang="en-US" dirty="0" smtClean="0"/>
+              <a:t>Matching a phone number</a:t>
+            </a:r>
+          </a:p>
+          <a:p>
+            <a:pPr lvl="1"/>
+            <a:r>
+              <a:rPr lang="en-US" dirty="0" smtClean="0"/>
+              <a:t>Matching a repeated string</a:t>
+            </a:r>
+          </a:p>
+          <a:p>
+            <a:pPr lvl="1"/>
+            <a:endParaRPr lang="en-US" dirty="0" smtClean="0"/>
+          </a:p>
+          <a:p>
+            <a:pPr lvl="1"/>
+            <a:endParaRPr lang="en-US" dirty="0" smtClean="0"/>
           </a:p>
         </p:txBody>
       </p:sp>
     </p:spTree>
     <p:extLst>
       <p:ext uri="{BB962C8B-B14F-4D97-AF65-F5344CB8AC3E}">
-        <p14:creationId xmlns:p14="http://schemas.microsoft.com/office/powerpoint/2010/main" val="1627161319"/>
+        <p14:creationId xmlns:p14="http://schemas.microsoft.com/office/powerpoint/2010/main" val="2307021946"/>
       </p:ext>
     </p:extLst>
   </p:cSld>
@@ -3791,7 +3831,7 @@
           <a:p>
             <a:r>
               <a:rPr lang="en-US" dirty="0" smtClean="0"/>
-              <a:t>Regular expression examples</a:t>
+              <a:t>Regex in Python</a:t>
             </a:r>
             <a:endParaRPr lang="en-US" dirty="0"/>
           </a:p>
@@ -3810,40 +3850,59 @@
         <p:spPr/>
         <p:txBody>
           <a:bodyPr>
-            <a:normAutofit/>
+            <a:normAutofit lnSpcReduction="10000"/>
           </a:bodyPr>
           <a:lstStyle/>
           <a:p>
             <a:r>
               <a:rPr lang="en-US" dirty="0" smtClean="0"/>
-              <a:t>grep</a:t>
-            </a:r>
-          </a:p>
-          <a:p>
+              <a:t>`re` module</a:t>
+            </a:r>
+          </a:p>
+          <a:p>
+            <a:r>
+              <a:rPr lang="en-US" dirty="0" smtClean="0"/>
+              <a:t>Match objects are the return value</a:t>
+            </a:r>
+          </a:p>
+          <a:p>
+            <a:pPr lvl="1"/>
+            <a:r>
+              <a:rPr lang="en-US" dirty="0" smtClean="0"/>
+              <a:t>In particular, groups() is very useful</a:t>
+            </a:r>
+          </a:p>
+          <a:p>
+            <a:r>
+              <a:rPr lang="en-US" dirty="0" smtClean="0"/>
+              <a:t>Flags like case insensitivity</a:t>
+            </a:r>
+          </a:p>
+          <a:p>
+            <a:r>
+              <a:rPr lang="en-US" dirty="0" smtClean="0"/>
+              <a:t>Replacement (mention `</a:t>
+            </a:r>
             <a:r>
               <a:rPr lang="en-US" dirty="0" err="1" smtClean="0"/>
-              <a:t>sed</a:t>
-            </a:r>
-            <a:endParaRPr lang="en-US" dirty="0" smtClean="0"/>
-          </a:p>
-          <a:p>
-            <a:r>
-              <a:rPr lang="en-US" dirty="0" err="1" smtClean="0"/>
-              <a:t>awk</a:t>
-            </a:r>
-            <a:endParaRPr lang="en-US" dirty="0" smtClean="0"/>
+              <a:t>str.replace</a:t>
+            </a:r>
+            <a:r>
+              <a:rPr lang="en-US" dirty="0" smtClean="0"/>
+              <a:t>()`)</a:t>
+            </a:r>
+          </a:p>
+          <a:p>
+            <a:r>
+              <a:rPr lang="en-US" dirty="0" smtClean="0"/>
+              <a:t>Pre-compiled regex if you use one frequently</a:t>
+            </a:r>
           </a:p>
           <a:p>
             <a:pPr lvl="1"/>
             <a:r>
               <a:rPr lang="en-US" dirty="0" smtClean="0"/>
-              <a:t>Peter</a:t>
-            </a:r>
-          </a:p>
-          <a:p>
-            <a:r>
-              <a:rPr lang="en-US" dirty="0" smtClean="0"/>
-              <a:t>Python `re` module</a:t>
+              <a:t>Show a timing test?</a:t>
             </a:r>
           </a:p>
           <a:p>
@@ -3903,20 +3962,22 @@
         </p:nvSpPr>
         <p:spPr/>
         <p:txBody>
-          <a:bodyPr/>
+          <a:bodyPr>
+            <a:normAutofit fontScale="90000"/>
+          </a:bodyPr>
           <a:lstStyle/>
           <a:p>
             <a:r>
               <a:rPr lang="en-US" dirty="0" smtClean="0"/>
-              <a:t>Things I </a:t>
+              <a:t>What are regular expressions </a:t>
             </a:r>
             <a:r>
               <a:rPr lang="en-US" i="1" dirty="0" smtClean="0"/>
-              <a:t>didn’t</a:t>
-            </a:r>
-            <a:r>
-              <a:rPr lang="en-US" dirty="0" smtClean="0"/>
-              <a:t> mention…</a:t>
+              <a:t>not </a:t>
+            </a:r>
+            <a:r>
+              <a:rPr lang="en-US" dirty="0" smtClean="0"/>
+              <a:t>useful for?</a:t>
             </a:r>
             <a:endParaRPr lang="en-US" dirty="0"/>
           </a:p>
@@ -3934,20 +3995,29 @@
         </p:nvSpPr>
         <p:spPr/>
         <p:txBody>
-          <a:bodyPr/>
+          <a:bodyPr>
+            <a:normAutofit/>
+          </a:bodyPr>
           <a:lstStyle/>
           <a:p>
-            <a:pPr marL="0" indent="0">
-              <a:buNone/>
-            </a:pPr>
-            <a:endParaRPr lang="en-US" dirty="0" smtClean="0"/>
+            <a:r>
+              <a:rPr lang="en-US" dirty="0" smtClean="0"/>
+              <a:t>Prime number sieve</a:t>
+            </a:r>
+          </a:p>
+          <a:p>
+            <a:pPr lvl="1"/>
+            <a:r>
+              <a:rPr lang="en-US" dirty="0" smtClean="0"/>
+              <a:t>The right tool for the right job!</a:t>
+            </a:r>
           </a:p>
         </p:txBody>
       </p:sp>
     </p:spTree>
     <p:extLst>
       <p:ext uri="{BB962C8B-B14F-4D97-AF65-F5344CB8AC3E}">
-        <p14:creationId xmlns:p14="http://schemas.microsoft.com/office/powerpoint/2010/main" val="3192961759"/>
+        <p14:creationId xmlns:p14="http://schemas.microsoft.com/office/powerpoint/2010/main" val="1627161319"/>
       </p:ext>
     </p:extLst>
   </p:cSld>
@@ -3998,7 +4068,15 @@
           <a:p>
             <a:r>
               <a:rPr lang="en-US" dirty="0" smtClean="0"/>
-              <a:t>Useful resources</a:t>
+              <a:t>Things I </a:t>
+            </a:r>
+            <a:r>
+              <a:rPr lang="en-US" i="1" dirty="0" smtClean="0"/>
+              <a:t>didn’t</a:t>
+            </a:r>
+            <a:r>
+              <a:rPr lang="en-US" dirty="0" smtClean="0"/>
+              <a:t> mention…</a:t>
             </a:r>
             <a:endParaRPr lang="en-US" dirty="0"/>
           </a:p>
@@ -4016,34 +4094,35 @@
         </p:nvSpPr>
         <p:spPr/>
         <p:txBody>
-          <a:bodyPr>
-            <a:normAutofit/>
-          </a:bodyPr>
+          <a:bodyPr/>
           <a:lstStyle/>
           <a:p>
             <a:r>
-              <a:rPr lang="en-US" dirty="0">
-                <a:hlinkClick r:id="rId2"/>
-              </a:rPr>
-              <a:t>http://www.regular-expressions.info</a:t>
-            </a:r>
-            <a:r>
-              <a:rPr lang="en-US" dirty="0" smtClean="0">
-                <a:hlinkClick r:id="rId2"/>
-              </a:rPr>
-              <a:t>/</a:t>
-            </a:r>
-            <a:endParaRPr lang="en-US" dirty="0" smtClean="0"/>
-          </a:p>
-          <a:p>
-            <a:endParaRPr lang="en-US" dirty="0" smtClean="0"/>
+              <a:rPr lang="en-US" dirty="0"/>
+              <a:t>A couple different flavors with differences</a:t>
+            </a:r>
+          </a:p>
+          <a:p>
+            <a:pPr lvl="1"/>
+            <a:r>
+              <a:rPr lang="en-US" dirty="0"/>
+              <a:t>i.e. POSIX has [:alpha:] and [:blank:], vim uses \a and </a:t>
+            </a:r>
+            <a:r>
+              <a:rPr lang="en-US" dirty="0" smtClean="0"/>
+              <a:t>\</a:t>
+            </a:r>
+            <a:r>
+              <a:rPr lang="en-US" dirty="0"/>
+              <a:t>s</a:t>
+            </a:r>
           </a:p>
         </p:txBody>
       </p:sp>
     </p:spTree>
     <p:extLst>
       <p:ext uri="{BB962C8B-B14F-4D97-AF65-F5344CB8AC3E}">
-        <p14:creationId xmlns:p14="http://schemas.microsoft.com/office/powerpoint/2010/main" val="3584811499"/>
+        <p14:creationId xmlns:p14="http://schemas.microsoft.com/office/powerpoint/2010/main" val="3192961759"/>
       </p:ext>
     </p:extLst>
   </p:cSld>
@@ -4087,28 +4166,114 @@
             <p:ph type="title"/>
           </p:nvPr>
         </p:nvSpPr>
-        <p:spPr>
-          <a:xfrm>
-            <a:off x="457200" y="2874722"/>
-            <a:ext cx="8229600" cy="803756"/>
-          </a:xfrm>
-        </p:spPr>
+        <p:spPr/>
         <p:txBody>
           <a:bodyPr/>
           <a:lstStyle/>
           <a:p>
             <a:r>
               <a:rPr lang="en-US" dirty="0" smtClean="0"/>
-              <a:t>Thank you!</a:t>
+              <a:t>Useful resources</a:t>
             </a:r>
             <a:endParaRPr lang="en-US" dirty="0"/>
+          </a:p>
+        </p:txBody>
+      </p:sp>
+      <p:sp>
+        <p:nvSpPr>
+          <p:cNvPr id="3" name="Content Placeholder 2"/>
+          <p:cNvSpPr>
+            <a:spLocks noGrp="1"/>
+          </p:cNvSpPr>
+          <p:nvPr>
+            <p:ph idx="1"/>
+          </p:nvPr>
+        </p:nvSpPr>
+        <p:spPr/>
+        <p:txBody>
+          <a:bodyPr>
+            <a:normAutofit/>
+          </a:bodyPr>
+          <a:lstStyle/>
+          <a:p>
+            <a:r>
+              <a:rPr lang="en-US" dirty="0">
+                <a:hlinkClick r:id="rId2"/>
+              </a:rPr>
+              <a:t>http://www.regular-expressions.info</a:t>
+            </a:r>
+            <a:r>
+              <a:rPr lang="en-US" dirty="0" smtClean="0">
+                <a:hlinkClick r:id="rId2"/>
+              </a:rPr>
+              <a:t>/</a:t>
+            </a:r>
+            <a:endParaRPr lang="en-US" dirty="0" smtClean="0"/>
+          </a:p>
+          <a:p>
+            <a:r>
+              <a:rPr lang="en-US" dirty="0">
+                <a:hlinkClick r:id="rId3"/>
+              </a:rPr>
+              <a:t>http://</a:t>
+            </a:r>
+            <a:r>
+              <a:rPr lang="en-US" dirty="0" smtClean="0">
+                <a:hlinkClick r:id="rId3"/>
+              </a:rPr>
+              <a:t>www.zytrax.com/tech/web/regex.htm</a:t>
+            </a:r>
+            <a:r>
+              <a:rPr lang="en-US" dirty="0" smtClean="0"/>
+              <a:t> </a:t>
+            </a:r>
+            <a:endParaRPr lang="en-US" dirty="0" smtClean="0"/>
+          </a:p>
+          <a:p>
+            <a:r>
+              <a:rPr lang="en-US" dirty="0">
+                <a:hlinkClick r:id="rId4"/>
+              </a:rPr>
+              <a:t>https://www.gnu.org/software/gawk/manual</a:t>
+            </a:r>
+            <a:r>
+              <a:rPr lang="en-US" dirty="0" smtClean="0">
+                <a:hlinkClick r:id="rId4"/>
+              </a:rPr>
+              <a:t>/</a:t>
+            </a:r>
+            <a:endParaRPr lang="en-US" dirty="0" smtClean="0"/>
+          </a:p>
+          <a:p>
+            <a:r>
+              <a:rPr lang="en-US" dirty="0" smtClean="0">
+                <a:hlinkClick r:id="rId5"/>
+              </a:rPr>
+              <a:t>https</a:t>
+            </a:r>
+            <a:r>
+              <a:rPr lang="en-US" dirty="0">
+                <a:hlinkClick r:id="rId5"/>
+              </a:rPr>
+              <a:t>://</a:t>
+            </a:r>
+            <a:r>
+              <a:rPr lang="en-US" dirty="0" smtClean="0">
+                <a:hlinkClick r:id="rId5"/>
+              </a:rPr>
+              <a:t>docs.python.org/3/library/re.html</a:t>
+            </a:r>
+            <a:endParaRPr lang="en-US" dirty="0" smtClean="0"/>
+          </a:p>
+          <a:p>
+            <a:endParaRPr lang="en-US" dirty="0" smtClean="0"/>
           </a:p>
         </p:txBody>
       </p:sp>
     </p:spTree>
     <p:extLst>
       <p:ext uri="{BB962C8B-B14F-4D97-AF65-F5344CB8AC3E}">
-        <p14:creationId xmlns:p14="http://schemas.microsoft.com/office/powerpoint/2010/main" val="1844849267"/>
+        <p14:creationId xmlns:p14="http://schemas.microsoft.com/office/powerpoint/2010/main" val="3584811499"/>
       </p:ext>
     </p:extLst>
   </p:cSld>
@@ -4152,28 +4317,80 @@
             <p:ph type="title"/>
           </p:nvPr>
         </p:nvSpPr>
-        <p:spPr>
-          <a:xfrm>
-            <a:off x="457200" y="2874722"/>
-            <a:ext cx="8229600" cy="803756"/>
-          </a:xfrm>
-        </p:spPr>
+        <p:spPr/>
         <p:txBody>
           <a:bodyPr/>
           <a:lstStyle/>
           <a:p>
             <a:r>
               <a:rPr lang="en-US" dirty="0" smtClean="0"/>
-              <a:t>Feedback?</a:t>
+              <a:t>Slightly less useful </a:t>
+            </a:r>
+            <a:r>
+              <a:rPr lang="en-US" dirty="0" smtClean="0"/>
+              <a:t>resources</a:t>
             </a:r>
             <a:endParaRPr lang="en-US" dirty="0"/>
+          </a:p>
+        </p:txBody>
+      </p:sp>
+      <p:sp>
+        <p:nvSpPr>
+          <p:cNvPr id="3" name="Content Placeholder 2"/>
+          <p:cNvSpPr>
+            <a:spLocks noGrp="1"/>
+          </p:cNvSpPr>
+          <p:nvPr>
+            <p:ph idx="1"/>
+          </p:nvPr>
+        </p:nvSpPr>
+        <p:spPr/>
+        <p:txBody>
+          <a:bodyPr>
+            <a:normAutofit/>
+          </a:bodyPr>
+          <a:lstStyle/>
+          <a:p>
+            <a:r>
+              <a:rPr lang="en-US" dirty="0">
+                <a:hlinkClick r:id="rId2"/>
+              </a:rPr>
+              <a:t>https://swtch.com/~rsc/regexp/regexp1.html</a:t>
+            </a:r>
+          </a:p>
+          <a:p>
+            <a:r>
+              <a:rPr lang="en-US" dirty="0" smtClean="0">
+                <a:hlinkClick r:id="rId2"/>
+              </a:rPr>
+              <a:t>https</a:t>
+            </a:r>
+            <a:r>
+              <a:rPr lang="en-US" dirty="0">
+                <a:hlinkClick r:id="rId2"/>
+              </a:rPr>
+              <a:t>://www.gamedev.net/resources/_/</a:t>
+            </a:r>
+            <a:r>
+              <a:rPr lang="en-US" dirty="0" smtClean="0">
+                <a:hlinkClick r:id="rId2"/>
+              </a:rPr>
+              <a:t>technical/general-programming/finite-state-machines-and-regular-expressions-r3176</a:t>
+            </a:r>
+            <a:r>
+              <a:rPr lang="en-US" dirty="0" smtClean="0"/>
+              <a:t> </a:t>
+            </a:r>
+          </a:p>
+          <a:p>
+            <a:endParaRPr lang="en-US" dirty="0" smtClean="0"/>
           </a:p>
         </p:txBody>
       </p:sp>
     </p:spTree>
     <p:extLst>
       <p:ext uri="{BB962C8B-B14F-4D97-AF65-F5344CB8AC3E}">
-        <p14:creationId xmlns:p14="http://schemas.microsoft.com/office/powerpoint/2010/main" val="891265136"/>
+        <p14:creationId xmlns:p14="http://schemas.microsoft.com/office/powerpoint/2010/main" val="4232062310"/>
       </p:ext>
     </p:extLst>
   </p:cSld>
@@ -4398,6 +4615,136 @@
             <p:ph type="title"/>
           </p:nvPr>
         </p:nvSpPr>
+        <p:spPr>
+          <a:xfrm>
+            <a:off x="457200" y="2874722"/>
+            <a:ext cx="8229600" cy="803756"/>
+          </a:xfrm>
+        </p:spPr>
+        <p:txBody>
+          <a:bodyPr/>
+          <a:lstStyle/>
+          <a:p>
+            <a:r>
+              <a:rPr lang="en-US" dirty="0" smtClean="0"/>
+              <a:t>Thank you!</a:t>
+            </a:r>
+            <a:endParaRPr lang="en-US" dirty="0"/>
+          </a:p>
+        </p:txBody>
+      </p:sp>
+    </p:spTree>
+    <p:extLst>
+      <p:ext uri="{BB962C8B-B14F-4D97-AF65-F5344CB8AC3E}">
+        <p14:creationId xmlns:p14="http://schemas.microsoft.com/office/powerpoint/2010/main" val="1844849267"/>
+      </p:ext>
+    </p:extLst>
+  </p:cSld>
+  <p:clrMapOvr>
+    <a:masterClrMapping/>
+  </p:clrMapOvr>
+  <p:timing>
+    <p:tnLst>
+      <p:par>
+        <p:cTn id="1" dur="indefinite" restart="never" nodeType="tmRoot"/>
+      </p:par>
+    </p:tnLst>
+  </p:timing>
+</p:sld>
+</file>
+
+<file path=ppt/slides/slide21.xml><?xml version="1.0" encoding="utf-8"?>
+<p:sld xmlns:a="http://schemas.openxmlformats.org/drawingml/2006/main" xmlns:r="http://schemas.openxmlformats.org/officeDocument/2006/relationships" xmlns:p="http://schemas.openxmlformats.org/presentationml/2006/main">
+  <p:cSld>
+    <p:spTree>
+      <p:nvGrpSpPr>
+        <p:cNvPr id="1" name=""/>
+        <p:cNvGrpSpPr/>
+        <p:nvPr/>
+      </p:nvGrpSpPr>
+      <p:grpSpPr>
+        <a:xfrm>
+          <a:off x="0" y="0"/>
+          <a:ext cx="0" cy="0"/>
+          <a:chOff x="0" y="0"/>
+          <a:chExt cx="0" cy="0"/>
+        </a:xfrm>
+      </p:grpSpPr>
+      <p:sp>
+        <p:nvSpPr>
+          <p:cNvPr id="2" name="Title 1"/>
+          <p:cNvSpPr>
+            <a:spLocks noGrp="1"/>
+          </p:cNvSpPr>
+          <p:nvPr>
+            <p:ph type="title"/>
+          </p:nvPr>
+        </p:nvSpPr>
+        <p:spPr>
+          <a:xfrm>
+            <a:off x="457200" y="2874722"/>
+            <a:ext cx="8229600" cy="803756"/>
+          </a:xfrm>
+        </p:spPr>
+        <p:txBody>
+          <a:bodyPr/>
+          <a:lstStyle/>
+          <a:p>
+            <a:r>
+              <a:rPr lang="en-US" dirty="0" smtClean="0"/>
+              <a:t>Feedback?</a:t>
+            </a:r>
+            <a:endParaRPr lang="en-US" dirty="0"/>
+          </a:p>
+        </p:txBody>
+      </p:sp>
+    </p:spTree>
+    <p:extLst>
+      <p:ext uri="{BB962C8B-B14F-4D97-AF65-F5344CB8AC3E}">
+        <p14:creationId xmlns:p14="http://schemas.microsoft.com/office/powerpoint/2010/main" val="891265136"/>
+      </p:ext>
+    </p:extLst>
+  </p:cSld>
+  <p:clrMapOvr>
+    <a:masterClrMapping/>
+  </p:clrMapOvr>
+  <p:timing>
+    <p:tnLst>
+      <p:par>
+        <p:cTn id="1" dur="indefinite" restart="never" nodeType="tmRoot"/>
+      </p:par>
+    </p:tnLst>
+  </p:timing>
+</p:sld>
+</file>
+
+<file path=ppt/slides/slide22.xml><?xml version="1.0" encoding="utf-8"?>
+<p:sld xmlns:a="http://schemas.openxmlformats.org/drawingml/2006/main" xmlns:r="http://schemas.openxmlformats.org/officeDocument/2006/relationships" xmlns:p="http://schemas.openxmlformats.org/presentationml/2006/main">
+  <p:cSld>
+    <p:spTree>
+      <p:nvGrpSpPr>
+        <p:cNvPr id="1" name=""/>
+        <p:cNvGrpSpPr/>
+        <p:nvPr/>
+      </p:nvGrpSpPr>
+      <p:grpSpPr>
+        <a:xfrm>
+          <a:off x="0" y="0"/>
+          <a:ext cx="0" cy="0"/>
+          <a:chOff x="0" y="0"/>
+          <a:chExt cx="0" cy="0"/>
+        </a:xfrm>
+      </p:grpSpPr>
+      <p:sp>
+        <p:nvSpPr>
+          <p:cNvPr id="2" name="Title 1"/>
+          <p:cNvSpPr>
+            <a:spLocks noGrp="1"/>
+          </p:cNvSpPr>
+          <p:nvPr>
+            <p:ph type="title"/>
+          </p:nvPr>
+        </p:nvSpPr>
         <p:spPr/>
         <p:txBody>
           <a:bodyPr/>
@@ -5361,8 +5708,8 @@
           <a:lstStyle/>
           <a:p>
             <a:r>
-              <a:rPr lang="en-US" dirty="0" smtClean="0"/>
-              <a:t>What are regular expressions (regex)?</a:t>
+              <a:rPr lang="en-US" dirty="0" err="1" smtClean="0"/>
+              <a:t>Metacharacters</a:t>
             </a:r>
             <a:endParaRPr lang="en-US" dirty="0"/>
           </a:p>
@@ -5377,13 +5724,13 @@
           <p:nvPr>
             <p:extLst>
               <p:ext uri="{D42A27DB-BD31-4B8C-83A1-F6EECF244321}">
-                <p14:modId xmlns:p14="http://schemas.microsoft.com/office/powerpoint/2010/main" val="3541944056"/>
+                <p14:modId xmlns:p14="http://schemas.microsoft.com/office/powerpoint/2010/main" val="1314322627"/>
               </p:ext>
             </p:extLst>
           </p:nvPr>
         </p:nvGraphicFramePr>
         <p:xfrm>
-          <a:off x="489246" y="2238998"/>
+          <a:off x="521293" y="1717846"/>
           <a:ext cx="8165507" cy="4361747"/>
         </p:xfrm>
         <a:graphic>
@@ -5857,6 +6204,36 @@
           </a:graphicData>
         </a:graphic>
       </p:graphicFrame>
+      <p:sp>
+        <p:nvSpPr>
+          <p:cNvPr id="5" name="TextBox 4"/>
+          <p:cNvSpPr txBox="1"/>
+          <p:nvPr/>
+        </p:nvSpPr>
+        <p:spPr>
+          <a:xfrm>
+            <a:off x="1269422" y="6079593"/>
+            <a:ext cx="6669247" cy="369332"/>
+          </a:xfrm>
+          <a:prstGeom prst="rect">
+            <a:avLst/>
+          </a:prstGeom>
+          <a:noFill/>
+        </p:spPr>
+        <p:txBody>
+          <a:bodyPr wrap="square" rtlCol="0">
+            <a:spAutoFit/>
+          </a:bodyPr>
+          <a:lstStyle/>
+          <a:p>
+            <a:r>
+              <a:rPr lang="en-US" dirty="0" smtClean="0"/>
+              <a:t>Any of these can be matched literally by escaping them, e.g. \*</a:t>
+            </a:r>
+            <a:endParaRPr lang="en-US" dirty="0"/>
+          </a:p>
+        </p:txBody>
+      </p:sp>
     </p:spTree>
     <p:extLst>
       <p:ext uri="{BB962C8B-B14F-4D97-AF65-F5344CB8AC3E}">

</xml_diff>

<commit_message>
Added sed, grep, vim, awk slides and fleshed others out
</commit_message>
<xml_diff>
--- a/2017/computing_workgroup/regex/regular_expressions.pptx
+++ b/2017/computing_workgroup/regex/regular_expressions.pptx
@@ -5,7 +5,7 @@
     <p:sldMasterId id="2147483648" r:id="rId1"/>
   </p:sldMasterIdLst>
   <p:notesMasterIdLst>
-    <p:notesMasterId r:id="rId24"/>
+    <p:notesMasterId r:id="rId28"/>
   </p:notesMasterIdLst>
   <p:sldIdLst>
     <p:sldId id="256" r:id="rId2"/>
@@ -21,15 +21,19 @@
     <p:sldId id="383" r:id="rId12"/>
     <p:sldId id="377" r:id="rId13"/>
     <p:sldId id="376" r:id="rId14"/>
-    <p:sldId id="384" r:id="rId15"/>
-    <p:sldId id="373" r:id="rId16"/>
-    <p:sldId id="375" r:id="rId17"/>
-    <p:sldId id="368" r:id="rId18"/>
-    <p:sldId id="341" r:id="rId19"/>
-    <p:sldId id="385" r:id="rId20"/>
-    <p:sldId id="339" r:id="rId21"/>
-    <p:sldId id="366" r:id="rId22"/>
-    <p:sldId id="340" r:id="rId23"/>
+    <p:sldId id="387" r:id="rId15"/>
+    <p:sldId id="386" r:id="rId16"/>
+    <p:sldId id="390" r:id="rId17"/>
+    <p:sldId id="388" r:id="rId18"/>
+    <p:sldId id="384" r:id="rId19"/>
+    <p:sldId id="373" r:id="rId20"/>
+    <p:sldId id="375" r:id="rId21"/>
+    <p:sldId id="368" r:id="rId22"/>
+    <p:sldId id="341" r:id="rId23"/>
+    <p:sldId id="385" r:id="rId24"/>
+    <p:sldId id="339" r:id="rId25"/>
+    <p:sldId id="366" r:id="rId26"/>
+    <p:sldId id="340" r:id="rId27"/>
   </p:sldIdLst>
   <p:sldSz cx="9144000" cy="6858000" type="screen4x3"/>
   <p:notesSz cx="6858000" cy="9144000"/>
@@ -229,7 +233,7 @@
           <a:p>
             <a:fld id="{6096A192-89F2-44C6-B07F-1B83CE44D511}" type="datetimeFigureOut">
               <a:rPr lang="en-US" smtClean="0"/>
-              <a:t>1/24/2017</a:t>
+              <a:t>1/25/2017</a:t>
             </a:fld>
             <a:endParaRPr lang="en-US"/>
           </a:p>
@@ -581,6 +585,90 @@
 </p:notes>
 </file>
 
+<file path=ppt/notesSlides/notesSlide2.xml><?xml version="1.0" encoding="utf-8"?>
+<p:notes xmlns:a="http://schemas.openxmlformats.org/drawingml/2006/main" xmlns:r="http://schemas.openxmlformats.org/officeDocument/2006/relationships" xmlns:p="http://schemas.openxmlformats.org/presentationml/2006/main">
+  <p:cSld>
+    <p:spTree>
+      <p:nvGrpSpPr>
+        <p:cNvPr id="1" name=""/>
+        <p:cNvGrpSpPr/>
+        <p:nvPr/>
+      </p:nvGrpSpPr>
+      <p:grpSpPr>
+        <a:xfrm>
+          <a:off x="0" y="0"/>
+          <a:ext cx="0" cy="0"/>
+          <a:chOff x="0" y="0"/>
+          <a:chExt cx="0" cy="0"/>
+        </a:xfrm>
+      </p:grpSpPr>
+      <p:sp>
+        <p:nvSpPr>
+          <p:cNvPr id="2" name="Slide Image Placeholder 1"/>
+          <p:cNvSpPr>
+            <a:spLocks noGrp="1" noRot="1" noChangeAspect="1"/>
+          </p:cNvSpPr>
+          <p:nvPr>
+            <p:ph type="sldImg"/>
+          </p:nvPr>
+        </p:nvSpPr>
+        <p:spPr/>
+      </p:sp>
+      <p:sp>
+        <p:nvSpPr>
+          <p:cNvPr id="3" name="Notes Placeholder 2"/>
+          <p:cNvSpPr>
+            <a:spLocks noGrp="1"/>
+          </p:cNvSpPr>
+          <p:nvPr>
+            <p:ph type="body" idx="1"/>
+          </p:nvPr>
+        </p:nvSpPr>
+        <p:spPr/>
+        <p:txBody>
+          <a:bodyPr/>
+          <a:lstStyle/>
+          <a:p>
+            <a:endParaRPr lang="en-US"/>
+          </a:p>
+        </p:txBody>
+      </p:sp>
+      <p:sp>
+        <p:nvSpPr>
+          <p:cNvPr id="4" name="Slide Number Placeholder 3"/>
+          <p:cNvSpPr>
+            <a:spLocks noGrp="1"/>
+          </p:cNvSpPr>
+          <p:nvPr>
+            <p:ph type="sldNum" sz="quarter" idx="10"/>
+          </p:nvPr>
+        </p:nvSpPr>
+        <p:spPr/>
+        <p:txBody>
+          <a:bodyPr/>
+          <a:lstStyle/>
+          <a:p>
+            <a:fld id="{27D32F87-7895-4624-A4AE-ACD3588F6EDE}" type="slidenum">
+              <a:rPr lang="en-US" smtClean="0"/>
+              <a:t>20</a:t>
+            </a:fld>
+            <a:endParaRPr lang="en-US"/>
+          </a:p>
+        </p:txBody>
+      </p:sp>
+    </p:spTree>
+    <p:extLst>
+      <p:ext uri="{BB962C8B-B14F-4D97-AF65-F5344CB8AC3E}">
+        <p14:creationId xmlns:p14="http://schemas.microsoft.com/office/powerpoint/2010/main" val="1596284501"/>
+      </p:ext>
+    </p:extLst>
+  </p:cSld>
+  <p:clrMapOvr>
+    <a:masterClrMapping/>
+  </p:clrMapOvr>
+</p:notes>
+</file>
+
 <file path=ppt/slideLayouts/slideLayout1.xml><?xml version="1.0" encoding="utf-8"?>
 <p:sldLayout xmlns:a="http://schemas.openxmlformats.org/drawingml/2006/main" xmlns:r="http://schemas.openxmlformats.org/officeDocument/2006/relationships" xmlns:p="http://schemas.openxmlformats.org/presentationml/2006/main" type="title" preserve="1">
   <p:cSld name="Title Slide">
@@ -790,7 +878,7 @@
           <a:p>
             <a:fld id="{7181039F-CB0C-E14D-A7EF-3BACE2CEF4EA}" type="datetimeFigureOut">
               <a:rPr lang="en-US" smtClean="0"/>
-              <a:t>1/24/2017</a:t>
+              <a:t>1/25/2017</a:t>
             </a:fld>
             <a:endParaRPr lang="en-US"/>
           </a:p>
@@ -1050,7 +1138,7 @@
           <a:p>
             <a:fld id="{7181039F-CB0C-E14D-A7EF-3BACE2CEF4EA}" type="datetimeFigureOut">
               <a:rPr lang="en-US" smtClean="0"/>
-              <a:t>1/24/2017</a:t>
+              <a:t>1/25/2017</a:t>
             </a:fld>
             <a:endParaRPr lang="en-US"/>
           </a:p>
@@ -1315,7 +1403,7 @@
           <a:p>
             <a:fld id="{7181039F-CB0C-E14D-A7EF-3BACE2CEF4EA}" type="datetimeFigureOut">
               <a:rPr lang="en-US" smtClean="0"/>
-              <a:t>1/24/2017</a:t>
+              <a:t>1/25/2017</a:t>
             </a:fld>
             <a:endParaRPr lang="en-US"/>
           </a:p>
@@ -1478,7 +1566,7 @@
           <a:p>
             <a:fld id="{7181039F-CB0C-E14D-A7EF-3BACE2CEF4EA}" type="datetimeFigureOut">
               <a:rPr lang="en-US" smtClean="0"/>
-              <a:t>1/24/2017</a:t>
+              <a:t>1/25/2017</a:t>
             </a:fld>
             <a:endParaRPr lang="en-US"/>
           </a:p>
@@ -1755,7 +1843,7 @@
           <a:p>
             <a:fld id="{7181039F-CB0C-E14D-A7EF-3BACE2CEF4EA}" type="datetimeFigureOut">
               <a:rPr lang="en-US" smtClean="0"/>
-              <a:t>1/24/2017</a:t>
+              <a:t>1/25/2017</a:t>
             </a:fld>
             <a:endParaRPr lang="en-US"/>
           </a:p>
@@ -2014,7 +2102,7 @@
           <a:p>
             <a:fld id="{7181039F-CB0C-E14D-A7EF-3BACE2CEF4EA}" type="datetimeFigureOut">
               <a:rPr lang="en-US" smtClean="0"/>
-              <a:t>1/24/2017</a:t>
+              <a:t>1/25/2017</a:t>
             </a:fld>
             <a:endParaRPr lang="en-US"/>
           </a:p>
@@ -2227,7 +2315,7 @@
           <a:p>
             <a:fld id="{7181039F-CB0C-E14D-A7EF-3BACE2CEF4EA}" type="datetimeFigureOut">
               <a:rPr lang="en-US" smtClean="0"/>
-              <a:t>1/24/2017</a:t>
+              <a:t>1/25/2017</a:t>
             </a:fld>
             <a:endParaRPr lang="en-US"/>
           </a:p>
@@ -3468,7 +3556,12 @@
             <p:ph idx="1"/>
           </p:nvPr>
         </p:nvSpPr>
-        <p:spPr/>
+        <p:spPr>
+          <a:xfrm>
+            <a:off x="446314" y="2049270"/>
+            <a:ext cx="8229600" cy="4076893"/>
+          </a:xfrm>
+        </p:spPr>
         <p:txBody>
           <a:bodyPr>
             <a:normAutofit/>
@@ -3502,20 +3595,24 @@
           </a:p>
           <a:p>
             <a:r>
-              <a:rPr lang="en-US" dirty="0">
-                <a:hlinkClick r:id="rId2"/>
-              </a:rPr>
-              <a:t>http://</a:t>
-            </a:r>
-            <a:r>
-              <a:rPr lang="en-US" dirty="0" smtClean="0">
-                <a:hlinkClick r:id="rId2"/>
-              </a:rPr>
-              <a:t>stackstatus.net/post/147710624694/outage-postmortem-july-20-2016</a:t>
-            </a:r>
-            <a:r>
-              <a:rPr lang="en-US" dirty="0" smtClean="0"/>
-              <a:t> </a:t>
+              <a:rPr lang="en-US" dirty="0" smtClean="0"/>
+              <a:t>An example: /</a:t>
+            </a:r>
+            <a:r>
+              <a:rPr lang="en-US" dirty="0"/>
+              <a:t>q(?!u</a:t>
+            </a:r>
+            <a:r>
+              <a:rPr lang="en-US" dirty="0" smtClean="0"/>
+              <a:t>)/ will match any ‘q’ not followed by a ‘u’ (a feature called </a:t>
+            </a:r>
+            <a:r>
+              <a:rPr lang="en-US" dirty="0" err="1" smtClean="0"/>
+              <a:t>lookahead</a:t>
+            </a:r>
+            <a:r>
+              <a:rPr lang="en-US" dirty="0" smtClean="0"/>
+              <a:t>)</a:t>
             </a:r>
           </a:p>
         </p:txBody>
@@ -3627,34 +3724,15 @@
             <a:pPr lvl="1"/>
             <a:r>
               <a:rPr lang="en-US" dirty="0" smtClean="0"/>
-              <a:t>Many command-line tools let you use them!</a:t>
+              <a:t>Many command-line tools let you use them</a:t>
+            </a:r>
+            <a:r>
+              <a:rPr lang="en-US" dirty="0" smtClean="0"/>
+              <a:t>!</a:t>
             </a:r>
           </a:p>
           <a:p>
             <a:pPr lvl="1"/>
-            <a:r>
-              <a:rPr lang="en-US" dirty="0" smtClean="0"/>
-              <a:t>Grep, </a:t>
-            </a:r>
-            <a:r>
-              <a:rPr lang="en-US" dirty="0" err="1" smtClean="0"/>
-              <a:t>sed</a:t>
-            </a:r>
-            <a:r>
-              <a:rPr lang="en-US" dirty="0" smtClean="0"/>
-              <a:t>, vim</a:t>
-            </a:r>
-          </a:p>
-          <a:p>
-            <a:pPr lvl="1"/>
-            <a:r>
-              <a:rPr lang="en-US" dirty="0" smtClean="0"/>
-              <a:t>See Peter’s notes on </a:t>
-            </a:r>
-            <a:r>
-              <a:rPr lang="en-US" smtClean="0"/>
-              <a:t>awk</a:t>
-            </a:r>
             <a:endParaRPr lang="en-US" dirty="0" smtClean="0"/>
           </a:p>
         </p:txBody>
@@ -3712,8 +3790,8 @@
           <a:lstStyle/>
           <a:p>
             <a:r>
-              <a:rPr lang="en-US" dirty="0" smtClean="0"/>
-              <a:t>What are regular expressions useful for?</a:t>
+              <a:rPr lang="en-US" dirty="0" err="1" smtClean="0"/>
+              <a:t>sed</a:t>
             </a:r>
             <a:endParaRPr lang="en-US" dirty="0"/>
           </a:p>
@@ -3729,7 +3807,12 @@
             <p:ph idx="1"/>
           </p:nvPr>
         </p:nvSpPr>
-        <p:spPr/>
+        <p:spPr>
+          <a:xfrm>
+            <a:off x="457200" y="2891938"/>
+            <a:ext cx="8229600" cy="3234225"/>
+          </a:xfrm>
+        </p:spPr>
         <p:txBody>
           <a:bodyPr>
             <a:normAutofit/>
@@ -3738,75 +3821,108 @@
           <a:p>
             <a:r>
               <a:rPr lang="en-US" dirty="0" smtClean="0"/>
-              <a:t>Hands-on examples, one or two with grep and </a:t>
+              <a:t>Very powerful for one-liners, but somewhat esoteric commands</a:t>
+            </a:r>
+          </a:p>
+          <a:p>
+            <a:r>
+              <a:rPr lang="en-US" dirty="0" smtClean="0"/>
+              <a:t>Common commands/flags: </a:t>
+            </a:r>
+          </a:p>
+          <a:p>
+            <a:pPr lvl="1"/>
+            <a:r>
+              <a:rPr lang="en-US" dirty="0" smtClean="0"/>
+              <a:t>s/match/replace/</a:t>
             </a:r>
             <a:r>
               <a:rPr lang="en-US" dirty="0" err="1" smtClean="0"/>
+              <a:t>gi</a:t>
+            </a:r>
+            <a:endParaRPr lang="en-US" dirty="0" smtClean="0"/>
+          </a:p>
+          <a:p>
+            <a:pPr lvl="1"/>
+            <a:r>
+              <a:rPr lang="en-US" dirty="0"/>
+              <a:t>g</a:t>
+            </a:r>
+            <a:r>
+              <a:rPr lang="en-US" dirty="0" smtClean="0"/>
+              <a:t>/match/p</a:t>
+            </a:r>
+            <a:endParaRPr lang="en-US" dirty="0" smtClean="0"/>
+          </a:p>
+        </p:txBody>
+      </p:sp>
+      <p:sp>
+        <p:nvSpPr>
+          <p:cNvPr id="4" name="TextBox 3"/>
+          <p:cNvSpPr txBox="1"/>
+          <p:nvPr/>
+        </p:nvSpPr>
+        <p:spPr>
+          <a:xfrm>
+            <a:off x="457201" y="2049270"/>
+            <a:ext cx="8229599" cy="646331"/>
+          </a:xfrm>
+          <a:prstGeom prst="rect">
+            <a:avLst/>
+          </a:prstGeom>
+          <a:solidFill>
+            <a:schemeClr val="tx1"/>
+          </a:solidFill>
+        </p:spPr>
+        <p:txBody>
+          <a:bodyPr wrap="square" rtlCol="0">
+            <a:spAutoFit/>
+          </a:bodyPr>
+          <a:lstStyle/>
+          <a:p>
+            <a:r>
+              <a:rPr lang="en-US" dirty="0">
+                <a:solidFill>
+                  <a:schemeClr val="bg1">
+                    <a:lumMod val="85000"/>
+                  </a:schemeClr>
+                </a:solidFill>
+                <a:latin typeface="Consolas" panose="020B0609020204030204" pitchFamily="49" charset="0"/>
+                <a:cs typeface="Consolas" panose="020B0609020204030204" pitchFamily="49" charset="0"/>
+              </a:rPr>
+              <a:t>Usage: </a:t>
+            </a:r>
+            <a:r>
+              <a:rPr lang="en-US" dirty="0" err="1">
+                <a:solidFill>
+                  <a:schemeClr val="bg1">
+                    <a:lumMod val="85000"/>
+                  </a:schemeClr>
+                </a:solidFill>
+                <a:latin typeface="Consolas" panose="020B0609020204030204" pitchFamily="49" charset="0"/>
+                <a:cs typeface="Consolas" panose="020B0609020204030204" pitchFamily="49" charset="0"/>
+              </a:rPr>
               <a:t>sed</a:t>
             </a:r>
             <a:r>
-              <a:rPr lang="en-US" dirty="0" smtClean="0"/>
-              <a:t>, two with Python</a:t>
-            </a:r>
-          </a:p>
-          <a:p>
-            <a:pPr lvl="1"/>
-            <a:r>
-              <a:rPr lang="en-US" dirty="0"/>
-              <a:t>Matching a time</a:t>
-            </a:r>
-          </a:p>
-          <a:p>
-            <a:pPr lvl="1"/>
-            <a:r>
-              <a:rPr lang="en-US" dirty="0" smtClean="0"/>
-              <a:t>Matching a mm/</a:t>
-            </a:r>
-            <a:r>
-              <a:rPr lang="en-US" dirty="0" err="1" smtClean="0"/>
-              <a:t>dd</a:t>
-            </a:r>
-            <a:r>
-              <a:rPr lang="en-US" dirty="0" smtClean="0"/>
-              <a:t>/</a:t>
-            </a:r>
-            <a:r>
-              <a:rPr lang="en-US" dirty="0" err="1" smtClean="0"/>
-              <a:t>yyyy</a:t>
-            </a:r>
-            <a:r>
-              <a:rPr lang="en-US" dirty="0" smtClean="0"/>
-              <a:t> date</a:t>
-            </a:r>
-          </a:p>
-          <a:p>
-            <a:pPr lvl="1"/>
-            <a:r>
-              <a:rPr lang="en-US" dirty="0" smtClean="0"/>
-              <a:t>Matching a phone number</a:t>
-            </a:r>
-          </a:p>
-          <a:p>
-            <a:pPr lvl="1"/>
-            <a:r>
-              <a:rPr lang="en-US" dirty="0" smtClean="0"/>
-              <a:t>Matching a repeated string</a:t>
-            </a:r>
-          </a:p>
-          <a:p>
-            <a:pPr lvl="1"/>
-            <a:endParaRPr lang="en-US" dirty="0" smtClean="0"/>
-          </a:p>
-          <a:p>
-            <a:pPr lvl="1"/>
-            <a:endParaRPr lang="en-US" dirty="0" smtClean="0"/>
+              <a:rPr lang="en-US" dirty="0">
+                <a:solidFill>
+                  <a:schemeClr val="bg1">
+                    <a:lumMod val="85000"/>
+                  </a:schemeClr>
+                </a:solidFill>
+                <a:latin typeface="Consolas" panose="020B0609020204030204" pitchFamily="49" charset="0"/>
+                <a:cs typeface="Consolas" panose="020B0609020204030204" pitchFamily="49" charset="0"/>
+              </a:rPr>
+              <a:t> [OPTION]... {script-only-if-no-other-script} [input-file]...</a:t>
+            </a:r>
           </a:p>
         </p:txBody>
       </p:sp>
     </p:spTree>
     <p:extLst>
       <p:ext uri="{BB962C8B-B14F-4D97-AF65-F5344CB8AC3E}">
-        <p14:creationId xmlns:p14="http://schemas.microsoft.com/office/powerpoint/2010/main" val="2307021946"/>
+        <p14:creationId xmlns:p14="http://schemas.microsoft.com/office/powerpoint/2010/main" val="2558705579"/>
       </p:ext>
     </p:extLst>
   </p:cSld>
@@ -3856,8 +3972,12 @@
           <a:lstStyle/>
           <a:p>
             <a:r>
-              <a:rPr lang="en-US" dirty="0" smtClean="0"/>
-              <a:t>Regex in Python</a:t>
+              <a:rPr lang="en-US" dirty="0"/>
+              <a:t>g</a:t>
+            </a:r>
+            <a:r>
+              <a:rPr lang="en-US" dirty="0" smtClean="0"/>
+              <a:t>rep</a:t>
             </a:r>
             <a:endParaRPr lang="en-US" dirty="0"/>
           </a:p>
@@ -3873,76 +3993,266 @@
             <p:ph idx="1"/>
           </p:nvPr>
         </p:nvSpPr>
-        <p:spPr/>
+        <p:spPr>
+          <a:xfrm>
+            <a:off x="457200" y="4027714"/>
+            <a:ext cx="8229600" cy="2098449"/>
+          </a:xfrm>
+        </p:spPr>
         <p:txBody>
           <a:bodyPr>
-            <a:normAutofit lnSpcReduction="10000"/>
+            <a:normAutofit/>
           </a:bodyPr>
           <a:lstStyle/>
           <a:p>
             <a:r>
               <a:rPr lang="en-US" dirty="0" smtClean="0"/>
-              <a:t>`re` module</a:t>
-            </a:r>
-          </a:p>
-          <a:p>
-            <a:r>
-              <a:rPr lang="en-US" dirty="0" smtClean="0"/>
-              <a:t>Match objects are the return value</a:t>
-            </a:r>
-          </a:p>
-          <a:p>
-            <a:pPr lvl="1"/>
-            <a:r>
-              <a:rPr lang="en-US" dirty="0" smtClean="0"/>
-              <a:t>In particular, groups() is very useful</a:t>
-            </a:r>
-          </a:p>
-          <a:p>
-            <a:r>
-              <a:rPr lang="en-US" dirty="0" smtClean="0"/>
-              <a:t>Flags like case insensitivity</a:t>
-            </a:r>
-          </a:p>
-          <a:p>
-            <a:r>
-              <a:rPr lang="en-US" dirty="0" smtClean="0"/>
-              <a:t>Replacement (mention `</a:t>
+              <a:t>Named for </a:t>
             </a:r>
             <a:r>
               <a:rPr lang="en-US" dirty="0" err="1" smtClean="0"/>
-              <a:t>str.replace</a:t>
-            </a:r>
-            <a:r>
-              <a:rPr lang="en-US" dirty="0" smtClean="0"/>
-              <a:t>()`)</a:t>
-            </a:r>
-          </a:p>
-          <a:p>
-            <a:r>
-              <a:rPr lang="en-US" dirty="0" smtClean="0"/>
-              <a:t>Pre-compiled regex if you use one frequently</a:t>
-            </a:r>
-          </a:p>
-          <a:p>
-            <a:pPr lvl="1"/>
-            <a:r>
-              <a:rPr lang="en-US" dirty="0" smtClean="0"/>
-              <a:t>Show a timing test?</a:t>
+              <a:t>sed</a:t>
+            </a:r>
+            <a:r>
+              <a:rPr lang="en-US" dirty="0" smtClean="0"/>
+              <a:t> mnemonic g/re/p</a:t>
+            </a:r>
+          </a:p>
+          <a:p>
+            <a:r>
+              <a:rPr lang="en-US" dirty="0" smtClean="0"/>
+              <a:t>Useful flags: -A, -B, -C, -</a:t>
+            </a:r>
+            <a:r>
+              <a:rPr lang="en-US" dirty="0" err="1" smtClean="0"/>
+              <a:t>i</a:t>
+            </a:r>
+            <a:r>
+              <a:rPr lang="en-US" dirty="0" smtClean="0"/>
+              <a:t>, -I, -r, --include</a:t>
             </a:r>
           </a:p>
           <a:p>
             <a:endParaRPr lang="en-US" dirty="0" smtClean="0"/>
           </a:p>
-          <a:p>
-            <a:endParaRPr lang="en-US" dirty="0" smtClean="0"/>
+        </p:txBody>
+      </p:sp>
+      <p:sp>
+        <p:nvSpPr>
+          <p:cNvPr id="4" name="TextBox 3"/>
+          <p:cNvSpPr txBox="1"/>
+          <p:nvPr/>
+        </p:nvSpPr>
+        <p:spPr>
+          <a:xfrm>
+            <a:off x="457201" y="2049270"/>
+            <a:ext cx="8229599" cy="1477328"/>
+          </a:xfrm>
+          <a:prstGeom prst="rect">
+            <a:avLst/>
+          </a:prstGeom>
+          <a:solidFill>
+            <a:schemeClr val="tx1"/>
+          </a:solidFill>
+        </p:spPr>
+        <p:txBody>
+          <a:bodyPr wrap="square" rtlCol="0">
+            <a:spAutoFit/>
+          </a:bodyPr>
+          <a:lstStyle/>
+          <a:p>
+            <a:r>
+              <a:rPr lang="en-US" dirty="0">
+                <a:solidFill>
+                  <a:schemeClr val="bg1">
+                    <a:lumMod val="85000"/>
+                  </a:schemeClr>
+                </a:solidFill>
+                <a:latin typeface="Consolas" panose="020B0609020204030204" pitchFamily="49" charset="0"/>
+                <a:cs typeface="Consolas" panose="020B0609020204030204" pitchFamily="49" charset="0"/>
+              </a:rPr>
+              <a:t>$ grep --help | head -4</a:t>
+            </a:r>
+          </a:p>
+          <a:p>
+            <a:r>
+              <a:rPr lang="en-US" dirty="0">
+                <a:solidFill>
+                  <a:schemeClr val="bg1">
+                    <a:lumMod val="85000"/>
+                  </a:schemeClr>
+                </a:solidFill>
+                <a:latin typeface="Consolas" panose="020B0609020204030204" pitchFamily="49" charset="0"/>
+                <a:cs typeface="Consolas" panose="020B0609020204030204" pitchFamily="49" charset="0"/>
+              </a:rPr>
+              <a:t>Usage: /</a:t>
+            </a:r>
+            <a:r>
+              <a:rPr lang="en-US" dirty="0" err="1">
+                <a:solidFill>
+                  <a:schemeClr val="bg1">
+                    <a:lumMod val="85000"/>
+                  </a:schemeClr>
+                </a:solidFill>
+                <a:latin typeface="Consolas" panose="020B0609020204030204" pitchFamily="49" charset="0"/>
+                <a:cs typeface="Consolas" panose="020B0609020204030204" pitchFamily="49" charset="0"/>
+              </a:rPr>
+              <a:t>usr</a:t>
+            </a:r>
+            <a:r>
+              <a:rPr lang="en-US" dirty="0">
+                <a:solidFill>
+                  <a:schemeClr val="bg1">
+                    <a:lumMod val="85000"/>
+                  </a:schemeClr>
+                </a:solidFill>
+                <a:latin typeface="Consolas" panose="020B0609020204030204" pitchFamily="49" charset="0"/>
+                <a:cs typeface="Consolas" panose="020B0609020204030204" pitchFamily="49" charset="0"/>
+              </a:rPr>
+              <a:t>/bin/grep [OPTION]... PATTERN [FILE]...</a:t>
+            </a:r>
+          </a:p>
+          <a:p>
+            <a:r>
+              <a:rPr lang="en-US" dirty="0">
+                <a:solidFill>
+                  <a:schemeClr val="bg1">
+                    <a:lumMod val="85000"/>
+                  </a:schemeClr>
+                </a:solidFill>
+                <a:latin typeface="Consolas" panose="020B0609020204030204" pitchFamily="49" charset="0"/>
+                <a:cs typeface="Consolas" panose="020B0609020204030204" pitchFamily="49" charset="0"/>
+              </a:rPr>
+              <a:t>Search for PATTERN in each FILE or standard input.</a:t>
+            </a:r>
+          </a:p>
+          <a:p>
+            <a:r>
+              <a:rPr lang="en-US" dirty="0">
+                <a:solidFill>
+                  <a:schemeClr val="bg1">
+                    <a:lumMod val="85000"/>
+                  </a:schemeClr>
+                </a:solidFill>
+                <a:latin typeface="Consolas" panose="020B0609020204030204" pitchFamily="49" charset="0"/>
+                <a:cs typeface="Consolas" panose="020B0609020204030204" pitchFamily="49" charset="0"/>
+              </a:rPr>
+              <a:t>PATTERN is, by default, a basic regular expression (BRE).</a:t>
+            </a:r>
+          </a:p>
+          <a:p>
+            <a:r>
+              <a:rPr lang="en-US" dirty="0">
+                <a:solidFill>
+                  <a:schemeClr val="bg1">
+                    <a:lumMod val="85000"/>
+                  </a:schemeClr>
+                </a:solidFill>
+                <a:latin typeface="Consolas" panose="020B0609020204030204" pitchFamily="49" charset="0"/>
+                <a:cs typeface="Consolas" panose="020B0609020204030204" pitchFamily="49" charset="0"/>
+              </a:rPr>
+              <a:t>Example: /</a:t>
+            </a:r>
+            <a:r>
+              <a:rPr lang="en-US" dirty="0" err="1">
+                <a:solidFill>
+                  <a:schemeClr val="bg1">
+                    <a:lumMod val="85000"/>
+                  </a:schemeClr>
+                </a:solidFill>
+                <a:latin typeface="Consolas" panose="020B0609020204030204" pitchFamily="49" charset="0"/>
+                <a:cs typeface="Consolas" panose="020B0609020204030204" pitchFamily="49" charset="0"/>
+              </a:rPr>
+              <a:t>usr</a:t>
+            </a:r>
+            <a:r>
+              <a:rPr lang="en-US" dirty="0">
+                <a:solidFill>
+                  <a:schemeClr val="bg1">
+                    <a:lumMod val="85000"/>
+                  </a:schemeClr>
+                </a:solidFill>
+                <a:latin typeface="Consolas" panose="020B0609020204030204" pitchFamily="49" charset="0"/>
+                <a:cs typeface="Consolas" panose="020B0609020204030204" pitchFamily="49" charset="0"/>
+              </a:rPr>
+              <a:t>/bin/grep -</a:t>
+            </a:r>
+            <a:r>
+              <a:rPr lang="en-US" dirty="0" err="1">
+                <a:solidFill>
+                  <a:schemeClr val="bg1">
+                    <a:lumMod val="85000"/>
+                  </a:schemeClr>
+                </a:solidFill>
+                <a:latin typeface="Consolas" panose="020B0609020204030204" pitchFamily="49" charset="0"/>
+                <a:cs typeface="Consolas" panose="020B0609020204030204" pitchFamily="49" charset="0"/>
+              </a:rPr>
+              <a:t>i</a:t>
+            </a:r>
+            <a:r>
+              <a:rPr lang="en-US" dirty="0">
+                <a:solidFill>
+                  <a:schemeClr val="bg1">
+                    <a:lumMod val="85000"/>
+                  </a:schemeClr>
+                </a:solidFill>
+                <a:latin typeface="Consolas" panose="020B0609020204030204" pitchFamily="49" charset="0"/>
+                <a:cs typeface="Consolas" panose="020B0609020204030204" pitchFamily="49" charset="0"/>
+              </a:rPr>
+              <a:t> 'hello world' </a:t>
+            </a:r>
+            <a:r>
+              <a:rPr lang="en-US" dirty="0" err="1">
+                <a:solidFill>
+                  <a:schemeClr val="bg1">
+                    <a:lumMod val="85000"/>
+                  </a:schemeClr>
+                </a:solidFill>
+                <a:latin typeface="Consolas" panose="020B0609020204030204" pitchFamily="49" charset="0"/>
+                <a:cs typeface="Consolas" panose="020B0609020204030204" pitchFamily="49" charset="0"/>
+              </a:rPr>
+              <a:t>menu.h</a:t>
+            </a:r>
+            <a:r>
+              <a:rPr lang="en-US" dirty="0">
+                <a:solidFill>
+                  <a:schemeClr val="bg1">
+                    <a:lumMod val="85000"/>
+                  </a:schemeClr>
+                </a:solidFill>
+                <a:latin typeface="Consolas" panose="020B0609020204030204" pitchFamily="49" charset="0"/>
+                <a:cs typeface="Consolas" panose="020B0609020204030204" pitchFamily="49" charset="0"/>
+              </a:rPr>
+              <a:t> </a:t>
+            </a:r>
+            <a:r>
+              <a:rPr lang="en-US" dirty="0" err="1">
+                <a:solidFill>
+                  <a:schemeClr val="bg1">
+                    <a:lumMod val="85000"/>
+                  </a:schemeClr>
+                </a:solidFill>
+                <a:latin typeface="Consolas" panose="020B0609020204030204" pitchFamily="49" charset="0"/>
+                <a:cs typeface="Consolas" panose="020B0609020204030204" pitchFamily="49" charset="0"/>
+              </a:rPr>
+              <a:t>main.c</a:t>
+            </a:r>
+            <a:endParaRPr lang="en-US" dirty="0">
+              <a:solidFill>
+                <a:schemeClr val="bg1">
+                  <a:lumMod val="85000"/>
+                </a:schemeClr>
+              </a:solidFill>
+              <a:latin typeface="Consolas" panose="020B0609020204030204" pitchFamily="49" charset="0"/>
+              <a:cs typeface="Consolas" panose="020B0609020204030204" pitchFamily="49" charset="0"/>
+            </a:endParaRPr>
           </a:p>
         </p:txBody>
       </p:sp>
     </p:spTree>
     <p:extLst>
       <p:ext uri="{BB962C8B-B14F-4D97-AF65-F5344CB8AC3E}">
-        <p14:creationId xmlns:p14="http://schemas.microsoft.com/office/powerpoint/2010/main" val="966442407"/>
+        <p14:creationId xmlns:p14="http://schemas.microsoft.com/office/powerpoint/2010/main" val="3484388903"/>
       </p:ext>
     </p:extLst>
   </p:cSld>
@@ -3988,22 +4298,12 @@
         </p:nvSpPr>
         <p:spPr/>
         <p:txBody>
-          <a:bodyPr>
-            <a:normAutofit fontScale="90000"/>
-          </a:bodyPr>
-          <a:lstStyle/>
-          <a:p>
-            <a:r>
-              <a:rPr lang="en-US" dirty="0" smtClean="0"/>
-              <a:t>What are regular expressions </a:t>
-            </a:r>
-            <a:r>
-              <a:rPr lang="en-US" i="1" dirty="0" smtClean="0"/>
-              <a:t>not </a:t>
-            </a:r>
-            <a:r>
-              <a:rPr lang="en-US" dirty="0" smtClean="0"/>
-              <a:t>useful for?</a:t>
+          <a:bodyPr/>
+          <a:lstStyle/>
+          <a:p>
+            <a:r>
+              <a:rPr lang="en-US" dirty="0" smtClean="0"/>
+              <a:t>vim</a:t>
             </a:r>
             <a:endParaRPr lang="en-US" dirty="0"/>
           </a:p>
@@ -4019,7 +4319,12 @@
             <p:ph idx="1"/>
           </p:nvPr>
         </p:nvSpPr>
-        <p:spPr/>
+        <p:spPr>
+          <a:xfrm>
+            <a:off x="457200" y="1852934"/>
+            <a:ext cx="8229600" cy="4273230"/>
+          </a:xfrm>
+        </p:spPr>
         <p:txBody>
           <a:bodyPr>
             <a:normAutofit/>
@@ -4028,33 +4333,55 @@
           <a:p>
             <a:r>
               <a:rPr lang="en-US" dirty="0" smtClean="0"/>
-              <a:t>Prime number regex</a:t>
-            </a:r>
-          </a:p>
-          <a:p>
-            <a:r>
-              <a:rPr lang="en-US" dirty="0">
-                <a:hlinkClick r:id="rId2"/>
-              </a:rPr>
-              <a:t>https://</a:t>
-            </a:r>
-            <a:r>
-              <a:rPr lang="en-US" dirty="0" smtClean="0">
-                <a:hlinkClick r:id="rId2"/>
-              </a:rPr>
-              <a:t>stackoverflow.com/questions/1732348/regex-match-open-tags-except-xhtml-self-contained-tags/1732454#1732454</a:t>
-            </a:r>
-            <a:endParaRPr lang="en-US" dirty="0" smtClean="0"/>
-          </a:p>
-          <a:p>
-            <a:endParaRPr lang="en-US" dirty="0" smtClean="0"/>
+              <a:t>/match and ?match allow searching forwards/backwards for match (way better than </a:t>
+            </a:r>
+            <a:r>
+              <a:rPr lang="en-US" dirty="0" err="1" smtClean="0"/>
+              <a:t>hjkl</a:t>
+            </a:r>
+            <a:r>
+              <a:rPr lang="en-US" dirty="0" smtClean="0"/>
+              <a:t> navigation!)</a:t>
+            </a:r>
+          </a:p>
+          <a:p>
+            <a:r>
+              <a:rPr lang="en-US" dirty="0" smtClean="0"/>
+              <a:t>:g/match/{Ex-</a:t>
+            </a:r>
+            <a:r>
+              <a:rPr lang="en-US" dirty="0" err="1" smtClean="0"/>
+              <a:t>cmd</a:t>
+            </a:r>
+            <a:r>
+              <a:rPr lang="en-US" dirty="0"/>
+              <a:t>}</a:t>
+            </a:r>
+            <a:r>
+              <a:rPr lang="en-US" dirty="0" smtClean="0"/>
+              <a:t> will perform the specified operation (e.g. ‘d’ for delete, ‘y’ for yank) to matching lines</a:t>
+            </a:r>
+          </a:p>
+          <a:p>
+            <a:r>
+              <a:rPr lang="en-US" dirty="0" smtClean="0"/>
+              <a:t>:s/match/replace/[</a:t>
+            </a:r>
+            <a:r>
+              <a:rPr lang="en-US" dirty="0" err="1" smtClean="0"/>
+              <a:t>gi</a:t>
+            </a:r>
+            <a:r>
+              <a:rPr lang="en-US" dirty="0" smtClean="0"/>
+              <a:t>] allows search and replace</a:t>
+            </a:r>
           </a:p>
         </p:txBody>
       </p:sp>
     </p:spTree>
     <p:extLst>
       <p:ext uri="{BB962C8B-B14F-4D97-AF65-F5344CB8AC3E}">
-        <p14:creationId xmlns:p14="http://schemas.microsoft.com/office/powerpoint/2010/main" val="1627161319"/>
+        <p14:creationId xmlns:p14="http://schemas.microsoft.com/office/powerpoint/2010/main" val="3775512448"/>
       </p:ext>
     </p:extLst>
   </p:cSld>
@@ -4104,16 +4431,8 @@
           <a:lstStyle/>
           <a:p>
             <a:r>
-              <a:rPr lang="en-US" dirty="0" smtClean="0"/>
-              <a:t>Things I </a:t>
-            </a:r>
-            <a:r>
-              <a:rPr lang="en-US" i="1" dirty="0" smtClean="0"/>
-              <a:t>didn’t</a:t>
-            </a:r>
-            <a:r>
-              <a:rPr lang="en-US" dirty="0" smtClean="0"/>
-              <a:t> mention…</a:t>
+              <a:rPr lang="en-US" dirty="0" err="1" smtClean="0"/>
+              <a:t>awk</a:t>
             </a:r>
             <a:endParaRPr lang="en-US" dirty="0"/>
           </a:p>
@@ -4129,29 +4448,94 @@
             <p:ph idx="1"/>
           </p:nvPr>
         </p:nvSpPr>
-        <p:spPr/>
-        <p:txBody>
-          <a:bodyPr/>
-          <a:lstStyle/>
-          <a:p>
-            <a:r>
-              <a:rPr lang="en-US" dirty="0"/>
-              <a:t>A couple different flavors with differences</a:t>
+        <p:spPr>
+          <a:xfrm>
+            <a:off x="457200" y="2891938"/>
+            <a:ext cx="8229600" cy="3234225"/>
+          </a:xfrm>
+        </p:spPr>
+        <p:txBody>
+          <a:bodyPr>
+            <a:normAutofit/>
+          </a:bodyPr>
+          <a:lstStyle/>
+          <a:p>
+            <a:r>
+              <a:rPr lang="en-US" dirty="0" smtClean="0"/>
+              <a:t>Like </a:t>
+            </a:r>
+            <a:r>
+              <a:rPr lang="en-US" dirty="0" err="1" smtClean="0"/>
+              <a:t>sed</a:t>
+            </a:r>
+            <a:r>
+              <a:rPr lang="en-US" dirty="0" smtClean="0"/>
+              <a:t>, but less focused on stream edits</a:t>
             </a:r>
           </a:p>
           <a:p>
             <a:pPr lvl="1"/>
             <a:r>
-              <a:rPr lang="en-US" dirty="0"/>
-              <a:t>i.e. POSIX has [:alpha:] and [:blank:], vim uses \a and </a:t>
-            </a:r>
-            <a:r>
-              <a:rPr lang="en-US" dirty="0" smtClean="0"/>
-              <a:t>\</a:t>
-            </a:r>
-            <a:r>
-              <a:rPr lang="en-US" dirty="0"/>
-              <a:t>s</a:t>
+              <a:rPr lang="en-US" dirty="0" smtClean="0"/>
+              <a:t>Allows lots of flow control, perform novel operations like arithmetic</a:t>
+            </a:r>
+          </a:p>
+          <a:p>
+            <a:pPr lvl="1"/>
+            <a:r>
+              <a:rPr lang="en-US" dirty="0" smtClean="0"/>
+              <a:t>Personall</a:t>
+            </a:r>
+            <a:r>
+              <a:rPr lang="en-US" dirty="0" smtClean="0"/>
+              <a:t>y wrote my way around awful database at old employer, script still running!</a:t>
+            </a:r>
+            <a:endParaRPr lang="en-US" dirty="0" smtClean="0"/>
+          </a:p>
+          <a:p>
+            <a:r>
+              <a:rPr lang="en-US" dirty="0" smtClean="0"/>
+              <a:t>Defer to Peter’s remarks</a:t>
+            </a:r>
+            <a:endParaRPr lang="en-US" dirty="0" smtClean="0"/>
+          </a:p>
+        </p:txBody>
+      </p:sp>
+      <p:sp>
+        <p:nvSpPr>
+          <p:cNvPr id="4" name="TextBox 3"/>
+          <p:cNvSpPr txBox="1"/>
+          <p:nvPr/>
+        </p:nvSpPr>
+        <p:spPr>
+          <a:xfrm>
+            <a:off x="457201" y="2049270"/>
+            <a:ext cx="8229599" cy="646331"/>
+          </a:xfrm>
+          <a:prstGeom prst="rect">
+            <a:avLst/>
+          </a:prstGeom>
+          <a:solidFill>
+            <a:schemeClr val="tx1"/>
+          </a:solidFill>
+        </p:spPr>
+        <p:txBody>
+          <a:bodyPr wrap="square" rtlCol="0">
+            <a:spAutoFit/>
+          </a:bodyPr>
+          <a:lstStyle/>
+          <a:p>
+            <a:r>
+              <a:rPr lang="en-US" dirty="0">
+                <a:solidFill>
+                  <a:schemeClr val="bg1">
+                    <a:lumMod val="85000"/>
+                  </a:schemeClr>
+                </a:solidFill>
+                <a:latin typeface="Consolas" panose="020B0609020204030204" pitchFamily="49" charset="0"/>
+                <a:cs typeface="Consolas" panose="020B0609020204030204" pitchFamily="49" charset="0"/>
+              </a:rPr>
+              <a:t>gawk [ POSIX or GNU style options ] -f program-file [ -- ] file ...</a:t>
             </a:r>
           </a:p>
         </p:txBody>
@@ -4159,7 +4543,7 @@
     </p:spTree>
     <p:extLst>
       <p:ext uri="{BB962C8B-B14F-4D97-AF65-F5344CB8AC3E}">
-        <p14:creationId xmlns:p14="http://schemas.microsoft.com/office/powerpoint/2010/main" val="3192961759"/>
+        <p14:creationId xmlns:p14="http://schemas.microsoft.com/office/powerpoint/2010/main" val="1511937421"/>
       </p:ext>
     </p:extLst>
   </p:cSld>
@@ -4210,7 +4594,7 @@
           <a:p>
             <a:r>
               <a:rPr lang="en-US" dirty="0" smtClean="0"/>
-              <a:t>Useful resources</a:t>
+              <a:t>What are regular expressions useful for?</a:t>
             </a:r>
             <a:endParaRPr lang="en-US" dirty="0"/>
           </a:p>
@@ -4234,74 +4618,68 @@
           <a:lstStyle/>
           <a:p>
             <a:r>
-              <a:rPr lang="en-US" dirty="0">
-                <a:hlinkClick r:id="rId2"/>
-              </a:rPr>
-              <a:t>http://www.regular-expressions.info</a:t>
-            </a:r>
-            <a:r>
-              <a:rPr lang="en-US" dirty="0" smtClean="0">
-                <a:hlinkClick r:id="rId2"/>
-              </a:rPr>
+              <a:rPr lang="en-US" dirty="0" smtClean="0"/>
+              <a:t>Hands-on examples, one or two with grep and </a:t>
+            </a:r>
+            <a:r>
+              <a:rPr lang="en-US" dirty="0" err="1" smtClean="0"/>
+              <a:t>sed</a:t>
+            </a:r>
+            <a:r>
+              <a:rPr lang="en-US" dirty="0" smtClean="0"/>
+              <a:t>, two with Python</a:t>
+            </a:r>
+          </a:p>
+          <a:p>
+            <a:pPr lvl="1"/>
+            <a:r>
+              <a:rPr lang="en-US" dirty="0"/>
+              <a:t>Matching a time</a:t>
+            </a:r>
+          </a:p>
+          <a:p>
+            <a:pPr lvl="1"/>
+            <a:r>
+              <a:rPr lang="en-US" dirty="0" smtClean="0"/>
+              <a:t>Matching a mm/</a:t>
+            </a:r>
+            <a:r>
+              <a:rPr lang="en-US" dirty="0" err="1" smtClean="0"/>
+              <a:t>dd</a:t>
+            </a:r>
+            <a:r>
+              <a:rPr lang="en-US" dirty="0" smtClean="0"/>
               <a:t>/</a:t>
             </a:r>
+            <a:r>
+              <a:rPr lang="en-US" dirty="0" err="1" smtClean="0"/>
+              <a:t>yyyy</a:t>
+            </a:r>
+            <a:r>
+              <a:rPr lang="en-US" dirty="0" smtClean="0"/>
+              <a:t> date</a:t>
+            </a:r>
+          </a:p>
+          <a:p>
+            <a:pPr lvl="1"/>
+            <a:r>
+              <a:rPr lang="en-US" dirty="0" smtClean="0"/>
+              <a:t>Matching a phone number</a:t>
+            </a:r>
+          </a:p>
+          <a:p>
+            <a:pPr lvl="1"/>
+            <a:r>
+              <a:rPr lang="en-US" dirty="0" smtClean="0"/>
+              <a:t>Matching a repeated string</a:t>
+            </a:r>
+          </a:p>
+          <a:p>
+            <a:pPr lvl="1"/>
             <a:endParaRPr lang="en-US" dirty="0" smtClean="0"/>
           </a:p>
           <a:p>
-            <a:r>
-              <a:rPr lang="en-US" dirty="0">
-                <a:hlinkClick r:id="rId3"/>
-              </a:rPr>
-              <a:t>http://</a:t>
-            </a:r>
-            <a:r>
-              <a:rPr lang="en-US" dirty="0" smtClean="0">
-                <a:hlinkClick r:id="rId3"/>
-              </a:rPr>
-              <a:t>www.zytrax.com/tech/web/regex.htm</a:t>
-            </a:r>
-            <a:r>
-              <a:rPr lang="en-US" dirty="0" smtClean="0"/>
-              <a:t> </a:t>
-            </a:r>
-          </a:p>
-          <a:p>
-            <a:r>
-              <a:rPr lang="en-US" dirty="0">
-                <a:hlinkClick r:id="rId4"/>
-              </a:rPr>
-              <a:t>https://www.gnu.org/software/gawk/manual</a:t>
-            </a:r>
-            <a:r>
-              <a:rPr lang="en-US" dirty="0" smtClean="0">
-                <a:hlinkClick r:id="rId4"/>
-              </a:rPr>
-              <a:t>/</a:t>
-            </a:r>
-            <a:endParaRPr lang="en-US" dirty="0" smtClean="0"/>
-          </a:p>
-          <a:p>
-            <a:r>
-              <a:rPr lang="en-US" dirty="0" smtClean="0">
-                <a:hlinkClick r:id="rId5"/>
-              </a:rPr>
-              <a:t>https</a:t>
-            </a:r>
-            <a:r>
-              <a:rPr lang="en-US" dirty="0">
-                <a:hlinkClick r:id="rId5"/>
-              </a:rPr>
-              <a:t>://</a:t>
-            </a:r>
-            <a:r>
-              <a:rPr lang="en-US" dirty="0" smtClean="0">
-                <a:hlinkClick r:id="rId5"/>
-              </a:rPr>
-              <a:t>docs.python.org/3/library/re.html</a:t>
-            </a:r>
-            <a:endParaRPr lang="en-US" dirty="0" smtClean="0"/>
-          </a:p>
-          <a:p>
+            <a:pPr lvl="1"/>
             <a:endParaRPr lang="en-US" dirty="0" smtClean="0"/>
           </a:p>
         </p:txBody>
@@ -4309,7 +4687,7 @@
     </p:spTree>
     <p:extLst>
       <p:ext uri="{BB962C8B-B14F-4D97-AF65-F5344CB8AC3E}">
-        <p14:creationId xmlns:p14="http://schemas.microsoft.com/office/powerpoint/2010/main" val="3584811499"/>
+        <p14:creationId xmlns:p14="http://schemas.microsoft.com/office/powerpoint/2010/main" val="2307021946"/>
       </p:ext>
     </p:extLst>
   </p:cSld>
@@ -4360,7 +4738,7 @@
           <a:p>
             <a:r>
               <a:rPr lang="en-US" dirty="0" smtClean="0"/>
-              <a:t>Slightly less useful resources</a:t>
+              <a:t>Regex in Python</a:t>
             </a:r>
             <a:endParaRPr lang="en-US" dirty="0"/>
           </a:p>
@@ -4379,40 +4757,63 @@
         <p:spPr/>
         <p:txBody>
           <a:bodyPr>
-            <a:normAutofit/>
+            <a:normAutofit lnSpcReduction="10000"/>
           </a:bodyPr>
           <a:lstStyle/>
           <a:p>
             <a:r>
-              <a:rPr lang="en-US" dirty="0">
-                <a:hlinkClick r:id="rId2"/>
-              </a:rPr>
-              <a:t>https://swtch.com/~rsc/regexp/regexp1.html</a:t>
-            </a:r>
-          </a:p>
-          <a:p>
-            <a:r>
-              <a:rPr lang="en-US" dirty="0" smtClean="0">
-                <a:hlinkClick r:id="rId2"/>
-              </a:rPr>
-              <a:t>https</a:t>
-            </a:r>
-            <a:r>
-              <a:rPr lang="en-US" dirty="0">
-                <a:hlinkClick r:id="rId2"/>
-              </a:rPr>
-              <a:t>://www.gamedev.net/resources/_/</a:t>
-            </a:r>
-            <a:r>
-              <a:rPr lang="en-US" dirty="0" smtClean="0">
-                <a:hlinkClick r:id="rId2"/>
-              </a:rPr>
-              <a:t>technical/general-programming/finite-state-machines-and-regular-expressions-r3176</a:t>
-            </a:r>
-            <a:r>
-              <a:rPr lang="en-US" dirty="0" smtClean="0"/>
-              <a:t> </a:t>
-            </a:r>
+              <a:rPr lang="en-US" dirty="0" smtClean="0"/>
+              <a:t>`re` module</a:t>
+            </a:r>
+          </a:p>
+          <a:p>
+            <a:r>
+              <a:rPr lang="en-US" dirty="0" smtClean="0"/>
+              <a:t>Match objects are the return value</a:t>
+            </a:r>
+          </a:p>
+          <a:p>
+            <a:pPr lvl="1"/>
+            <a:r>
+              <a:rPr lang="en-US" dirty="0" smtClean="0"/>
+              <a:t>In particular, groups() is very useful</a:t>
+            </a:r>
+          </a:p>
+          <a:p>
+            <a:r>
+              <a:rPr lang="en-US" dirty="0" smtClean="0"/>
+              <a:t>Flags like case insensitivity</a:t>
+            </a:r>
+          </a:p>
+          <a:p>
+            <a:r>
+              <a:rPr lang="en-US" dirty="0" smtClean="0"/>
+              <a:t>Replacement (mention `</a:t>
+            </a:r>
+            <a:r>
+              <a:rPr lang="en-US" dirty="0" err="1" smtClean="0"/>
+              <a:t>str.replace</a:t>
+            </a:r>
+            <a:r>
+              <a:rPr lang="en-US" dirty="0" smtClean="0"/>
+              <a:t>()`)</a:t>
+            </a:r>
+          </a:p>
+          <a:p>
+            <a:r>
+              <a:rPr lang="en-US" dirty="0" smtClean="0"/>
+              <a:t>Pre-compiled regex if you use one frequently</a:t>
+            </a:r>
+          </a:p>
+          <a:p>
+            <a:pPr lvl="1"/>
+            <a:r>
+              <a:rPr lang="en-US" dirty="0" smtClean="0"/>
+              <a:t>Show a timing test?</a:t>
+            </a:r>
+          </a:p>
+          <a:p>
+            <a:endParaRPr lang="en-US" dirty="0" smtClean="0"/>
           </a:p>
           <a:p>
             <a:endParaRPr lang="en-US" dirty="0" smtClean="0"/>
@@ -4422,7 +4823,7 @@
     </p:spTree>
     <p:extLst>
       <p:ext uri="{BB962C8B-B14F-4D97-AF65-F5344CB8AC3E}">
-        <p14:creationId xmlns:p14="http://schemas.microsoft.com/office/powerpoint/2010/main" val="4232062310"/>
+        <p14:creationId xmlns:p14="http://schemas.microsoft.com/office/powerpoint/2010/main" val="966442407"/>
       </p:ext>
     </p:extLst>
   </p:cSld>
@@ -4643,28 +5044,130 @@
             <p:ph type="title"/>
           </p:nvPr>
         </p:nvSpPr>
-        <p:spPr>
-          <a:xfrm>
-            <a:off x="457200" y="2874722"/>
-            <a:ext cx="8229600" cy="803756"/>
-          </a:xfrm>
-        </p:spPr>
-        <p:txBody>
-          <a:bodyPr/>
-          <a:lstStyle/>
-          <a:p>
-            <a:r>
-              <a:rPr lang="en-US" dirty="0" smtClean="0"/>
-              <a:t>Thank you!</a:t>
+        <p:spPr/>
+        <p:txBody>
+          <a:bodyPr>
+            <a:normAutofit fontScale="90000"/>
+          </a:bodyPr>
+          <a:lstStyle/>
+          <a:p>
+            <a:r>
+              <a:rPr lang="en-US" dirty="0" smtClean="0"/>
+              <a:t>What are regular expressions </a:t>
+            </a:r>
+            <a:r>
+              <a:rPr lang="en-US" i="1" dirty="0" smtClean="0"/>
+              <a:t>not </a:t>
+            </a:r>
+            <a:r>
+              <a:rPr lang="en-US" dirty="0" smtClean="0"/>
+              <a:t>useful for?</a:t>
             </a:r>
             <a:endParaRPr lang="en-US" dirty="0"/>
+          </a:p>
+        </p:txBody>
+      </p:sp>
+      <p:sp>
+        <p:nvSpPr>
+          <p:cNvPr id="3" name="Content Placeholder 2"/>
+          <p:cNvSpPr>
+            <a:spLocks noGrp="1"/>
+          </p:cNvSpPr>
+          <p:nvPr>
+            <p:ph idx="1"/>
+          </p:nvPr>
+        </p:nvSpPr>
+        <p:spPr/>
+        <p:txBody>
+          <a:bodyPr>
+            <a:normAutofit lnSpcReduction="10000"/>
+          </a:bodyPr>
+          <a:lstStyle/>
+          <a:p>
+            <a:r>
+              <a:rPr lang="en-US" dirty="0" smtClean="0"/>
+              <a:t>Prime number </a:t>
+            </a:r>
+            <a:r>
+              <a:rPr lang="en-US" dirty="0" smtClean="0"/>
+              <a:t>regex (really gross/neat example of </a:t>
+            </a:r>
+            <a:r>
+              <a:rPr lang="en-US" dirty="0" err="1" smtClean="0"/>
+              <a:t>lookahead</a:t>
+            </a:r>
+            <a:r>
+              <a:rPr lang="en-US" dirty="0" smtClean="0"/>
+              <a:t>)</a:t>
+            </a:r>
+            <a:endParaRPr lang="en-US" dirty="0" smtClean="0"/>
+          </a:p>
+          <a:p>
+            <a:r>
+              <a:rPr lang="en-US" dirty="0" smtClean="0"/>
+              <a:t>Parsing HTML</a:t>
+            </a:r>
+            <a:r>
+              <a:rPr lang="en-US" dirty="0" smtClean="0"/>
+              <a:t>*</a:t>
+            </a:r>
+            <a:endParaRPr lang="en-US" dirty="0" smtClean="0"/>
+          </a:p>
+          <a:p>
+            <a:endParaRPr lang="en-US" dirty="0" smtClean="0"/>
+          </a:p>
+          <a:p>
+            <a:endParaRPr lang="en-US" dirty="0" smtClean="0"/>
+          </a:p>
+          <a:p>
+            <a:endParaRPr lang="en-US" dirty="0"/>
+          </a:p>
+          <a:p>
+            <a:pPr marL="0" indent="0">
+              <a:buNone/>
+            </a:pPr>
+            <a:endParaRPr lang="en-US" sz="1500" dirty="0" smtClean="0"/>
+          </a:p>
+          <a:p>
+            <a:pPr marL="0" indent="0">
+              <a:buNone/>
+            </a:pPr>
+            <a:endParaRPr lang="en-US" sz="1500" dirty="0"/>
+          </a:p>
+          <a:p>
+            <a:pPr marL="0" indent="0">
+              <a:buNone/>
+            </a:pPr>
+            <a:r>
+              <a:rPr lang="en-US" sz="1500" dirty="0" smtClean="0"/>
+              <a:t>* </a:t>
+            </a:r>
+            <a:r>
+              <a:rPr lang="en-US" sz="1500" dirty="0" smtClean="0">
+                <a:hlinkClick r:id="rId3"/>
+              </a:rPr>
+              <a:t>https</a:t>
+            </a:r>
+            <a:r>
+              <a:rPr lang="en-US" sz="1500" dirty="0">
+                <a:hlinkClick r:id="rId3"/>
+              </a:rPr>
+              <a:t>://</a:t>
+            </a:r>
+            <a:r>
+              <a:rPr lang="en-US" sz="1500" dirty="0" smtClean="0">
+                <a:hlinkClick r:id="rId3"/>
+              </a:rPr>
+              <a:t>stackoverflow.com/questions/1732348/regex-match-open-tags-except-xhtml-self-contained-tags/1732454#1732454</a:t>
+            </a:r>
+            <a:endParaRPr lang="en-US" sz="1500" dirty="0" smtClean="0"/>
           </a:p>
         </p:txBody>
       </p:sp>
     </p:spTree>
     <p:extLst>
       <p:ext uri="{BB962C8B-B14F-4D97-AF65-F5344CB8AC3E}">
-        <p14:creationId xmlns:p14="http://schemas.microsoft.com/office/powerpoint/2010/main" val="1844849267"/>
+        <p14:creationId xmlns:p14="http://schemas.microsoft.com/office/powerpoint/2010/main" val="1627161319"/>
       </p:ext>
     </p:extLst>
   </p:cSld>
@@ -4708,6 +5211,439 @@
             <p:ph type="title"/>
           </p:nvPr>
         </p:nvSpPr>
+        <p:spPr/>
+        <p:txBody>
+          <a:bodyPr/>
+          <a:lstStyle/>
+          <a:p>
+            <a:r>
+              <a:rPr lang="en-US" dirty="0" smtClean="0"/>
+              <a:t>Things I </a:t>
+            </a:r>
+            <a:r>
+              <a:rPr lang="en-US" i="1" dirty="0" smtClean="0"/>
+              <a:t>didn’t</a:t>
+            </a:r>
+            <a:r>
+              <a:rPr lang="en-US" dirty="0" smtClean="0"/>
+              <a:t> mention…</a:t>
+            </a:r>
+            <a:endParaRPr lang="en-US" dirty="0"/>
+          </a:p>
+        </p:txBody>
+      </p:sp>
+      <p:sp>
+        <p:nvSpPr>
+          <p:cNvPr id="3" name="Content Placeholder 2"/>
+          <p:cNvSpPr>
+            <a:spLocks noGrp="1"/>
+          </p:cNvSpPr>
+          <p:nvPr>
+            <p:ph idx="1"/>
+          </p:nvPr>
+        </p:nvSpPr>
+        <p:spPr/>
+        <p:txBody>
+          <a:bodyPr/>
+          <a:lstStyle/>
+          <a:p>
+            <a:r>
+              <a:rPr lang="en-US" dirty="0"/>
+              <a:t>A couple different flavors with differences</a:t>
+            </a:r>
+          </a:p>
+          <a:p>
+            <a:pPr lvl="1"/>
+            <a:r>
+              <a:rPr lang="en-US" dirty="0"/>
+              <a:t>i.e. POSIX has [:alpha:] and [:blank:], vim uses \a and </a:t>
+            </a:r>
+            <a:r>
+              <a:rPr lang="en-US" dirty="0" smtClean="0"/>
+              <a:t>\</a:t>
+            </a:r>
+            <a:r>
+              <a:rPr lang="en-US" dirty="0"/>
+              <a:t>s</a:t>
+            </a:r>
+          </a:p>
+        </p:txBody>
+      </p:sp>
+    </p:spTree>
+    <p:extLst>
+      <p:ext uri="{BB962C8B-B14F-4D97-AF65-F5344CB8AC3E}">
+        <p14:creationId xmlns:p14="http://schemas.microsoft.com/office/powerpoint/2010/main" val="3192961759"/>
+      </p:ext>
+    </p:extLst>
+  </p:cSld>
+  <p:clrMapOvr>
+    <a:masterClrMapping/>
+  </p:clrMapOvr>
+  <p:timing>
+    <p:tnLst>
+      <p:par>
+        <p:cTn id="1" dur="indefinite" restart="never" nodeType="tmRoot"/>
+      </p:par>
+    </p:tnLst>
+  </p:timing>
+</p:sld>
+</file>
+
+<file path=ppt/slides/slide22.xml><?xml version="1.0" encoding="utf-8"?>
+<p:sld xmlns:a="http://schemas.openxmlformats.org/drawingml/2006/main" xmlns:r="http://schemas.openxmlformats.org/officeDocument/2006/relationships" xmlns:p="http://schemas.openxmlformats.org/presentationml/2006/main">
+  <p:cSld>
+    <p:spTree>
+      <p:nvGrpSpPr>
+        <p:cNvPr id="1" name=""/>
+        <p:cNvGrpSpPr/>
+        <p:nvPr/>
+      </p:nvGrpSpPr>
+      <p:grpSpPr>
+        <a:xfrm>
+          <a:off x="0" y="0"/>
+          <a:ext cx="0" cy="0"/>
+          <a:chOff x="0" y="0"/>
+          <a:chExt cx="0" cy="0"/>
+        </a:xfrm>
+      </p:grpSpPr>
+      <p:sp>
+        <p:nvSpPr>
+          <p:cNvPr id="2" name="Title 1"/>
+          <p:cNvSpPr>
+            <a:spLocks noGrp="1"/>
+          </p:cNvSpPr>
+          <p:nvPr>
+            <p:ph type="title"/>
+          </p:nvPr>
+        </p:nvSpPr>
+        <p:spPr/>
+        <p:txBody>
+          <a:bodyPr/>
+          <a:lstStyle/>
+          <a:p>
+            <a:r>
+              <a:rPr lang="en-US" dirty="0" smtClean="0"/>
+              <a:t>Useful resources</a:t>
+            </a:r>
+            <a:endParaRPr lang="en-US" dirty="0"/>
+          </a:p>
+        </p:txBody>
+      </p:sp>
+      <p:sp>
+        <p:nvSpPr>
+          <p:cNvPr id="3" name="Content Placeholder 2"/>
+          <p:cNvSpPr>
+            <a:spLocks noGrp="1"/>
+          </p:cNvSpPr>
+          <p:nvPr>
+            <p:ph idx="1"/>
+          </p:nvPr>
+        </p:nvSpPr>
+        <p:spPr/>
+        <p:txBody>
+          <a:bodyPr>
+            <a:normAutofit/>
+          </a:bodyPr>
+          <a:lstStyle/>
+          <a:p>
+            <a:r>
+              <a:rPr lang="en-US" dirty="0">
+                <a:hlinkClick r:id="rId2"/>
+              </a:rPr>
+              <a:t>http://www.regular-expressions.info</a:t>
+            </a:r>
+            <a:r>
+              <a:rPr lang="en-US" dirty="0" smtClean="0">
+                <a:hlinkClick r:id="rId2"/>
+              </a:rPr>
+              <a:t>/</a:t>
+            </a:r>
+            <a:endParaRPr lang="en-US" dirty="0" smtClean="0"/>
+          </a:p>
+          <a:p>
+            <a:r>
+              <a:rPr lang="en-US" dirty="0">
+                <a:hlinkClick r:id="rId3"/>
+              </a:rPr>
+              <a:t>http://</a:t>
+            </a:r>
+            <a:r>
+              <a:rPr lang="en-US" dirty="0" smtClean="0">
+                <a:hlinkClick r:id="rId3"/>
+              </a:rPr>
+              <a:t>www.zytrax.com/tech/web/regex.htm</a:t>
+            </a:r>
+            <a:r>
+              <a:rPr lang="en-US" dirty="0" smtClean="0"/>
+              <a:t> </a:t>
+            </a:r>
+          </a:p>
+          <a:p>
+            <a:r>
+              <a:rPr lang="en-US" dirty="0">
+                <a:hlinkClick r:id="rId4"/>
+              </a:rPr>
+              <a:t>https://www.gnu.org/software/gawk/manual</a:t>
+            </a:r>
+            <a:r>
+              <a:rPr lang="en-US" dirty="0" smtClean="0">
+                <a:hlinkClick r:id="rId4"/>
+              </a:rPr>
+              <a:t>/</a:t>
+            </a:r>
+            <a:endParaRPr lang="en-US" dirty="0" smtClean="0"/>
+          </a:p>
+          <a:p>
+            <a:r>
+              <a:rPr lang="en-US" dirty="0" smtClean="0">
+                <a:hlinkClick r:id="rId5"/>
+              </a:rPr>
+              <a:t>https</a:t>
+            </a:r>
+            <a:r>
+              <a:rPr lang="en-US" dirty="0">
+                <a:hlinkClick r:id="rId5"/>
+              </a:rPr>
+              <a:t>://</a:t>
+            </a:r>
+            <a:r>
+              <a:rPr lang="en-US" dirty="0" smtClean="0">
+                <a:hlinkClick r:id="rId5"/>
+              </a:rPr>
+              <a:t>docs.python.org/3/library/re.html</a:t>
+            </a:r>
+            <a:endParaRPr lang="en-US" dirty="0" smtClean="0"/>
+          </a:p>
+          <a:p>
+            <a:endParaRPr lang="en-US" dirty="0" smtClean="0"/>
+          </a:p>
+        </p:txBody>
+      </p:sp>
+    </p:spTree>
+    <p:extLst>
+      <p:ext uri="{BB962C8B-B14F-4D97-AF65-F5344CB8AC3E}">
+        <p14:creationId xmlns:p14="http://schemas.microsoft.com/office/powerpoint/2010/main" val="3584811499"/>
+      </p:ext>
+    </p:extLst>
+  </p:cSld>
+  <p:clrMapOvr>
+    <a:masterClrMapping/>
+  </p:clrMapOvr>
+  <p:timing>
+    <p:tnLst>
+      <p:par>
+        <p:cTn id="1" dur="indefinite" restart="never" nodeType="tmRoot"/>
+      </p:par>
+    </p:tnLst>
+  </p:timing>
+</p:sld>
+</file>
+
+<file path=ppt/slides/slide23.xml><?xml version="1.0" encoding="utf-8"?>
+<p:sld xmlns:a="http://schemas.openxmlformats.org/drawingml/2006/main" xmlns:r="http://schemas.openxmlformats.org/officeDocument/2006/relationships" xmlns:p="http://schemas.openxmlformats.org/presentationml/2006/main">
+  <p:cSld>
+    <p:spTree>
+      <p:nvGrpSpPr>
+        <p:cNvPr id="1" name=""/>
+        <p:cNvGrpSpPr/>
+        <p:nvPr/>
+      </p:nvGrpSpPr>
+      <p:grpSpPr>
+        <a:xfrm>
+          <a:off x="0" y="0"/>
+          <a:ext cx="0" cy="0"/>
+          <a:chOff x="0" y="0"/>
+          <a:chExt cx="0" cy="0"/>
+        </a:xfrm>
+      </p:grpSpPr>
+      <p:sp>
+        <p:nvSpPr>
+          <p:cNvPr id="2" name="Title 1"/>
+          <p:cNvSpPr>
+            <a:spLocks noGrp="1"/>
+          </p:cNvSpPr>
+          <p:nvPr>
+            <p:ph type="title"/>
+          </p:nvPr>
+        </p:nvSpPr>
+        <p:spPr/>
+        <p:txBody>
+          <a:bodyPr/>
+          <a:lstStyle/>
+          <a:p>
+            <a:r>
+              <a:rPr lang="en-US" dirty="0" smtClean="0"/>
+              <a:t>Slightly less useful resources</a:t>
+            </a:r>
+            <a:endParaRPr lang="en-US" dirty="0"/>
+          </a:p>
+        </p:txBody>
+      </p:sp>
+      <p:sp>
+        <p:nvSpPr>
+          <p:cNvPr id="3" name="Content Placeholder 2"/>
+          <p:cNvSpPr>
+            <a:spLocks noGrp="1"/>
+          </p:cNvSpPr>
+          <p:nvPr>
+            <p:ph idx="1"/>
+          </p:nvPr>
+        </p:nvSpPr>
+        <p:spPr/>
+        <p:txBody>
+          <a:bodyPr>
+            <a:normAutofit/>
+          </a:bodyPr>
+          <a:lstStyle/>
+          <a:p>
+            <a:r>
+              <a:rPr lang="en-US" dirty="0">
+                <a:hlinkClick r:id="rId2"/>
+              </a:rPr>
+              <a:t>https://swtch.com/~rsc/regexp/regexp1.html</a:t>
+            </a:r>
+          </a:p>
+          <a:p>
+            <a:r>
+              <a:rPr lang="en-US" dirty="0" smtClean="0">
+                <a:hlinkClick r:id="rId2"/>
+              </a:rPr>
+              <a:t>https</a:t>
+            </a:r>
+            <a:r>
+              <a:rPr lang="en-US" dirty="0">
+                <a:hlinkClick r:id="rId2"/>
+              </a:rPr>
+              <a:t>://www.gamedev.net/resources/_/</a:t>
+            </a:r>
+            <a:r>
+              <a:rPr lang="en-US" dirty="0" smtClean="0">
+                <a:hlinkClick r:id="rId2"/>
+              </a:rPr>
+              <a:t>technical/general-programming/finite-state-machines-and-regular-expressions-r3176</a:t>
+            </a:r>
+            <a:r>
+              <a:rPr lang="en-US" dirty="0" smtClean="0"/>
+              <a:t> </a:t>
+            </a:r>
+          </a:p>
+          <a:p>
+            <a:endParaRPr lang="en-US" dirty="0" smtClean="0"/>
+          </a:p>
+        </p:txBody>
+      </p:sp>
+    </p:spTree>
+    <p:extLst>
+      <p:ext uri="{BB962C8B-B14F-4D97-AF65-F5344CB8AC3E}">
+        <p14:creationId xmlns:p14="http://schemas.microsoft.com/office/powerpoint/2010/main" val="4232062310"/>
+      </p:ext>
+    </p:extLst>
+  </p:cSld>
+  <p:clrMapOvr>
+    <a:masterClrMapping/>
+  </p:clrMapOvr>
+  <p:timing>
+    <p:tnLst>
+      <p:par>
+        <p:cTn id="1" dur="indefinite" restart="never" nodeType="tmRoot"/>
+      </p:par>
+    </p:tnLst>
+  </p:timing>
+</p:sld>
+</file>
+
+<file path=ppt/slides/slide24.xml><?xml version="1.0" encoding="utf-8"?>
+<p:sld xmlns:a="http://schemas.openxmlformats.org/drawingml/2006/main" xmlns:r="http://schemas.openxmlformats.org/officeDocument/2006/relationships" xmlns:p="http://schemas.openxmlformats.org/presentationml/2006/main">
+  <p:cSld>
+    <p:spTree>
+      <p:nvGrpSpPr>
+        <p:cNvPr id="1" name=""/>
+        <p:cNvGrpSpPr/>
+        <p:nvPr/>
+      </p:nvGrpSpPr>
+      <p:grpSpPr>
+        <a:xfrm>
+          <a:off x="0" y="0"/>
+          <a:ext cx="0" cy="0"/>
+          <a:chOff x="0" y="0"/>
+          <a:chExt cx="0" cy="0"/>
+        </a:xfrm>
+      </p:grpSpPr>
+      <p:sp>
+        <p:nvSpPr>
+          <p:cNvPr id="2" name="Title 1"/>
+          <p:cNvSpPr>
+            <a:spLocks noGrp="1"/>
+          </p:cNvSpPr>
+          <p:nvPr>
+            <p:ph type="title"/>
+          </p:nvPr>
+        </p:nvSpPr>
+        <p:spPr>
+          <a:xfrm>
+            <a:off x="457200" y="2874722"/>
+            <a:ext cx="8229600" cy="803756"/>
+          </a:xfrm>
+        </p:spPr>
+        <p:txBody>
+          <a:bodyPr/>
+          <a:lstStyle/>
+          <a:p>
+            <a:r>
+              <a:rPr lang="en-US" dirty="0" smtClean="0"/>
+              <a:t>Thank you!</a:t>
+            </a:r>
+            <a:endParaRPr lang="en-US" dirty="0"/>
+          </a:p>
+        </p:txBody>
+      </p:sp>
+    </p:spTree>
+    <p:extLst>
+      <p:ext uri="{BB962C8B-B14F-4D97-AF65-F5344CB8AC3E}">
+        <p14:creationId xmlns:p14="http://schemas.microsoft.com/office/powerpoint/2010/main" val="1844849267"/>
+      </p:ext>
+    </p:extLst>
+  </p:cSld>
+  <p:clrMapOvr>
+    <a:masterClrMapping/>
+  </p:clrMapOvr>
+  <p:timing>
+    <p:tnLst>
+      <p:par>
+        <p:cTn id="1" dur="indefinite" restart="never" nodeType="tmRoot"/>
+      </p:par>
+    </p:tnLst>
+  </p:timing>
+</p:sld>
+</file>
+
+<file path=ppt/slides/slide25.xml><?xml version="1.0" encoding="utf-8"?>
+<p:sld xmlns:a="http://schemas.openxmlformats.org/drawingml/2006/main" xmlns:r="http://schemas.openxmlformats.org/officeDocument/2006/relationships" xmlns:p="http://schemas.openxmlformats.org/presentationml/2006/main">
+  <p:cSld>
+    <p:spTree>
+      <p:nvGrpSpPr>
+        <p:cNvPr id="1" name=""/>
+        <p:cNvGrpSpPr/>
+        <p:nvPr/>
+      </p:nvGrpSpPr>
+      <p:grpSpPr>
+        <a:xfrm>
+          <a:off x="0" y="0"/>
+          <a:ext cx="0" cy="0"/>
+          <a:chOff x="0" y="0"/>
+          <a:chExt cx="0" cy="0"/>
+        </a:xfrm>
+      </p:grpSpPr>
+      <p:sp>
+        <p:nvSpPr>
+          <p:cNvPr id="2" name="Title 1"/>
+          <p:cNvSpPr>
+            <a:spLocks noGrp="1"/>
+          </p:cNvSpPr>
+          <p:nvPr>
+            <p:ph type="title"/>
+          </p:nvPr>
+        </p:nvSpPr>
         <p:spPr>
           <a:xfrm>
             <a:off x="457200" y="2874722"/>
@@ -4746,7 +5682,7 @@
 </p:sld>
 </file>
 
-<file path=ppt/slides/slide22.xml><?xml version="1.0" encoding="utf-8"?>
+<file path=ppt/slides/slide26.xml><?xml version="1.0" encoding="utf-8"?>
 <p:sld xmlns:a="http://schemas.openxmlformats.org/drawingml/2006/main" xmlns:r="http://schemas.openxmlformats.org/officeDocument/2006/relationships" xmlns:p="http://schemas.openxmlformats.org/presentationml/2006/main">
   <p:cSld>
     <p:spTree>

</xml_diff>

<commit_message>
Presentation-ready version of talk
</commit_message>
<xml_diff>
--- a/2017/computing_workgroup/regex/regular_expressions.pptx
+++ b/2017/computing_workgroup/regex/regular_expressions.pptx
@@ -17,18 +17,18 @@
     <p:sldId id="380" r:id="rId8"/>
     <p:sldId id="381" r:id="rId9"/>
     <p:sldId id="374" r:id="rId10"/>
-    <p:sldId id="382" r:id="rId11"/>
-    <p:sldId id="383" r:id="rId12"/>
-    <p:sldId id="377" r:id="rId13"/>
-    <p:sldId id="376" r:id="rId14"/>
+    <p:sldId id="376" r:id="rId11"/>
+    <p:sldId id="384" r:id="rId12"/>
+    <p:sldId id="382" r:id="rId13"/>
+    <p:sldId id="383" r:id="rId14"/>
     <p:sldId id="387" r:id="rId15"/>
     <p:sldId id="386" r:id="rId16"/>
     <p:sldId id="390" r:id="rId17"/>
-    <p:sldId id="388" r:id="rId18"/>
-    <p:sldId id="384" r:id="rId19"/>
-    <p:sldId id="373" r:id="rId20"/>
-    <p:sldId id="375" r:id="rId21"/>
-    <p:sldId id="368" r:id="rId22"/>
+    <p:sldId id="373" r:id="rId18"/>
+    <p:sldId id="388" r:id="rId19"/>
+    <p:sldId id="375" r:id="rId20"/>
+    <p:sldId id="368" r:id="rId21"/>
+    <p:sldId id="377" r:id="rId22"/>
     <p:sldId id="341" r:id="rId23"/>
     <p:sldId id="385" r:id="rId24"/>
     <p:sldId id="339" r:id="rId25"/>
@@ -233,7 +233,7 @@
           <a:p>
             <a:fld id="{6096A192-89F2-44C6-B07F-1B83CE44D511}" type="datetimeFigureOut">
               <a:rPr lang="en-US" smtClean="0"/>
-              <a:t>1/25/2017</a:t>
+              <a:t>1/26/2017</a:t>
             </a:fld>
             <a:endParaRPr lang="en-US"/>
           </a:p>
@@ -650,7 +650,7 @@
           <a:p>
             <a:fld id="{27D32F87-7895-4624-A4AE-ACD3588F6EDE}" type="slidenum">
               <a:rPr lang="en-US" smtClean="0"/>
-              <a:t>20</a:t>
+              <a:t>19</a:t>
             </a:fld>
             <a:endParaRPr lang="en-US"/>
           </a:p>
@@ -878,7 +878,7 @@
           <a:p>
             <a:fld id="{7181039F-CB0C-E14D-A7EF-3BACE2CEF4EA}" type="datetimeFigureOut">
               <a:rPr lang="en-US" smtClean="0"/>
-              <a:t>1/25/2017</a:t>
+              <a:t>1/26/2017</a:t>
             </a:fld>
             <a:endParaRPr lang="en-US"/>
           </a:p>
@@ -1138,7 +1138,7 @@
           <a:p>
             <a:fld id="{7181039F-CB0C-E14D-A7EF-3BACE2CEF4EA}" type="datetimeFigureOut">
               <a:rPr lang="en-US" smtClean="0"/>
-              <a:t>1/25/2017</a:t>
+              <a:t>1/26/2017</a:t>
             </a:fld>
             <a:endParaRPr lang="en-US"/>
           </a:p>
@@ -1403,7 +1403,7 @@
           <a:p>
             <a:fld id="{7181039F-CB0C-E14D-A7EF-3BACE2CEF4EA}" type="datetimeFigureOut">
               <a:rPr lang="en-US" smtClean="0"/>
-              <a:t>1/25/2017</a:t>
+              <a:t>1/26/2017</a:t>
             </a:fld>
             <a:endParaRPr lang="en-US"/>
           </a:p>
@@ -1566,7 +1566,7 @@
           <a:p>
             <a:fld id="{7181039F-CB0C-E14D-A7EF-3BACE2CEF4EA}" type="datetimeFigureOut">
               <a:rPr lang="en-US" smtClean="0"/>
-              <a:t>1/25/2017</a:t>
+              <a:t>1/26/2017</a:t>
             </a:fld>
             <a:endParaRPr lang="en-US"/>
           </a:p>
@@ -1843,7 +1843,7 @@
           <a:p>
             <a:fld id="{7181039F-CB0C-E14D-A7EF-3BACE2CEF4EA}" type="datetimeFigureOut">
               <a:rPr lang="en-US" smtClean="0"/>
-              <a:t>1/25/2017</a:t>
+              <a:t>1/26/2017</a:t>
             </a:fld>
             <a:endParaRPr lang="en-US"/>
           </a:p>
@@ -2102,7 +2102,7 @@
           <a:p>
             <a:fld id="{7181039F-CB0C-E14D-A7EF-3BACE2CEF4EA}" type="datetimeFigureOut">
               <a:rPr lang="en-US" smtClean="0"/>
-              <a:t>1/25/2017</a:t>
+              <a:t>1/26/2017</a:t>
             </a:fld>
             <a:endParaRPr lang="en-US"/>
           </a:p>
@@ -2315,7 +2315,7 @@
           <a:p>
             <a:fld id="{7181039F-CB0C-E14D-A7EF-3BACE2CEF4EA}" type="datetimeFigureOut">
               <a:rPr lang="en-US" smtClean="0"/>
-              <a:t>1/25/2017</a:t>
+              <a:t>1/26/2017</a:t>
             </a:fld>
             <a:endParaRPr lang="en-US"/>
           </a:p>
@@ -2833,7 +2833,7 @@
         </p:spPr>
         <p:txBody>
           <a:bodyPr vert="horz" lIns="91440" tIns="45720" rIns="91440" bIns="45720" rtlCol="0">
-            <a:normAutofit fontScale="92500"/>
+            <a:normAutofit/>
           </a:bodyPr>
           <a:lstStyle>
             <a:lvl1pPr marL="0" indent="0" algn="r" defTabSz="457200" rtl="0" eaLnBrk="1" latinLnBrk="0" hangingPunct="1">
@@ -2995,8 +2995,12 @@
                 <a:latin typeface="Miriam" panose="020B0502050101010101" pitchFamily="34" charset="-79"/>
                 <a:cs typeface="Miriam" panose="020B0502050101010101" pitchFamily="34" charset="-79"/>
               </a:rPr>
-              <a:t>September 1, 2016</a:t>
-            </a:r>
+              <a:t>Jan 26, 2017</a:t>
+            </a:r>
+            <a:endParaRPr lang="en-US" sz="1600" dirty="0" smtClean="0">
+              <a:latin typeface="Miriam" panose="020B0502050101010101" pitchFamily="34" charset="-79"/>
+              <a:cs typeface="Miriam" panose="020B0502050101010101" pitchFamily="34" charset="-79"/>
+            </a:endParaRPr>
           </a:p>
         </p:txBody>
       </p:sp>
@@ -3010,7 +3014,7 @@
         </p:nvSpPr>
         <p:spPr>
           <a:xfrm>
-            <a:off x="2057996" y="6328391"/>
+            <a:off x="2057996" y="5898427"/>
             <a:ext cx="4907425" cy="455526"/>
           </a:xfrm>
           <a:prstGeom prst="rect">
@@ -3240,6 +3244,462 @@
           <a:p>
             <a:r>
               <a:rPr lang="en-US" dirty="0" smtClean="0"/>
+              <a:t>What are regular expressions useful for?</a:t>
+            </a:r>
+            <a:endParaRPr lang="en-US" dirty="0"/>
+          </a:p>
+        </p:txBody>
+      </p:sp>
+      <p:sp>
+        <p:nvSpPr>
+          <p:cNvPr id="3" name="Content Placeholder 2"/>
+          <p:cNvSpPr>
+            <a:spLocks noGrp="1"/>
+          </p:cNvSpPr>
+          <p:nvPr>
+            <p:ph idx="1"/>
+          </p:nvPr>
+        </p:nvSpPr>
+        <p:spPr/>
+        <p:txBody>
+          <a:bodyPr>
+            <a:normAutofit/>
+          </a:bodyPr>
+          <a:lstStyle/>
+          <a:p>
+            <a:r>
+              <a:rPr lang="en-US" dirty="0" smtClean="0"/>
+              <a:t>Searching for a vague target</a:t>
+            </a:r>
+          </a:p>
+          <a:p>
+            <a:pPr lvl="1"/>
+            <a:r>
+              <a:rPr lang="en-US" dirty="0" smtClean="0"/>
+              <a:t>If you know the </a:t>
+            </a:r>
+            <a:r>
+              <a:rPr lang="en-US" i="1" dirty="0" smtClean="0"/>
+              <a:t>structure</a:t>
+            </a:r>
+            <a:r>
+              <a:rPr lang="en-US" dirty="0" smtClean="0"/>
+              <a:t> of a string, you can encode this information into your search</a:t>
+            </a:r>
+          </a:p>
+          <a:p>
+            <a:r>
+              <a:rPr lang="en-US" dirty="0" smtClean="0"/>
+              <a:t>Search-and-replace</a:t>
+            </a:r>
+          </a:p>
+          <a:p>
+            <a:pPr lvl="1"/>
+            <a:r>
+              <a:rPr lang="en-US" dirty="0" smtClean="0"/>
+              <a:t>Many command-line tools let you use them!</a:t>
+            </a:r>
+          </a:p>
+          <a:p>
+            <a:pPr lvl="1"/>
+            <a:r>
+              <a:rPr lang="en-US" dirty="0" smtClean="0"/>
+              <a:t>Can be extremely useful when refactoring code!</a:t>
+            </a:r>
+          </a:p>
+          <a:p>
+            <a:pPr lvl="1"/>
+            <a:endParaRPr lang="en-US" dirty="0" smtClean="0"/>
+          </a:p>
+        </p:txBody>
+      </p:sp>
+    </p:spTree>
+    <p:extLst>
+      <p:ext uri="{BB962C8B-B14F-4D97-AF65-F5344CB8AC3E}">
+        <p14:creationId xmlns:p14="http://schemas.microsoft.com/office/powerpoint/2010/main" val="2627175943"/>
+      </p:ext>
+    </p:extLst>
+  </p:cSld>
+  <p:clrMapOvr>
+    <a:masterClrMapping/>
+  </p:clrMapOvr>
+  <p:timing>
+    <p:tnLst>
+      <p:par>
+        <p:cTn id="1" dur="indefinite" restart="never" nodeType="tmRoot">
+          <p:childTnLst>
+            <p:seq concurrent="1" nextAc="seek">
+              <p:cTn id="2" dur="indefinite" nodeType="mainSeq">
+                <p:childTnLst>
+                  <p:par>
+                    <p:cTn id="3" fill="hold">
+                      <p:stCondLst>
+                        <p:cond delay="indefinite"/>
+                      </p:stCondLst>
+                      <p:childTnLst>
+                        <p:par>
+                          <p:cTn id="4" fill="hold">
+                            <p:stCondLst>
+                              <p:cond delay="0"/>
+                            </p:stCondLst>
+                            <p:childTnLst>
+                              <p:par>
+                                <p:cTn id="5" presetID="1" presetClass="entr" presetSubtype="0" fill="hold" nodeType="clickEffect">
+                                  <p:stCondLst>
+                                    <p:cond delay="0"/>
+                                  </p:stCondLst>
+                                  <p:childTnLst>
+                                    <p:set>
+                                      <p:cBhvr>
+                                        <p:cTn id="6" dur="1" fill="hold">
+                                          <p:stCondLst>
+                                            <p:cond delay="0"/>
+                                          </p:stCondLst>
+                                        </p:cTn>
+                                        <p:tgtEl>
+                                          <p:spTgt spid="3">
+                                            <p:txEl>
+                                              <p:pRg st="1" end="1"/>
+                                            </p:txEl>
+                                          </p:spTgt>
+                                        </p:tgtEl>
+                                        <p:attrNameLst>
+                                          <p:attrName>style.visibility</p:attrName>
+                                        </p:attrNameLst>
+                                      </p:cBhvr>
+                                      <p:to>
+                                        <p:strVal val="visible"/>
+                                      </p:to>
+                                    </p:set>
+                                  </p:childTnLst>
+                                </p:cTn>
+                              </p:par>
+                            </p:childTnLst>
+                          </p:cTn>
+                        </p:par>
+                      </p:childTnLst>
+                    </p:cTn>
+                  </p:par>
+                  <p:par>
+                    <p:cTn id="7" fill="hold">
+                      <p:stCondLst>
+                        <p:cond delay="indefinite"/>
+                      </p:stCondLst>
+                      <p:childTnLst>
+                        <p:par>
+                          <p:cTn id="8" fill="hold">
+                            <p:stCondLst>
+                              <p:cond delay="0"/>
+                            </p:stCondLst>
+                            <p:childTnLst>
+                              <p:par>
+                                <p:cTn id="9" presetID="1" presetClass="entr" presetSubtype="0" fill="hold" nodeType="clickEffect">
+                                  <p:stCondLst>
+                                    <p:cond delay="0"/>
+                                  </p:stCondLst>
+                                  <p:childTnLst>
+                                    <p:set>
+                                      <p:cBhvr>
+                                        <p:cTn id="10" dur="1" fill="hold">
+                                          <p:stCondLst>
+                                            <p:cond delay="0"/>
+                                          </p:stCondLst>
+                                        </p:cTn>
+                                        <p:tgtEl>
+                                          <p:spTgt spid="3">
+                                            <p:txEl>
+                                              <p:pRg st="2" end="2"/>
+                                            </p:txEl>
+                                          </p:spTgt>
+                                        </p:tgtEl>
+                                        <p:attrNameLst>
+                                          <p:attrName>style.visibility</p:attrName>
+                                        </p:attrNameLst>
+                                      </p:cBhvr>
+                                      <p:to>
+                                        <p:strVal val="visible"/>
+                                      </p:to>
+                                    </p:set>
+                                  </p:childTnLst>
+                                </p:cTn>
+                              </p:par>
+                              <p:par>
+                                <p:cTn id="11" presetID="1" presetClass="entr" presetSubtype="0" fill="hold" nodeType="withEffect">
+                                  <p:stCondLst>
+                                    <p:cond delay="0"/>
+                                  </p:stCondLst>
+                                  <p:childTnLst>
+                                    <p:set>
+                                      <p:cBhvr>
+                                        <p:cTn id="12" dur="1" fill="hold">
+                                          <p:stCondLst>
+                                            <p:cond delay="0"/>
+                                          </p:stCondLst>
+                                        </p:cTn>
+                                        <p:tgtEl>
+                                          <p:spTgt spid="3">
+                                            <p:txEl>
+                                              <p:pRg st="3" end="3"/>
+                                            </p:txEl>
+                                          </p:spTgt>
+                                        </p:tgtEl>
+                                        <p:attrNameLst>
+                                          <p:attrName>style.visibility</p:attrName>
+                                        </p:attrNameLst>
+                                      </p:cBhvr>
+                                      <p:to>
+                                        <p:strVal val="visible"/>
+                                      </p:to>
+                                    </p:set>
+                                  </p:childTnLst>
+                                </p:cTn>
+                              </p:par>
+                              <p:par>
+                                <p:cTn id="13" presetID="1" presetClass="entr" presetSubtype="0" fill="hold" nodeType="withEffect">
+                                  <p:stCondLst>
+                                    <p:cond delay="0"/>
+                                  </p:stCondLst>
+                                  <p:childTnLst>
+                                    <p:set>
+                                      <p:cBhvr>
+                                        <p:cTn id="14" dur="1" fill="hold">
+                                          <p:stCondLst>
+                                            <p:cond delay="0"/>
+                                          </p:stCondLst>
+                                        </p:cTn>
+                                        <p:tgtEl>
+                                          <p:spTgt spid="3">
+                                            <p:txEl>
+                                              <p:pRg st="4" end="4"/>
+                                            </p:txEl>
+                                          </p:spTgt>
+                                        </p:tgtEl>
+                                        <p:attrNameLst>
+                                          <p:attrName>style.visibility</p:attrName>
+                                        </p:attrNameLst>
+                                      </p:cBhvr>
+                                      <p:to>
+                                        <p:strVal val="visible"/>
+                                      </p:to>
+                                    </p:set>
+                                  </p:childTnLst>
+                                </p:cTn>
+                              </p:par>
+                            </p:childTnLst>
+                          </p:cTn>
+                        </p:par>
+                      </p:childTnLst>
+                    </p:cTn>
+                  </p:par>
+                </p:childTnLst>
+              </p:cTn>
+              <p:prevCondLst>
+                <p:cond evt="onPrev" delay="0">
+                  <p:tgtEl>
+                    <p:sldTgt/>
+                  </p:tgtEl>
+                </p:cond>
+              </p:prevCondLst>
+              <p:nextCondLst>
+                <p:cond evt="onNext" delay="0">
+                  <p:tgtEl>
+                    <p:sldTgt/>
+                  </p:tgtEl>
+                </p:cond>
+              </p:nextCondLst>
+            </p:seq>
+          </p:childTnLst>
+        </p:cTn>
+      </p:par>
+    </p:tnLst>
+  </p:timing>
+</p:sld>
+</file>
+
+<file path=ppt/slides/slide11.xml><?xml version="1.0" encoding="utf-8"?>
+<p:sld xmlns:a="http://schemas.openxmlformats.org/drawingml/2006/main" xmlns:r="http://schemas.openxmlformats.org/officeDocument/2006/relationships" xmlns:p="http://schemas.openxmlformats.org/presentationml/2006/main">
+  <p:cSld>
+    <p:spTree>
+      <p:nvGrpSpPr>
+        <p:cNvPr id="1" name=""/>
+        <p:cNvGrpSpPr/>
+        <p:nvPr/>
+      </p:nvGrpSpPr>
+      <p:grpSpPr>
+        <a:xfrm>
+          <a:off x="0" y="0"/>
+          <a:ext cx="0" cy="0"/>
+          <a:chOff x="0" y="0"/>
+          <a:chExt cx="0" cy="0"/>
+        </a:xfrm>
+      </p:grpSpPr>
+      <p:sp>
+        <p:nvSpPr>
+          <p:cNvPr id="2" name="Title 1"/>
+          <p:cNvSpPr>
+            <a:spLocks noGrp="1"/>
+          </p:cNvSpPr>
+          <p:nvPr>
+            <p:ph type="title"/>
+          </p:nvPr>
+        </p:nvSpPr>
+        <p:spPr/>
+        <p:txBody>
+          <a:bodyPr/>
+          <a:lstStyle/>
+          <a:p>
+            <a:r>
+              <a:rPr lang="en-US" dirty="0" smtClean="0"/>
+              <a:t>Hands-on examples</a:t>
+            </a:r>
+            <a:endParaRPr lang="en-US" dirty="0"/>
+          </a:p>
+        </p:txBody>
+      </p:sp>
+      <p:sp>
+        <p:nvSpPr>
+          <p:cNvPr id="3" name="Content Placeholder 2"/>
+          <p:cNvSpPr>
+            <a:spLocks noGrp="1"/>
+          </p:cNvSpPr>
+          <p:nvPr>
+            <p:ph idx="1"/>
+          </p:nvPr>
+        </p:nvSpPr>
+        <p:spPr>
+          <a:xfrm>
+            <a:off x="457200" y="2049270"/>
+            <a:ext cx="8229600" cy="4547473"/>
+          </a:xfrm>
+        </p:spPr>
+        <p:txBody>
+          <a:bodyPr>
+            <a:normAutofit/>
+          </a:bodyPr>
+          <a:lstStyle/>
+          <a:p>
+            <a:r>
+              <a:rPr lang="en-US" dirty="0" smtClean="0"/>
+              <a:t>Browse </a:t>
+            </a:r>
+            <a:r>
+              <a:rPr lang="en-US" dirty="0"/>
+              <a:t>to </a:t>
+            </a:r>
+            <a:r>
+              <a:rPr lang="en-US" dirty="0">
+                <a:hlinkClick r:id="rId2"/>
+              </a:rPr>
+              <a:t>http://</a:t>
+            </a:r>
+            <a:r>
+              <a:rPr lang="en-US" dirty="0" smtClean="0">
+                <a:hlinkClick r:id="rId2"/>
+              </a:rPr>
+              <a:t>regexr.com/3f5dh</a:t>
+            </a:r>
+            <a:r>
+              <a:rPr lang="en-US" dirty="0" smtClean="0"/>
+              <a:t> (or pair up with someone) if you’d like to try a few hands-on challenges.</a:t>
+            </a:r>
+          </a:p>
+          <a:p>
+            <a:r>
+              <a:rPr lang="en-US" dirty="0" smtClean="0"/>
+              <a:t>Try to match:</a:t>
+            </a:r>
+          </a:p>
+          <a:p>
+            <a:pPr lvl="1"/>
+            <a:r>
+              <a:rPr lang="en-US" dirty="0" smtClean="0"/>
+              <a:t>Phone number</a:t>
+            </a:r>
+          </a:p>
+          <a:p>
+            <a:pPr lvl="1"/>
+            <a:r>
+              <a:rPr lang="en-US" dirty="0" smtClean="0"/>
+              <a:t>Email</a:t>
+            </a:r>
+          </a:p>
+          <a:p>
+            <a:pPr lvl="1"/>
+            <a:r>
+              <a:rPr lang="en-US" dirty="0" smtClean="0"/>
+              <a:t>All numbers in the example data section</a:t>
+            </a:r>
+          </a:p>
+          <a:p>
+            <a:r>
+              <a:rPr lang="en-US" dirty="0" smtClean="0"/>
+              <a:t>Any corpus you’d like to match against?</a:t>
+            </a:r>
+          </a:p>
+          <a:p>
+            <a:pPr lvl="1"/>
+            <a:endParaRPr lang="en-US" dirty="0" smtClean="0"/>
+          </a:p>
+          <a:p>
+            <a:pPr lvl="1"/>
+            <a:endParaRPr lang="en-US" dirty="0" smtClean="0"/>
+          </a:p>
+        </p:txBody>
+      </p:sp>
+    </p:spTree>
+    <p:extLst>
+      <p:ext uri="{BB962C8B-B14F-4D97-AF65-F5344CB8AC3E}">
+        <p14:creationId xmlns:p14="http://schemas.microsoft.com/office/powerpoint/2010/main" val="2307021946"/>
+      </p:ext>
+    </p:extLst>
+  </p:cSld>
+  <p:clrMapOvr>
+    <a:masterClrMapping/>
+  </p:clrMapOvr>
+  <p:timing>
+    <p:tnLst>
+      <p:par>
+        <p:cTn id="1" dur="indefinite" restart="never" nodeType="tmRoot"/>
+      </p:par>
+    </p:tnLst>
+  </p:timing>
+</p:sld>
+</file>
+
+<file path=ppt/slides/slide12.xml><?xml version="1.0" encoding="utf-8"?>
+<p:sld xmlns:a="http://schemas.openxmlformats.org/drawingml/2006/main" xmlns:r="http://schemas.openxmlformats.org/officeDocument/2006/relationships" xmlns:p="http://schemas.openxmlformats.org/presentationml/2006/main">
+  <p:cSld>
+    <p:spTree>
+      <p:nvGrpSpPr>
+        <p:cNvPr id="1" name=""/>
+        <p:cNvGrpSpPr/>
+        <p:nvPr/>
+      </p:nvGrpSpPr>
+      <p:grpSpPr>
+        <a:xfrm>
+          <a:off x="0" y="0"/>
+          <a:ext cx="0" cy="0"/>
+          <a:chOff x="0" y="0"/>
+          <a:chExt cx="0" cy="0"/>
+        </a:xfrm>
+      </p:grpSpPr>
+      <p:sp>
+        <p:nvSpPr>
+          <p:cNvPr id="2" name="Title 1"/>
+          <p:cNvSpPr>
+            <a:spLocks noGrp="1"/>
+          </p:cNvSpPr>
+          <p:nvPr>
+            <p:ph type="title"/>
+          </p:nvPr>
+        </p:nvSpPr>
+        <p:spPr/>
+        <p:txBody>
+          <a:bodyPr/>
+          <a:lstStyle/>
+          <a:p>
+            <a:r>
+              <a:rPr lang="en-US" dirty="0" smtClean="0"/>
               <a:t>A word on regex implementation</a:t>
             </a:r>
             <a:endParaRPr lang="en-US" dirty="0"/>
@@ -3270,23 +3730,51 @@
           <a:p>
             <a:r>
               <a:rPr lang="en-US" dirty="0" smtClean="0"/>
-              <a:t>Below is a state machine describing the regular expression /(</a:t>
-            </a:r>
-            <a:r>
-              <a:rPr lang="en-US" dirty="0" err="1" smtClean="0"/>
+              <a:t>Below is a state machine describing the regular expression </a:t>
+            </a:r>
+            <a:r>
+              <a:rPr lang="en-US" dirty="0" smtClean="0">
+                <a:solidFill>
+                  <a:schemeClr val="tx2"/>
+                </a:solidFill>
+              </a:rPr>
+              <a:t>/(</a:t>
+            </a:r>
+            <a:r>
+              <a:rPr lang="en-US" dirty="0" err="1" smtClean="0">
+                <a:solidFill>
+                  <a:schemeClr val="tx2"/>
+                </a:solidFill>
+              </a:rPr>
               <a:t>a|b</a:t>
             </a:r>
             <a:r>
-              <a:rPr lang="en-US" dirty="0" smtClean="0"/>
+              <a:rPr lang="en-US" dirty="0" smtClean="0">
+                <a:solidFill>
+                  <a:schemeClr val="tx2"/>
+                </a:solidFill>
+              </a:rPr>
               <a:t>)*</a:t>
             </a:r>
             <a:r>
-              <a:rPr lang="en-US" dirty="0" err="1" smtClean="0"/>
+              <a:rPr lang="en-US" dirty="0" err="1" smtClean="0">
+                <a:solidFill>
+                  <a:schemeClr val="tx2"/>
+                </a:solidFill>
+              </a:rPr>
               <a:t>abb</a:t>
             </a:r>
             <a:r>
-              <a:rPr lang="en-US" dirty="0" smtClean="0"/>
-              <a:t>/. At any step, we can take an arrow if we match its target</a:t>
+              <a:rPr lang="en-US" dirty="0" smtClean="0">
+                <a:solidFill>
+                  <a:schemeClr val="tx2"/>
+                </a:solidFill>
+              </a:rPr>
+              <a:t>/</a:t>
+            </a:r>
+            <a:r>
+              <a:rPr lang="en-US" dirty="0" smtClean="0"/>
+              <a:t>. At any step, we can take an arrow if we match its target</a:t>
             </a:r>
           </a:p>
         </p:txBody>
@@ -3332,6 +3820,37 @@
           </a:extLst>
         </p:spPr>
       </p:pic>
+      <p:sp>
+        <p:nvSpPr>
+          <p:cNvPr id="5" name="TextBox 4"/>
+          <p:cNvSpPr txBox="1"/>
+          <p:nvPr/>
+        </p:nvSpPr>
+        <p:spPr>
+          <a:xfrm>
+            <a:off x="2573867" y="6233071"/>
+            <a:ext cx="3996265" cy="276999"/>
+          </a:xfrm>
+          <a:prstGeom prst="rect">
+            <a:avLst/>
+          </a:prstGeom>
+          <a:noFill/>
+        </p:spPr>
+        <p:txBody>
+          <a:bodyPr wrap="square" rtlCol="0">
+            <a:spAutoFit/>
+          </a:bodyPr>
+          <a:lstStyle/>
+          <a:p>
+            <a:pPr algn="ctr"/>
+            <a:r>
+              <a:rPr lang="en-US" sz="1200" dirty="0" smtClean="0"/>
+              <a:t>Image from gamedev.net</a:t>
+            </a:r>
+            <a:endParaRPr lang="en-US" sz="1200" dirty="0"/>
+          </a:p>
+        </p:txBody>
+      </p:sp>
     </p:spTree>
     <p:extLst>
       <p:ext uri="{BB962C8B-B14F-4D97-AF65-F5344CB8AC3E}">
@@ -3352,7 +3871,7 @@
 </p:sld>
 </file>
 
-<file path=ppt/slides/slide11.xml><?xml version="1.0" encoding="utf-8"?>
+<file path=ppt/slides/slide13.xml><?xml version="1.0" encoding="utf-8"?>
 <p:sld xmlns:a="http://schemas.openxmlformats.org/drawingml/2006/main" xmlns:r="http://schemas.openxmlformats.org/officeDocument/2006/relationships" xmlns:p="http://schemas.openxmlformats.org/presentationml/2006/main">
   <p:cSld>
     <p:spTree>
@@ -3486,261 +4005,41 @@
           </a:extLst>
         </p:spPr>
       </p:pic>
+      <p:sp>
+        <p:nvSpPr>
+          <p:cNvPr id="5" name="TextBox 4"/>
+          <p:cNvSpPr txBox="1"/>
+          <p:nvPr/>
+        </p:nvSpPr>
+        <p:spPr>
+          <a:xfrm>
+            <a:off x="2573867" y="6233071"/>
+            <a:ext cx="3996265" cy="276999"/>
+          </a:xfrm>
+          <a:prstGeom prst="rect">
+            <a:avLst/>
+          </a:prstGeom>
+          <a:noFill/>
+        </p:spPr>
+        <p:txBody>
+          <a:bodyPr wrap="square" rtlCol="0">
+            <a:spAutoFit/>
+          </a:bodyPr>
+          <a:lstStyle/>
+          <a:p>
+            <a:pPr algn="ctr"/>
+            <a:r>
+              <a:rPr lang="en-US" sz="1200" dirty="0" smtClean="0"/>
+              <a:t>Image from gamedev.net</a:t>
+            </a:r>
+            <a:endParaRPr lang="en-US" sz="1200" dirty="0"/>
+          </a:p>
+        </p:txBody>
+      </p:sp>
     </p:spTree>
     <p:extLst>
       <p:ext uri="{BB962C8B-B14F-4D97-AF65-F5344CB8AC3E}">
         <p14:creationId xmlns:p14="http://schemas.microsoft.com/office/powerpoint/2010/main" val="1435432782"/>
-      </p:ext>
-    </p:extLst>
-  </p:cSld>
-  <p:clrMapOvr>
-    <a:masterClrMapping/>
-  </p:clrMapOvr>
-  <p:timing>
-    <p:tnLst>
-      <p:par>
-        <p:cTn id="1" dur="indefinite" restart="never" nodeType="tmRoot"/>
-      </p:par>
-    </p:tnLst>
-  </p:timing>
-</p:sld>
-</file>
-
-<file path=ppt/slides/slide12.xml><?xml version="1.0" encoding="utf-8"?>
-<p:sld xmlns:a="http://schemas.openxmlformats.org/drawingml/2006/main" xmlns:r="http://schemas.openxmlformats.org/officeDocument/2006/relationships" xmlns:p="http://schemas.openxmlformats.org/presentationml/2006/main">
-  <p:cSld>
-    <p:spTree>
-      <p:nvGrpSpPr>
-        <p:cNvPr id="1" name=""/>
-        <p:cNvGrpSpPr/>
-        <p:nvPr/>
-      </p:nvGrpSpPr>
-      <p:grpSpPr>
-        <a:xfrm>
-          <a:off x="0" y="0"/>
-          <a:ext cx="0" cy="0"/>
-          <a:chOff x="0" y="0"/>
-          <a:chExt cx="0" cy="0"/>
-        </a:xfrm>
-      </p:grpSpPr>
-      <p:sp>
-        <p:nvSpPr>
-          <p:cNvPr id="2" name="Title 1"/>
-          <p:cNvSpPr>
-            <a:spLocks noGrp="1"/>
-          </p:cNvSpPr>
-          <p:nvPr>
-            <p:ph type="title"/>
-          </p:nvPr>
-        </p:nvSpPr>
-        <p:spPr/>
-        <p:txBody>
-          <a:bodyPr/>
-          <a:lstStyle/>
-          <a:p>
-            <a:r>
-              <a:rPr lang="en-US" dirty="0" smtClean="0"/>
-              <a:t>What are regular expressions?</a:t>
-            </a:r>
-            <a:endParaRPr lang="en-US" dirty="0"/>
-          </a:p>
-        </p:txBody>
-      </p:sp>
-      <p:sp>
-        <p:nvSpPr>
-          <p:cNvPr id="3" name="Content Placeholder 2"/>
-          <p:cNvSpPr>
-            <a:spLocks noGrp="1"/>
-          </p:cNvSpPr>
-          <p:nvPr>
-            <p:ph idx="1"/>
-          </p:nvPr>
-        </p:nvSpPr>
-        <p:spPr>
-          <a:xfrm>
-            <a:off x="446314" y="2049270"/>
-            <a:ext cx="8229600" cy="4076893"/>
-          </a:xfrm>
-        </p:spPr>
-        <p:txBody>
-          <a:bodyPr>
-            <a:normAutofit/>
-          </a:bodyPr>
-          <a:lstStyle/>
-          <a:p>
-            <a:r>
-              <a:rPr lang="en-US" dirty="0" smtClean="0"/>
-              <a:t>Extensions give much more powerful tools like </a:t>
-            </a:r>
-            <a:r>
-              <a:rPr lang="en-US" dirty="0" err="1" smtClean="0"/>
-              <a:t>backreference</a:t>
-            </a:r>
-            <a:r>
-              <a:rPr lang="en-US" dirty="0" smtClean="0"/>
-              <a:t>, but </a:t>
-            </a:r>
-            <a:r>
-              <a:rPr lang="en-US" u="sng" dirty="0" smtClean="0"/>
-              <a:t>these generally discard the regularity of the grammar</a:t>
-            </a:r>
-            <a:endParaRPr lang="en-US" dirty="0" smtClean="0"/>
-          </a:p>
-          <a:p>
-            <a:pPr lvl="1"/>
-            <a:r>
-              <a:rPr lang="en-US" dirty="0" smtClean="0"/>
-              <a:t>As a result, relying heavily on these can result in a much slower expression evaluation</a:t>
-            </a:r>
-          </a:p>
-          <a:p>
-            <a:r>
-              <a:rPr lang="en-US" dirty="0" smtClean="0"/>
-              <a:t>An example: /</a:t>
-            </a:r>
-            <a:r>
-              <a:rPr lang="en-US" dirty="0"/>
-              <a:t>q(?!u</a:t>
-            </a:r>
-            <a:r>
-              <a:rPr lang="en-US" dirty="0" smtClean="0"/>
-              <a:t>)/ will match any ‘q’ not followed by a ‘u’ (a feature called </a:t>
-            </a:r>
-            <a:r>
-              <a:rPr lang="en-US" dirty="0" err="1" smtClean="0"/>
-              <a:t>lookahead</a:t>
-            </a:r>
-            <a:r>
-              <a:rPr lang="en-US" dirty="0" smtClean="0"/>
-              <a:t>)</a:t>
-            </a:r>
-          </a:p>
-        </p:txBody>
-      </p:sp>
-    </p:spTree>
-    <p:extLst>
-      <p:ext uri="{BB962C8B-B14F-4D97-AF65-F5344CB8AC3E}">
-        <p14:creationId xmlns:p14="http://schemas.microsoft.com/office/powerpoint/2010/main" val="1032991498"/>
-      </p:ext>
-    </p:extLst>
-  </p:cSld>
-  <p:clrMapOvr>
-    <a:masterClrMapping/>
-  </p:clrMapOvr>
-  <p:timing>
-    <p:tnLst>
-      <p:par>
-        <p:cTn id="1" dur="indefinite" restart="never" nodeType="tmRoot"/>
-      </p:par>
-    </p:tnLst>
-  </p:timing>
-</p:sld>
-</file>
-
-<file path=ppt/slides/slide13.xml><?xml version="1.0" encoding="utf-8"?>
-<p:sld xmlns:a="http://schemas.openxmlformats.org/drawingml/2006/main" xmlns:r="http://schemas.openxmlformats.org/officeDocument/2006/relationships" xmlns:p="http://schemas.openxmlformats.org/presentationml/2006/main">
-  <p:cSld>
-    <p:spTree>
-      <p:nvGrpSpPr>
-        <p:cNvPr id="1" name=""/>
-        <p:cNvGrpSpPr/>
-        <p:nvPr/>
-      </p:nvGrpSpPr>
-      <p:grpSpPr>
-        <a:xfrm>
-          <a:off x="0" y="0"/>
-          <a:ext cx="0" cy="0"/>
-          <a:chOff x="0" y="0"/>
-          <a:chExt cx="0" cy="0"/>
-        </a:xfrm>
-      </p:grpSpPr>
-      <p:sp>
-        <p:nvSpPr>
-          <p:cNvPr id="2" name="Title 1"/>
-          <p:cNvSpPr>
-            <a:spLocks noGrp="1"/>
-          </p:cNvSpPr>
-          <p:nvPr>
-            <p:ph type="title"/>
-          </p:nvPr>
-        </p:nvSpPr>
-        <p:spPr/>
-        <p:txBody>
-          <a:bodyPr/>
-          <a:lstStyle/>
-          <a:p>
-            <a:r>
-              <a:rPr lang="en-US" dirty="0" smtClean="0"/>
-              <a:t>What are regular expressions useful for?</a:t>
-            </a:r>
-            <a:endParaRPr lang="en-US" dirty="0"/>
-          </a:p>
-        </p:txBody>
-      </p:sp>
-      <p:sp>
-        <p:nvSpPr>
-          <p:cNvPr id="3" name="Content Placeholder 2"/>
-          <p:cNvSpPr>
-            <a:spLocks noGrp="1"/>
-          </p:cNvSpPr>
-          <p:nvPr>
-            <p:ph idx="1"/>
-          </p:nvPr>
-        </p:nvSpPr>
-        <p:spPr/>
-        <p:txBody>
-          <a:bodyPr>
-            <a:normAutofit/>
-          </a:bodyPr>
-          <a:lstStyle/>
-          <a:p>
-            <a:r>
-              <a:rPr lang="en-US" dirty="0" smtClean="0"/>
-              <a:t>Searching for a vague target</a:t>
-            </a:r>
-          </a:p>
-          <a:p>
-            <a:pPr lvl="1"/>
-            <a:r>
-              <a:rPr lang="en-US" dirty="0" smtClean="0"/>
-              <a:t>If you know the </a:t>
-            </a:r>
-            <a:r>
-              <a:rPr lang="en-US" i="1" dirty="0" smtClean="0"/>
-              <a:t>structure</a:t>
-            </a:r>
-            <a:r>
-              <a:rPr lang="en-US" dirty="0" smtClean="0"/>
-              <a:t> of a string, you can encode this information into your search</a:t>
-            </a:r>
-          </a:p>
-          <a:p>
-            <a:r>
-              <a:rPr lang="en-US" dirty="0" smtClean="0"/>
-              <a:t>Search-and-replace</a:t>
-            </a:r>
-          </a:p>
-          <a:p>
-            <a:pPr lvl="1"/>
-            <a:r>
-              <a:rPr lang="en-US" dirty="0" smtClean="0"/>
-              <a:t>Many command-line tools let you use them</a:t>
-            </a:r>
-            <a:r>
-              <a:rPr lang="en-US" dirty="0" smtClean="0"/>
-              <a:t>!</a:t>
-            </a:r>
-          </a:p>
-          <a:p>
-            <a:pPr lvl="1"/>
-            <a:endParaRPr lang="en-US" dirty="0" smtClean="0"/>
-          </a:p>
-        </p:txBody>
-      </p:sp>
-    </p:spTree>
-    <p:extLst>
-      <p:ext uri="{BB962C8B-B14F-4D97-AF65-F5344CB8AC3E}">
-        <p14:creationId xmlns:p14="http://schemas.microsoft.com/office/powerpoint/2010/main" val="2627175943"/>
       </p:ext>
     </p:extLst>
   </p:cSld>
@@ -3810,7 +4109,7 @@
         <p:spPr>
           <a:xfrm>
             <a:off x="457200" y="2891938"/>
-            <a:ext cx="8229600" cy="3234225"/>
+            <a:ext cx="8229600" cy="3704805"/>
           </a:xfrm>
         </p:spPr>
         <p:txBody>
@@ -3845,12 +4144,18 @@
           <a:p>
             <a:pPr lvl="1"/>
             <a:r>
-              <a:rPr lang="en-US" dirty="0"/>
-              <a:t>g</a:t>
-            </a:r>
-            <a:r>
-              <a:rPr lang="en-US" dirty="0" smtClean="0"/>
-              <a:t>/match/p</a:t>
+              <a:rPr lang="en-US" dirty="0" smtClean="0"/>
+              <a:t>g/match/p</a:t>
+            </a:r>
+          </a:p>
+          <a:p>
+            <a:r>
+              <a:rPr lang="en-US" dirty="0" smtClean="0"/>
+              <a:t>Very powerful when combined with </a:t>
+            </a:r>
+            <a:r>
+              <a:rPr lang="en-US" u="sng" dirty="0" smtClean="0"/>
+              <a:t>pipes</a:t>
             </a:r>
             <a:endParaRPr lang="en-US" dirty="0" smtClean="0"/>
           </a:p>
@@ -3932,7 +4237,190 @@
   <p:timing>
     <p:tnLst>
       <p:par>
-        <p:cTn id="1" dur="indefinite" restart="never" nodeType="tmRoot"/>
+        <p:cTn id="1" dur="indefinite" restart="never" nodeType="tmRoot">
+          <p:childTnLst>
+            <p:seq concurrent="1" nextAc="seek">
+              <p:cTn id="2" dur="indefinite" nodeType="mainSeq">
+                <p:childTnLst>
+                  <p:par>
+                    <p:cTn id="3" fill="hold">
+                      <p:stCondLst>
+                        <p:cond delay="indefinite"/>
+                      </p:stCondLst>
+                      <p:childTnLst>
+                        <p:par>
+                          <p:cTn id="4" fill="hold">
+                            <p:stCondLst>
+                              <p:cond delay="0"/>
+                            </p:stCondLst>
+                            <p:childTnLst>
+                              <p:par>
+                                <p:cTn id="5" presetID="1" presetClass="entr" presetSubtype="0" fill="hold" nodeType="clickEffect">
+                                  <p:stCondLst>
+                                    <p:cond delay="0"/>
+                                  </p:stCondLst>
+                                  <p:childTnLst>
+                                    <p:set>
+                                      <p:cBhvr>
+                                        <p:cTn id="6" dur="1" fill="hold">
+                                          <p:stCondLst>
+                                            <p:cond delay="0"/>
+                                          </p:stCondLst>
+                                        </p:cTn>
+                                        <p:tgtEl>
+                                          <p:spTgt spid="3">
+                                            <p:txEl>
+                                              <p:pRg st="1" end="1"/>
+                                            </p:txEl>
+                                          </p:spTgt>
+                                        </p:tgtEl>
+                                        <p:attrNameLst>
+                                          <p:attrName>style.visibility</p:attrName>
+                                        </p:attrNameLst>
+                                      </p:cBhvr>
+                                      <p:to>
+                                        <p:strVal val="visible"/>
+                                      </p:to>
+                                    </p:set>
+                                  </p:childTnLst>
+                                </p:cTn>
+                              </p:par>
+                              <p:par>
+                                <p:cTn id="7" presetID="1" presetClass="entr" presetSubtype="0" fill="hold" nodeType="withEffect">
+                                  <p:stCondLst>
+                                    <p:cond delay="0"/>
+                                  </p:stCondLst>
+                                  <p:childTnLst>
+                                    <p:set>
+                                      <p:cBhvr>
+                                        <p:cTn id="8" dur="1" fill="hold">
+                                          <p:stCondLst>
+                                            <p:cond delay="0"/>
+                                          </p:stCondLst>
+                                        </p:cTn>
+                                        <p:tgtEl>
+                                          <p:spTgt spid="3">
+                                            <p:txEl>
+                                              <p:pRg st="2" end="2"/>
+                                            </p:txEl>
+                                          </p:spTgt>
+                                        </p:tgtEl>
+                                        <p:attrNameLst>
+                                          <p:attrName>style.visibility</p:attrName>
+                                        </p:attrNameLst>
+                                      </p:cBhvr>
+                                      <p:to>
+                                        <p:strVal val="visible"/>
+                                      </p:to>
+                                    </p:set>
+                                  </p:childTnLst>
+                                </p:cTn>
+                              </p:par>
+                              <p:par>
+                                <p:cTn id="9" presetID="1" presetClass="entr" presetSubtype="0" fill="hold" nodeType="withEffect">
+                                  <p:stCondLst>
+                                    <p:cond delay="0"/>
+                                  </p:stCondLst>
+                                  <p:childTnLst>
+                                    <p:set>
+                                      <p:cBhvr>
+                                        <p:cTn id="10" dur="1" fill="hold">
+                                          <p:stCondLst>
+                                            <p:cond delay="0"/>
+                                          </p:stCondLst>
+                                        </p:cTn>
+                                        <p:tgtEl>
+                                          <p:spTgt spid="3">
+                                            <p:txEl>
+                                              <p:pRg st="3" end="3"/>
+                                            </p:txEl>
+                                          </p:spTgt>
+                                        </p:tgtEl>
+                                        <p:attrNameLst>
+                                          <p:attrName>style.visibility</p:attrName>
+                                        </p:attrNameLst>
+                                      </p:cBhvr>
+                                      <p:to>
+                                        <p:strVal val="visible"/>
+                                      </p:to>
+                                    </p:set>
+                                  </p:childTnLst>
+                                </p:cTn>
+                              </p:par>
+                            </p:childTnLst>
+                          </p:cTn>
+                        </p:par>
+                      </p:childTnLst>
+                    </p:cTn>
+                  </p:par>
+                  <p:par>
+                    <p:cTn id="11" fill="hold">
+                      <p:stCondLst>
+                        <p:cond delay="indefinite"/>
+                      </p:stCondLst>
+                      <p:childTnLst>
+                        <p:par>
+                          <p:cTn id="12" fill="hold">
+                            <p:stCondLst>
+                              <p:cond delay="0"/>
+                            </p:stCondLst>
+                            <p:childTnLst>
+                              <p:par>
+                                <p:cTn id="13" presetID="1" presetClass="entr" presetSubtype="0" fill="hold" nodeType="clickEffect">
+                                  <p:stCondLst>
+                                    <p:cond delay="0"/>
+                                  </p:stCondLst>
+                                  <p:childTnLst>
+                                    <p:set>
+                                      <p:cBhvr>
+                                        <p:cTn id="14" dur="1" fill="hold">
+                                          <p:stCondLst>
+                                            <p:cond delay="0"/>
+                                          </p:stCondLst>
+                                        </p:cTn>
+                                        <p:tgtEl>
+                                          <p:spTgt spid="3">
+                                            <p:txEl>
+                                              <p:pRg st="4" end="4"/>
+                                            </p:txEl>
+                                          </p:spTgt>
+                                        </p:tgtEl>
+                                        <p:attrNameLst>
+                                          <p:attrName>style.visibility</p:attrName>
+                                        </p:attrNameLst>
+                                      </p:cBhvr>
+                                      <p:to>
+                                        <p:strVal val="visible"/>
+                                      </p:to>
+                                    </p:set>
+                                  </p:childTnLst>
+                                </p:cTn>
+                              </p:par>
+                            </p:childTnLst>
+                          </p:cTn>
+                        </p:par>
+                      </p:childTnLst>
+                    </p:cTn>
+                  </p:par>
+                </p:childTnLst>
+              </p:cTn>
+              <p:prevCondLst>
+                <p:cond evt="onPrev" delay="0">
+                  <p:tgtEl>
+                    <p:sldTgt/>
+                  </p:tgtEl>
+                </p:cond>
+              </p:prevCondLst>
+              <p:nextCondLst>
+                <p:cond evt="onNext" delay="0">
+                  <p:tgtEl>
+                    <p:sldTgt/>
+                  </p:tgtEl>
+                </p:cond>
+              </p:nextCondLst>
+            </p:seq>
+          </p:childTnLst>
+        </p:cTn>
       </p:par>
     </p:tnLst>
   </p:timing>
@@ -4391,7 +4879,128 @@
   <p:timing>
     <p:tnLst>
       <p:par>
-        <p:cTn id="1" dur="indefinite" restart="never" nodeType="tmRoot"/>
+        <p:cTn id="1" dur="indefinite" restart="never" nodeType="tmRoot">
+          <p:childTnLst>
+            <p:seq concurrent="1" nextAc="seek">
+              <p:cTn id="2" dur="indefinite" nodeType="mainSeq">
+                <p:childTnLst>
+                  <p:par>
+                    <p:cTn id="3" fill="hold">
+                      <p:stCondLst>
+                        <p:cond delay="indefinite"/>
+                      </p:stCondLst>
+                      <p:childTnLst>
+                        <p:par>
+                          <p:cTn id="4" fill="hold">
+                            <p:stCondLst>
+                              <p:cond delay="0"/>
+                            </p:stCondLst>
+                            <p:childTnLst>
+                              <p:par>
+                                <p:cTn id="5" presetID="1" presetClass="entr" presetSubtype="0" fill="hold" nodeType="clickEffect">
+                                  <p:stCondLst>
+                                    <p:cond delay="0"/>
+                                  </p:stCondLst>
+                                  <p:childTnLst>
+                                    <p:set>
+                                      <p:cBhvr>
+                                        <p:cTn id="6" dur="1" fill="hold">
+                                          <p:stCondLst>
+                                            <p:cond delay="0"/>
+                                          </p:stCondLst>
+                                        </p:cTn>
+                                        <p:tgtEl>
+                                          <p:spTgt spid="3">
+                                            <p:txEl>
+                                              <p:pRg st="1" end="1"/>
+                                            </p:txEl>
+                                          </p:spTgt>
+                                        </p:tgtEl>
+                                        <p:attrNameLst>
+                                          <p:attrName>style.visibility</p:attrName>
+                                        </p:attrNameLst>
+                                      </p:cBhvr>
+                                      <p:to>
+                                        <p:strVal val="visible"/>
+                                      </p:to>
+                                    </p:set>
+                                  </p:childTnLst>
+                                </p:cTn>
+                              </p:par>
+                            </p:childTnLst>
+                          </p:cTn>
+                        </p:par>
+                      </p:childTnLst>
+                    </p:cTn>
+                  </p:par>
+                  <p:par>
+                    <p:cTn id="7" fill="hold">
+                      <p:stCondLst>
+                        <p:cond delay="indefinite"/>
+                      </p:stCondLst>
+                      <p:childTnLst>
+                        <p:par>
+                          <p:cTn id="8" fill="hold">
+                            <p:stCondLst>
+                              <p:cond delay="0"/>
+                            </p:stCondLst>
+                            <p:childTnLst>
+                              <p:par>
+                                <p:cTn id="9" presetID="1" presetClass="entr" presetSubtype="0" fill="hold" nodeType="clickEffect">
+                                  <p:stCondLst>
+                                    <p:cond delay="0"/>
+                                  </p:stCondLst>
+                                  <p:childTnLst>
+                                    <p:set>
+                                      <p:cBhvr>
+                                        <p:cTn id="10" dur="1" fill="hold">
+                                          <p:stCondLst>
+                                            <p:cond delay="0"/>
+                                          </p:stCondLst>
+                                        </p:cTn>
+                                        <p:tgtEl>
+                                          <p:spTgt spid="3">
+                                            <p:txEl>
+                                              <p:pRg st="2" end="2"/>
+                                            </p:txEl>
+                                          </p:spTgt>
+                                        </p:tgtEl>
+                                        <p:attrNameLst>
+                                          <p:attrName>style.visibility</p:attrName>
+                                        </p:attrNameLst>
+                                      </p:cBhvr>
+                                      <p:to>
+                                        <p:strVal val="visible"/>
+                                      </p:to>
+                                    </p:set>
+                                  </p:childTnLst>
+                                </p:cTn>
+                              </p:par>
+                            </p:childTnLst>
+                          </p:cTn>
+                        </p:par>
+                      </p:childTnLst>
+                    </p:cTn>
+                  </p:par>
+                </p:childTnLst>
+              </p:cTn>
+              <p:prevCondLst>
+                <p:cond evt="onPrev" delay="0">
+                  <p:tgtEl>
+                    <p:sldTgt/>
+                  </p:tgtEl>
+                </p:cond>
+              </p:prevCondLst>
+              <p:nextCondLst>
+                <p:cond evt="onNext" delay="0">
+                  <p:tgtEl>
+                    <p:sldTgt/>
+                  </p:tgtEl>
+                </p:cond>
+              </p:nextCondLst>
+            </p:seq>
+          </p:childTnLst>
+        </p:cTn>
       </p:par>
     </p:tnLst>
   </p:timing>
@@ -4431,8 +5040,8 @@
           <a:lstStyle/>
           <a:p>
             <a:r>
-              <a:rPr lang="en-US" dirty="0" err="1" smtClean="0"/>
-              <a:t>awk</a:t>
+              <a:rPr lang="en-US" dirty="0" smtClean="0"/>
+              <a:t>Regex in Python</a:t>
             </a:r>
             <a:endParaRPr lang="en-US" dirty="0"/>
           </a:p>
@@ -4448,12 +5057,7 @@
             <p:ph idx="1"/>
           </p:nvPr>
         </p:nvSpPr>
-        <p:spPr>
-          <a:xfrm>
-            <a:off x="457200" y="2891938"/>
-            <a:ext cx="8229600" cy="3234225"/>
-          </a:xfrm>
-        </p:spPr>
+        <p:spPr/>
         <p:txBody>
           <a:bodyPr>
             <a:normAutofit/>
@@ -4462,88 +5066,70 @@
           <a:p>
             <a:r>
               <a:rPr lang="en-US" dirty="0" smtClean="0"/>
-              <a:t>Like </a:t>
+              <a:t>`re` module</a:t>
+            </a:r>
+          </a:p>
+          <a:p>
+            <a:r>
+              <a:rPr lang="en-US" dirty="0" smtClean="0"/>
+              <a:t>Match objects are the return value</a:t>
+            </a:r>
+          </a:p>
+          <a:p>
+            <a:r>
+              <a:rPr lang="en-US" dirty="0" smtClean="0"/>
+              <a:t>Replacement (there’s also `</a:t>
             </a:r>
             <a:r>
               <a:rPr lang="en-US" dirty="0" err="1" smtClean="0"/>
-              <a:t>sed</a:t>
-            </a:r>
-            <a:r>
-              <a:rPr lang="en-US" dirty="0" smtClean="0"/>
-              <a:t>, but less focused on stream edits</a:t>
-            </a:r>
-          </a:p>
-          <a:p>
-            <a:pPr lvl="1"/>
-            <a:r>
-              <a:rPr lang="en-US" dirty="0" smtClean="0"/>
-              <a:t>Allows lots of flow control, perform novel operations like arithmetic</a:t>
-            </a:r>
-          </a:p>
-          <a:p>
-            <a:pPr lvl="1"/>
-            <a:r>
-              <a:rPr lang="en-US" dirty="0" smtClean="0"/>
-              <a:t>Personall</a:t>
-            </a:r>
-            <a:r>
-              <a:rPr lang="en-US" dirty="0" smtClean="0"/>
-              <a:t>y wrote my way around awful database at old employer, script still running!</a:t>
+              <a:t>str.replace</a:t>
+            </a:r>
+            <a:r>
+              <a:rPr lang="en-US" dirty="0" smtClean="0"/>
+              <a:t>()`)</a:t>
+            </a:r>
+          </a:p>
+          <a:p>
+            <a:r>
+              <a:rPr lang="en-US" dirty="0" smtClean="0"/>
+              <a:t>Pre-compiled regex if you use one frequently</a:t>
+            </a:r>
+          </a:p>
+          <a:p>
+            <a:r>
+              <a:rPr lang="en-US" dirty="0" smtClean="0"/>
+              <a:t>Django use case: </a:t>
+            </a:r>
+            <a:r>
+              <a:rPr lang="en-US" dirty="0" smtClean="0">
+                <a:hlinkClick r:id="rId2"/>
+              </a:rPr>
+              <a:t>https</a:t>
+            </a:r>
+            <a:r>
+              <a:rPr lang="en-US" dirty="0">
+                <a:hlinkClick r:id="rId2"/>
+              </a:rPr>
+              <a:t>://</a:t>
+            </a:r>
+            <a:r>
+              <a:rPr lang="en-US" dirty="0" smtClean="0">
+                <a:hlinkClick r:id="rId2"/>
+              </a:rPr>
+              <a:t>git.io/vMhVV</a:t>
+            </a:r>
+            <a:r>
+              <a:rPr lang="en-US" dirty="0"/>
+              <a:t> </a:t>
             </a:r>
             <a:endParaRPr lang="en-US" dirty="0" smtClean="0"/>
-          </a:p>
-          <a:p>
-            <a:r>
-              <a:rPr lang="en-US" dirty="0" smtClean="0"/>
-              <a:t>Defer to Peter’s remarks</a:t>
-            </a:r>
-            <a:endParaRPr lang="en-US" dirty="0" smtClean="0"/>
-          </a:p>
-        </p:txBody>
-      </p:sp>
-      <p:sp>
-        <p:nvSpPr>
-          <p:cNvPr id="4" name="TextBox 3"/>
-          <p:cNvSpPr txBox="1"/>
-          <p:nvPr/>
-        </p:nvSpPr>
-        <p:spPr>
-          <a:xfrm>
-            <a:off x="457201" y="2049270"/>
-            <a:ext cx="8229599" cy="646331"/>
-          </a:xfrm>
-          <a:prstGeom prst="rect">
-            <a:avLst/>
-          </a:prstGeom>
-          <a:solidFill>
-            <a:schemeClr val="tx1"/>
-          </a:solidFill>
-        </p:spPr>
-        <p:txBody>
-          <a:bodyPr wrap="square" rtlCol="0">
-            <a:spAutoFit/>
-          </a:bodyPr>
-          <a:lstStyle/>
-          <a:p>
-            <a:r>
-              <a:rPr lang="en-US" dirty="0">
-                <a:solidFill>
-                  <a:schemeClr val="bg1">
-                    <a:lumMod val="85000"/>
-                  </a:schemeClr>
-                </a:solidFill>
-                <a:latin typeface="Consolas" panose="020B0609020204030204" pitchFamily="49" charset="0"/>
-                <a:cs typeface="Consolas" panose="020B0609020204030204" pitchFamily="49" charset="0"/>
-              </a:rPr>
-              <a:t>gawk [ POSIX or GNU style options ] -f program-file [ -- ] file ...</a:t>
-            </a:r>
           </a:p>
         </p:txBody>
       </p:sp>
     </p:spTree>
     <p:extLst>
       <p:ext uri="{BB962C8B-B14F-4D97-AF65-F5344CB8AC3E}">
-        <p14:creationId xmlns:p14="http://schemas.microsoft.com/office/powerpoint/2010/main" val="1511937421"/>
+        <p14:creationId xmlns:p14="http://schemas.microsoft.com/office/powerpoint/2010/main" val="966442407"/>
       </p:ext>
     </p:extLst>
   </p:cSld>
@@ -4553,7 +5139,226 @@
   <p:timing>
     <p:tnLst>
       <p:par>
-        <p:cTn id="1" dur="indefinite" restart="never" nodeType="tmRoot"/>
+        <p:cTn id="1" dur="indefinite" restart="never" nodeType="tmRoot">
+          <p:childTnLst>
+            <p:seq concurrent="1" nextAc="seek">
+              <p:cTn id="2" dur="indefinite" nodeType="mainSeq">
+                <p:childTnLst>
+                  <p:par>
+                    <p:cTn id="3" fill="hold">
+                      <p:stCondLst>
+                        <p:cond delay="indefinite"/>
+                      </p:stCondLst>
+                      <p:childTnLst>
+                        <p:par>
+                          <p:cTn id="4" fill="hold">
+                            <p:stCondLst>
+                              <p:cond delay="0"/>
+                            </p:stCondLst>
+                            <p:childTnLst>
+                              <p:par>
+                                <p:cTn id="5" presetID="1" presetClass="entr" presetSubtype="0" fill="hold" nodeType="clickEffect">
+                                  <p:stCondLst>
+                                    <p:cond delay="0"/>
+                                  </p:stCondLst>
+                                  <p:childTnLst>
+                                    <p:set>
+                                      <p:cBhvr>
+                                        <p:cTn id="6" dur="1" fill="hold">
+                                          <p:stCondLst>
+                                            <p:cond delay="0"/>
+                                          </p:stCondLst>
+                                        </p:cTn>
+                                        <p:tgtEl>
+                                          <p:spTgt spid="3">
+                                            <p:txEl>
+                                              <p:pRg st="1" end="1"/>
+                                            </p:txEl>
+                                          </p:spTgt>
+                                        </p:tgtEl>
+                                        <p:attrNameLst>
+                                          <p:attrName>style.visibility</p:attrName>
+                                        </p:attrNameLst>
+                                      </p:cBhvr>
+                                      <p:to>
+                                        <p:strVal val="visible"/>
+                                      </p:to>
+                                    </p:set>
+                                  </p:childTnLst>
+                                </p:cTn>
+                              </p:par>
+                            </p:childTnLst>
+                          </p:cTn>
+                        </p:par>
+                      </p:childTnLst>
+                    </p:cTn>
+                  </p:par>
+                  <p:par>
+                    <p:cTn id="7" fill="hold">
+                      <p:stCondLst>
+                        <p:cond delay="indefinite"/>
+                      </p:stCondLst>
+                      <p:childTnLst>
+                        <p:par>
+                          <p:cTn id="8" fill="hold">
+                            <p:stCondLst>
+                              <p:cond delay="0"/>
+                            </p:stCondLst>
+                            <p:childTnLst>
+                              <p:par>
+                                <p:cTn id="9" presetID="1" presetClass="entr" presetSubtype="0" fill="hold" nodeType="clickEffect">
+                                  <p:stCondLst>
+                                    <p:cond delay="0"/>
+                                  </p:stCondLst>
+                                  <p:childTnLst>
+                                    <p:set>
+                                      <p:cBhvr>
+                                        <p:cTn id="10" dur="1" fill="hold">
+                                          <p:stCondLst>
+                                            <p:cond delay="0"/>
+                                          </p:stCondLst>
+                                        </p:cTn>
+                                        <p:tgtEl>
+                                          <p:spTgt spid="3">
+                                            <p:txEl>
+                                              <p:pRg st="2" end="2"/>
+                                            </p:txEl>
+                                          </p:spTgt>
+                                        </p:tgtEl>
+                                        <p:attrNameLst>
+                                          <p:attrName>style.visibility</p:attrName>
+                                        </p:attrNameLst>
+                                      </p:cBhvr>
+                                      <p:to>
+                                        <p:strVal val="visible"/>
+                                      </p:to>
+                                    </p:set>
+                                  </p:childTnLst>
+                                </p:cTn>
+                              </p:par>
+                            </p:childTnLst>
+                          </p:cTn>
+                        </p:par>
+                      </p:childTnLst>
+                    </p:cTn>
+                  </p:par>
+                  <p:par>
+                    <p:cTn id="11" fill="hold">
+                      <p:stCondLst>
+                        <p:cond delay="indefinite"/>
+                      </p:stCondLst>
+                      <p:childTnLst>
+                        <p:par>
+                          <p:cTn id="12" fill="hold">
+                            <p:stCondLst>
+                              <p:cond delay="0"/>
+                            </p:stCondLst>
+                            <p:childTnLst>
+                              <p:par>
+                                <p:cTn id="13" presetID="1" presetClass="entr" presetSubtype="0" fill="hold" nodeType="clickEffect">
+                                  <p:stCondLst>
+                                    <p:cond delay="0"/>
+                                  </p:stCondLst>
+                                  <p:childTnLst>
+                                    <p:set>
+                                      <p:cBhvr>
+                                        <p:cTn id="14" dur="1" fill="hold">
+                                          <p:stCondLst>
+                                            <p:cond delay="0"/>
+                                          </p:stCondLst>
+                                        </p:cTn>
+                                        <p:tgtEl>
+                                          <p:spTgt spid="3">
+                                            <p:txEl>
+                                              <p:pRg st="3" end="3"/>
+                                            </p:txEl>
+                                          </p:spTgt>
+                                        </p:tgtEl>
+                                        <p:attrNameLst>
+                                          <p:attrName>style.visibility</p:attrName>
+                                        </p:attrNameLst>
+                                      </p:cBhvr>
+                                      <p:to>
+                                        <p:strVal val="visible"/>
+                                      </p:to>
+                                    </p:set>
+                                  </p:childTnLst>
+                                </p:cTn>
+                              </p:par>
+                            </p:childTnLst>
+                          </p:cTn>
+                        </p:par>
+                      </p:childTnLst>
+                    </p:cTn>
+                  </p:par>
+                  <p:par>
+                    <p:cTn id="15" fill="hold">
+                      <p:stCondLst>
+                        <p:cond delay="indefinite"/>
+                      </p:stCondLst>
+                      <p:childTnLst>
+                        <p:par>
+                          <p:cTn id="16" fill="hold">
+                            <p:stCondLst>
+                              <p:cond delay="0"/>
+                            </p:stCondLst>
+                            <p:childTnLst>
+                              <p:par>
+                                <p:cTn id="17" presetID="1" presetClass="entr" presetSubtype="0" fill="hold" nodeType="clickEffect">
+                                  <p:stCondLst>
+                                    <p:cond delay="0"/>
+                                  </p:stCondLst>
+                                  <p:childTnLst>
+                                    <p:set>
+                                      <p:cBhvr>
+                                        <p:cTn id="18" dur="1" fill="hold">
+                                          <p:stCondLst>
+                                            <p:cond delay="0"/>
+                                          </p:stCondLst>
+                                        </p:cTn>
+                                        <p:tgtEl>
+                                          <p:spTgt spid="3">
+                                            <p:txEl>
+                                              <p:pRg st="4" end="4"/>
+                                            </p:txEl>
+                                          </p:spTgt>
+                                        </p:tgtEl>
+                                        <p:attrNameLst>
+                                          <p:attrName>style.visibility</p:attrName>
+                                        </p:attrNameLst>
+                                      </p:cBhvr>
+                                      <p:to>
+                                        <p:strVal val="visible"/>
+                                      </p:to>
+                                    </p:set>
+                                  </p:childTnLst>
+                                </p:cTn>
+                              </p:par>
+                            </p:childTnLst>
+                          </p:cTn>
+                        </p:par>
+                      </p:childTnLst>
+                    </p:cTn>
+                  </p:par>
+                </p:childTnLst>
+              </p:cTn>
+              <p:prevCondLst>
+                <p:cond evt="onPrev" delay="0">
+                  <p:tgtEl>
+                    <p:sldTgt/>
+                  </p:tgtEl>
+                </p:cond>
+              </p:prevCondLst>
+              <p:nextCondLst>
+                <p:cond evt="onNext" delay="0">
+                  <p:tgtEl>
+                    <p:sldTgt/>
+                  </p:tgtEl>
+                </p:cond>
+              </p:nextCondLst>
+            </p:seq>
+          </p:childTnLst>
+        </p:cTn>
       </p:par>
     </p:tnLst>
   </p:timing>
@@ -4593,8 +5398,8 @@
           <a:lstStyle/>
           <a:p>
             <a:r>
-              <a:rPr lang="en-US" dirty="0" smtClean="0"/>
-              <a:t>What are regular expressions useful for?</a:t>
+              <a:rPr lang="en-US" dirty="0" err="1" smtClean="0"/>
+              <a:t>awk</a:t>
             </a:r>
             <a:endParaRPr lang="en-US" dirty="0"/>
           </a:p>
@@ -4610,7 +5415,12 @@
             <p:ph idx="1"/>
           </p:nvPr>
         </p:nvSpPr>
-        <p:spPr/>
+        <p:spPr>
+          <a:xfrm>
+            <a:off x="457200" y="2891938"/>
+            <a:ext cx="8229600" cy="3234225"/>
+          </a:xfrm>
+        </p:spPr>
         <p:txBody>
           <a:bodyPr>
             <a:normAutofit/>
@@ -4619,7 +5429,7 @@
           <a:p>
             <a:r>
               <a:rPr lang="en-US" dirty="0" smtClean="0"/>
-              <a:t>Hands-on examples, one or two with grep and </a:t>
+              <a:t>Like </a:t>
             </a:r>
             <a:r>
               <a:rPr lang="en-US" dirty="0" err="1" smtClean="0"/>
@@ -4627,67 +5437,74 @@
             </a:r>
             <a:r>
               <a:rPr lang="en-US" dirty="0" smtClean="0"/>
-              <a:t>, two with Python</a:t>
+              <a:t>, but less focused on stream edits</a:t>
             </a:r>
           </a:p>
           <a:p>
             <a:pPr lvl="1"/>
             <a:r>
-              <a:rPr lang="en-US" dirty="0"/>
-              <a:t>Matching a time</a:t>
+              <a:rPr lang="en-US" dirty="0" smtClean="0"/>
+              <a:t>Allows lots of flow control, perform novel operations like arithmetic</a:t>
             </a:r>
           </a:p>
           <a:p>
             <a:pPr lvl="1"/>
             <a:r>
               <a:rPr lang="en-US" dirty="0" smtClean="0"/>
-              <a:t>Matching a mm/</a:t>
-            </a:r>
-            <a:r>
-              <a:rPr lang="en-US" dirty="0" err="1" smtClean="0"/>
-              <a:t>dd</a:t>
-            </a:r>
-            <a:r>
-              <a:rPr lang="en-US" dirty="0" smtClean="0"/>
-              <a:t>/</a:t>
-            </a:r>
-            <a:r>
-              <a:rPr lang="en-US" dirty="0" err="1" smtClean="0"/>
-              <a:t>yyyy</a:t>
-            </a:r>
-            <a:r>
-              <a:rPr lang="en-US" dirty="0" smtClean="0"/>
-              <a:t> date</a:t>
-            </a:r>
-          </a:p>
-          <a:p>
-            <a:pPr lvl="1"/>
-            <a:r>
-              <a:rPr lang="en-US" dirty="0" smtClean="0"/>
-              <a:t>Matching a phone number</a:t>
-            </a:r>
-          </a:p>
-          <a:p>
-            <a:pPr lvl="1"/>
-            <a:r>
-              <a:rPr lang="en-US" dirty="0" smtClean="0"/>
-              <a:t>Matching a repeated string</a:t>
-            </a:r>
-          </a:p>
-          <a:p>
-            <a:pPr lvl="1"/>
-            <a:endParaRPr lang="en-US" dirty="0" smtClean="0"/>
-          </a:p>
-          <a:p>
-            <a:pPr lvl="1"/>
-            <a:endParaRPr lang="en-US" dirty="0" smtClean="0"/>
+              <a:t>Personally wrote my way around awful database at old employer, script still running!</a:t>
+            </a:r>
+          </a:p>
+          <a:p>
+            <a:r>
+              <a:rPr lang="en-US" dirty="0" smtClean="0"/>
+              <a:t>Peter can tell us more!</a:t>
+            </a:r>
+          </a:p>
+        </p:txBody>
+      </p:sp>
+      <p:sp>
+        <p:nvSpPr>
+          <p:cNvPr id="4" name="TextBox 3"/>
+          <p:cNvSpPr txBox="1"/>
+          <p:nvPr/>
+        </p:nvSpPr>
+        <p:spPr>
+          <a:xfrm>
+            <a:off x="457201" y="2049270"/>
+            <a:ext cx="8229599" cy="646331"/>
+          </a:xfrm>
+          <a:prstGeom prst="rect">
+            <a:avLst/>
+          </a:prstGeom>
+          <a:solidFill>
+            <a:schemeClr val="tx1"/>
+          </a:solidFill>
+        </p:spPr>
+        <p:txBody>
+          <a:bodyPr wrap="square" rtlCol="0">
+            <a:spAutoFit/>
+          </a:bodyPr>
+          <a:lstStyle/>
+          <a:p>
+            <a:r>
+              <a:rPr lang="en-US" dirty="0">
+                <a:solidFill>
+                  <a:schemeClr val="bg1">
+                    <a:lumMod val="85000"/>
+                  </a:schemeClr>
+                </a:solidFill>
+                <a:latin typeface="Consolas" panose="020B0609020204030204" pitchFamily="49" charset="0"/>
+                <a:cs typeface="Consolas" panose="020B0609020204030204" pitchFamily="49" charset="0"/>
+              </a:rPr>
+              <a:t>gawk [ POSIX or GNU style options ] -f program-file [ -- ] file ...</a:t>
+            </a:r>
           </a:p>
         </p:txBody>
       </p:sp>
     </p:spTree>
     <p:extLst>
       <p:ext uri="{BB962C8B-B14F-4D97-AF65-F5344CB8AC3E}">
-        <p14:creationId xmlns:p14="http://schemas.microsoft.com/office/powerpoint/2010/main" val="2307021946"/>
+        <p14:creationId xmlns:p14="http://schemas.microsoft.com/office/powerpoint/2010/main" val="1511937421"/>
       </p:ext>
     </p:extLst>
   </p:cSld>
@@ -4697,7 +5514,177 @@
   <p:timing>
     <p:tnLst>
       <p:par>
-        <p:cTn id="1" dur="indefinite" restart="never" nodeType="tmRoot"/>
+        <p:cTn id="1" dur="indefinite" restart="never" nodeType="tmRoot">
+          <p:childTnLst>
+            <p:seq concurrent="1" nextAc="seek">
+              <p:cTn id="2" dur="indefinite" nodeType="mainSeq">
+                <p:childTnLst>
+                  <p:par>
+                    <p:cTn id="3" fill="hold">
+                      <p:stCondLst>
+                        <p:cond delay="indefinite"/>
+                      </p:stCondLst>
+                      <p:childTnLst>
+                        <p:par>
+                          <p:cTn id="4" fill="hold">
+                            <p:stCondLst>
+                              <p:cond delay="0"/>
+                            </p:stCondLst>
+                            <p:childTnLst>
+                              <p:par>
+                                <p:cTn id="5" presetID="1" presetClass="entr" presetSubtype="0" fill="hold" nodeType="clickEffect">
+                                  <p:stCondLst>
+                                    <p:cond delay="0"/>
+                                  </p:stCondLst>
+                                  <p:childTnLst>
+                                    <p:set>
+                                      <p:cBhvr>
+                                        <p:cTn id="6" dur="1" fill="hold">
+                                          <p:stCondLst>
+                                            <p:cond delay="0"/>
+                                          </p:stCondLst>
+                                        </p:cTn>
+                                        <p:tgtEl>
+                                          <p:spTgt spid="3">
+                                            <p:txEl>
+                                              <p:pRg st="1" end="1"/>
+                                            </p:txEl>
+                                          </p:spTgt>
+                                        </p:tgtEl>
+                                        <p:attrNameLst>
+                                          <p:attrName>style.visibility</p:attrName>
+                                        </p:attrNameLst>
+                                      </p:cBhvr>
+                                      <p:to>
+                                        <p:strVal val="visible"/>
+                                      </p:to>
+                                    </p:set>
+                                  </p:childTnLst>
+                                </p:cTn>
+                              </p:par>
+                            </p:childTnLst>
+                          </p:cTn>
+                        </p:par>
+                      </p:childTnLst>
+                    </p:cTn>
+                  </p:par>
+                  <p:par>
+                    <p:cTn id="7" fill="hold">
+                      <p:stCondLst>
+                        <p:cond delay="indefinite"/>
+                      </p:stCondLst>
+                      <p:childTnLst>
+                        <p:par>
+                          <p:cTn id="8" fill="hold">
+                            <p:stCondLst>
+                              <p:cond delay="0"/>
+                            </p:stCondLst>
+                            <p:childTnLst>
+                              <p:par>
+                                <p:cTn id="9" presetID="1" presetClass="entr" presetSubtype="0" fill="hold" nodeType="clickEffect">
+                                  <p:stCondLst>
+                                    <p:cond delay="0"/>
+                                  </p:stCondLst>
+                                  <p:childTnLst>
+                                    <p:set>
+                                      <p:cBhvr>
+                                        <p:cTn id="10" dur="1" fill="hold">
+                                          <p:stCondLst>
+                                            <p:cond delay="0"/>
+                                          </p:stCondLst>
+                                        </p:cTn>
+                                        <p:tgtEl>
+                                          <p:spTgt spid="3">
+                                            <p:txEl>
+                                              <p:pRg st="2" end="2"/>
+                                            </p:txEl>
+                                          </p:spTgt>
+                                        </p:tgtEl>
+                                        <p:attrNameLst>
+                                          <p:attrName>style.visibility</p:attrName>
+                                        </p:attrNameLst>
+                                      </p:cBhvr>
+                                      <p:to>
+                                        <p:strVal val="visible"/>
+                                      </p:to>
+                                    </p:set>
+                                  </p:childTnLst>
+                                </p:cTn>
+                              </p:par>
+                            </p:childTnLst>
+                          </p:cTn>
+                        </p:par>
+                      </p:childTnLst>
+                    </p:cTn>
+                  </p:par>
+                  <p:par>
+                    <p:cTn id="11" fill="hold">
+                      <p:stCondLst>
+                        <p:cond delay="indefinite"/>
+                      </p:stCondLst>
+                      <p:childTnLst>
+                        <p:par>
+                          <p:cTn id="12" fill="hold">
+                            <p:stCondLst>
+                              <p:cond delay="0"/>
+                            </p:stCondLst>
+                            <p:childTnLst>
+                              <p:par>
+                                <p:cTn id="13" presetID="1" presetClass="entr" presetSubtype="0" fill="hold" nodeType="clickEffect">
+                                  <p:stCondLst>
+                                    <p:cond delay="0"/>
+                                  </p:stCondLst>
+                                  <p:childTnLst>
+                                    <p:set>
+                                      <p:cBhvr>
+                                        <p:cTn id="14" dur="1" fill="hold">
+                                          <p:stCondLst>
+                                            <p:cond delay="0"/>
+                                          </p:stCondLst>
+                                        </p:cTn>
+                                        <p:tgtEl>
+                                          <p:spTgt spid="3">
+                                            <p:txEl>
+                                              <p:pRg st="3" end="3"/>
+                                            </p:txEl>
+                                          </p:spTgt>
+                                        </p:tgtEl>
+                                        <p:attrNameLst>
+                                          <p:attrName>style.visibility</p:attrName>
+                                        </p:attrNameLst>
+                                      </p:cBhvr>
+                                      <p:to>
+                                        <p:strVal val="visible"/>
+                                      </p:to>
+                                    </p:set>
+                                  </p:childTnLst>
+                                </p:cTn>
+                              </p:par>
+                            </p:childTnLst>
+                          </p:cTn>
+                        </p:par>
+                      </p:childTnLst>
+                    </p:cTn>
+                  </p:par>
+                </p:childTnLst>
+              </p:cTn>
+              <p:prevCondLst>
+                <p:cond evt="onPrev" delay="0">
+                  <p:tgtEl>
+                    <p:sldTgt/>
+                  </p:tgtEl>
+                </p:cond>
+              </p:prevCondLst>
+              <p:nextCondLst>
+                <p:cond evt="onNext" delay="0">
+                  <p:tgtEl>
+                    <p:sldTgt/>
+                  </p:tgtEl>
+                </p:cond>
+              </p:nextCondLst>
+            </p:seq>
+          </p:childTnLst>
+        </p:cTn>
       </p:par>
     </p:tnLst>
   </p:timing>
@@ -4733,83 +5720,68 @@
         </p:nvSpPr>
         <p:spPr/>
         <p:txBody>
-          <a:bodyPr/>
-          <a:lstStyle/>
-          <a:p>
-            <a:r>
-              <a:rPr lang="en-US" dirty="0" smtClean="0"/>
-              <a:t>Regex in Python</a:t>
-            </a:r>
-            <a:endParaRPr lang="en-US" dirty="0"/>
-          </a:p>
-        </p:txBody>
-      </p:sp>
-      <p:sp>
-        <p:nvSpPr>
-          <p:cNvPr id="3" name="Content Placeholder 2"/>
-          <p:cNvSpPr>
-            <a:spLocks noGrp="1"/>
-          </p:cNvSpPr>
-          <p:nvPr>
-            <p:ph idx="1"/>
-          </p:nvPr>
-        </p:nvSpPr>
-        <p:spPr/>
-        <p:txBody>
           <a:bodyPr>
-            <a:normAutofit lnSpcReduction="10000"/>
+            <a:normAutofit fontScale="90000"/>
           </a:bodyPr>
           <a:lstStyle/>
           <a:p>
             <a:r>
               <a:rPr lang="en-US" dirty="0" smtClean="0"/>
-              <a:t>`re` module</a:t>
-            </a:r>
-          </a:p>
-          <a:p>
-            <a:r>
-              <a:rPr lang="en-US" dirty="0" smtClean="0"/>
-              <a:t>Match objects are the return value</a:t>
+              <a:t>What are regular expressions </a:t>
+            </a:r>
+            <a:r>
+              <a:rPr lang="en-US" i="1" dirty="0" smtClean="0"/>
+              <a:t>not </a:t>
+            </a:r>
+            <a:r>
+              <a:rPr lang="en-US" dirty="0" smtClean="0"/>
+              <a:t>useful for?</a:t>
+            </a:r>
+            <a:endParaRPr lang="en-US" dirty="0"/>
+          </a:p>
+        </p:txBody>
+      </p:sp>
+      <p:sp>
+        <p:nvSpPr>
+          <p:cNvPr id="3" name="Content Placeholder 2"/>
+          <p:cNvSpPr>
+            <a:spLocks noGrp="1"/>
+          </p:cNvSpPr>
+          <p:nvPr>
+            <p:ph idx="1"/>
+          </p:nvPr>
+        </p:nvSpPr>
+        <p:spPr/>
+        <p:txBody>
+          <a:bodyPr>
+            <a:normAutofit fontScale="92500" lnSpcReduction="10000"/>
+          </a:bodyPr>
+          <a:lstStyle/>
+          <a:p>
+            <a:r>
+              <a:rPr lang="en-US" dirty="0" smtClean="0"/>
+              <a:t>Prime number regex</a:t>
             </a:r>
           </a:p>
           <a:p>
             <a:pPr lvl="1"/>
             <a:r>
               <a:rPr lang="en-US" dirty="0" smtClean="0"/>
-              <a:t>In particular, groups() is very useful</a:t>
-            </a:r>
-          </a:p>
-          <a:p>
-            <a:r>
-              <a:rPr lang="en-US" dirty="0" smtClean="0"/>
-              <a:t>Flags like case insensitivity</a:t>
-            </a:r>
-          </a:p>
-          <a:p>
-            <a:r>
-              <a:rPr lang="en-US" dirty="0" smtClean="0"/>
-              <a:t>Replacement (mention `</a:t>
+              <a:t>Neat/gross abuse of </a:t>
             </a:r>
             <a:r>
               <a:rPr lang="en-US" dirty="0" err="1" smtClean="0"/>
-              <a:t>str.replace</a:t>
-            </a:r>
-            <a:r>
-              <a:rPr lang="en-US" dirty="0" smtClean="0"/>
-              <a:t>()`)</a:t>
-            </a:r>
-          </a:p>
-          <a:p>
-            <a:r>
-              <a:rPr lang="en-US" dirty="0" smtClean="0"/>
-              <a:t>Pre-compiled regex if you use one frequently</a:t>
-            </a:r>
-          </a:p>
-          <a:p>
-            <a:pPr lvl="1"/>
-            <a:r>
-              <a:rPr lang="en-US" dirty="0" smtClean="0"/>
-              <a:t>Show a timing test?</a:t>
+              <a:t>lookaround</a:t>
+            </a:r>
+            <a:r>
+              <a:rPr lang="en-US" dirty="0" smtClean="0"/>
+              <a:t>, but not efficient</a:t>
+            </a:r>
+          </a:p>
+          <a:p>
+            <a:r>
+              <a:rPr lang="en-US" dirty="0" smtClean="0"/>
+              <a:t>Parsing HTML*</a:t>
             </a:r>
           </a:p>
           <a:p>
@@ -4817,13 +5789,56 @@
           </a:p>
           <a:p>
             <a:endParaRPr lang="en-US" dirty="0" smtClean="0"/>
+          </a:p>
+          <a:p>
+            <a:endParaRPr lang="en-US" dirty="0"/>
+          </a:p>
+          <a:p>
+            <a:pPr marL="0" indent="0">
+              <a:buNone/>
+            </a:pPr>
+            <a:endParaRPr lang="en-US" sz="1500" dirty="0" smtClean="0"/>
+          </a:p>
+          <a:p>
+            <a:pPr marL="0" indent="0">
+              <a:buNone/>
+            </a:pPr>
+            <a:endParaRPr lang="en-US" sz="1500" dirty="0"/>
+          </a:p>
+          <a:p>
+            <a:pPr marL="0" indent="0">
+              <a:buNone/>
+            </a:pPr>
+            <a:r>
+              <a:rPr lang="en-US" sz="1500" dirty="0" smtClean="0"/>
+              <a:t>* </a:t>
+            </a:r>
+            <a:r>
+              <a:rPr lang="en-US" sz="1500" dirty="0" smtClean="0">
+                <a:hlinkClick r:id="rId3"/>
+              </a:rPr>
+              <a:t>https</a:t>
+            </a:r>
+            <a:r>
+              <a:rPr lang="en-US" sz="1500" dirty="0">
+                <a:hlinkClick r:id="rId3"/>
+              </a:rPr>
+              <a:t>://</a:t>
+            </a:r>
+            <a:r>
+              <a:rPr lang="en-US" sz="1500" dirty="0" smtClean="0">
+                <a:hlinkClick r:id="rId3"/>
+              </a:rPr>
+              <a:t>stackoverflow.com/questions/1732348/regex-match-open-tags-except-xhtml-self-contained-tags/1732454#1732454</a:t>
+            </a:r>
+            <a:endParaRPr lang="en-US" sz="1500" dirty="0" smtClean="0"/>
           </a:p>
         </p:txBody>
       </p:sp>
     </p:spTree>
     <p:extLst>
       <p:ext uri="{BB962C8B-B14F-4D97-AF65-F5344CB8AC3E}">
-        <p14:creationId xmlns:p14="http://schemas.microsoft.com/office/powerpoint/2010/main" val="966442407"/>
+        <p14:creationId xmlns:p14="http://schemas.microsoft.com/office/powerpoint/2010/main" val="1627161319"/>
       </p:ext>
     </p:extLst>
   </p:cSld>
@@ -5046,22 +6061,20 @@
         </p:nvSpPr>
         <p:spPr/>
         <p:txBody>
-          <a:bodyPr>
-            <a:normAutofit fontScale="90000"/>
-          </a:bodyPr>
+          <a:bodyPr/>
           <a:lstStyle/>
           <a:p>
             <a:r>
               <a:rPr lang="en-US" dirty="0" smtClean="0"/>
-              <a:t>What are regular expressions </a:t>
+              <a:t>Things I </a:t>
             </a:r>
             <a:r>
               <a:rPr lang="en-US" i="1" dirty="0" smtClean="0"/>
-              <a:t>not </a:t>
-            </a:r>
-            <a:r>
-              <a:rPr lang="en-US" dirty="0" smtClean="0"/>
-              <a:t>useful for?</a:t>
+              <a:t>didn’t</a:t>
+            </a:r>
+            <a:r>
+              <a:rPr lang="en-US" dirty="0" smtClean="0"/>
+              <a:t> mention…</a:t>
             </a:r>
             <a:endParaRPr lang="en-US" dirty="0"/>
           </a:p>
@@ -5079,95 +6092,48 @@
         </p:nvSpPr>
         <p:spPr/>
         <p:txBody>
-          <a:bodyPr>
-            <a:normAutofit lnSpcReduction="10000"/>
-          </a:bodyPr>
+          <a:bodyPr/>
           <a:lstStyle/>
           <a:p>
             <a:r>
-              <a:rPr lang="en-US" dirty="0" smtClean="0"/>
-              <a:t>Prime number </a:t>
-            </a:r>
-            <a:r>
-              <a:rPr lang="en-US" dirty="0" smtClean="0"/>
-              <a:t>regex (really gross/neat example of </a:t>
+              <a:rPr lang="en-US" dirty="0"/>
+              <a:t>A couple different flavors with differences</a:t>
+            </a:r>
+          </a:p>
+          <a:p>
+            <a:pPr lvl="1"/>
+            <a:r>
+              <a:rPr lang="en-US" dirty="0"/>
+              <a:t>i.e. POSIX has [:alpha:] and [:blank:], vim uses \a and </a:t>
+            </a:r>
+            <a:r>
+              <a:rPr lang="en-US" dirty="0" smtClean="0"/>
+              <a:t>\s for the same</a:t>
+            </a:r>
+          </a:p>
+          <a:p>
+            <a:r>
+              <a:rPr lang="en-US" dirty="0" smtClean="0"/>
+              <a:t>Different implementations (e.g. \1 vs $1 for </a:t>
             </a:r>
             <a:r>
               <a:rPr lang="en-US" dirty="0" err="1" smtClean="0"/>
-              <a:t>lookahead</a:t>
+              <a:t>backreferences</a:t>
             </a:r>
             <a:r>
               <a:rPr lang="en-US" dirty="0" smtClean="0"/>
               <a:t>)</a:t>
             </a:r>
-            <a:endParaRPr lang="en-US" dirty="0" smtClean="0"/>
-          </a:p>
-          <a:p>
-            <a:r>
-              <a:rPr lang="en-US" dirty="0" smtClean="0"/>
-              <a:t>Parsing HTML</a:t>
-            </a:r>
-            <a:r>
-              <a:rPr lang="en-US" dirty="0" smtClean="0"/>
-              <a:t>*</a:t>
-            </a:r>
-            <a:endParaRPr lang="en-US" dirty="0" smtClean="0"/>
-          </a:p>
-          <a:p>
-            <a:endParaRPr lang="en-US" dirty="0" smtClean="0"/>
-          </a:p>
-          <a:p>
-            <a:endParaRPr lang="en-US" dirty="0" smtClean="0"/>
           </a:p>
           <a:p>
             <a:endParaRPr lang="en-US" dirty="0"/>
-          </a:p>
-          <a:p>
-            <a:pPr marL="0" indent="0">
-              <a:buNone/>
-            </a:pPr>
-            <a:endParaRPr lang="en-US" sz="1500" dirty="0" smtClean="0"/>
-          </a:p>
-          <a:p>
-            <a:pPr marL="0" indent="0">
-              <a:buNone/>
-            </a:pPr>
-            <a:endParaRPr lang="en-US" sz="1500" dirty="0"/>
-          </a:p>
-          <a:p>
-            <a:pPr marL="0" indent="0">
-              <a:buNone/>
-            </a:pPr>
-            <a:r>
-              <a:rPr lang="en-US" sz="1500" dirty="0" smtClean="0"/>
-              <a:t>* </a:t>
-            </a:r>
-            <a:r>
-              <a:rPr lang="en-US" sz="1500" dirty="0" smtClean="0">
-                <a:hlinkClick r:id="rId3"/>
-              </a:rPr>
-              <a:t>https</a:t>
-            </a:r>
-            <a:r>
-              <a:rPr lang="en-US" sz="1500" dirty="0">
-                <a:hlinkClick r:id="rId3"/>
-              </a:rPr>
-              <a:t>://</a:t>
-            </a:r>
-            <a:r>
-              <a:rPr lang="en-US" sz="1500" dirty="0" smtClean="0">
-                <a:hlinkClick r:id="rId3"/>
-              </a:rPr>
-              <a:t>stackoverflow.com/questions/1732348/regex-match-open-tags-except-xhtml-self-contained-tags/1732454#1732454</a:t>
-            </a:r>
-            <a:endParaRPr lang="en-US" sz="1500" dirty="0" smtClean="0"/>
           </a:p>
         </p:txBody>
       </p:sp>
     </p:spTree>
     <p:extLst>
       <p:ext uri="{BB962C8B-B14F-4D97-AF65-F5344CB8AC3E}">
-        <p14:creationId xmlns:p14="http://schemas.microsoft.com/office/powerpoint/2010/main" val="1627161319"/>
+        <p14:creationId xmlns:p14="http://schemas.microsoft.com/office/powerpoint/2010/main" val="3192961759"/>
       </p:ext>
     </p:extLst>
   </p:cSld>
@@ -5217,18 +6183,17 @@
           <a:lstStyle/>
           <a:p>
             <a:r>
-              <a:rPr lang="en-US" dirty="0" smtClean="0"/>
+              <a:rPr lang="en-US" dirty="0"/>
               <a:t>Things I </a:t>
             </a:r>
             <a:r>
-              <a:rPr lang="en-US" i="1" dirty="0" smtClean="0"/>
+              <a:rPr lang="en-US" i="1" dirty="0"/>
               <a:t>didn’t</a:t>
             </a:r>
             <a:r>
-              <a:rPr lang="en-US" dirty="0" smtClean="0"/>
+              <a:rPr lang="en-US" dirty="0"/>
               <a:t> mention…</a:t>
             </a:r>
-            <a:endParaRPr lang="en-US" dirty="0"/>
           </a:p>
         </p:txBody>
       </p:sp>
@@ -5242,29 +6207,63 @@
             <p:ph idx="1"/>
           </p:nvPr>
         </p:nvSpPr>
-        <p:spPr/>
-        <p:txBody>
-          <a:bodyPr/>
+        <p:spPr>
+          <a:xfrm>
+            <a:off x="446314" y="2049270"/>
+            <a:ext cx="8229600" cy="4076893"/>
+          </a:xfrm>
+        </p:spPr>
+        <p:txBody>
+          <a:bodyPr>
+            <a:normAutofit/>
+          </a:bodyPr>
           <a:lstStyle/>
           <a:p>
             <a:r>
+              <a:rPr lang="en-US" dirty="0" smtClean="0"/>
+              <a:t>Extensions give additional tools like </a:t>
+            </a:r>
+            <a:r>
+              <a:rPr lang="en-US" dirty="0" err="1" smtClean="0"/>
+              <a:t>lookaround</a:t>
+            </a:r>
+            <a:r>
+              <a:rPr lang="en-US" dirty="0" smtClean="0"/>
+              <a:t>, but </a:t>
+            </a:r>
+            <a:r>
+              <a:rPr lang="en-US" u="sng" dirty="0" smtClean="0"/>
+              <a:t>these generally discard the regularity of the grammar</a:t>
+            </a:r>
+            <a:endParaRPr lang="en-US" dirty="0" smtClean="0"/>
+          </a:p>
+          <a:p>
+            <a:pPr lvl="1"/>
+            <a:r>
+              <a:rPr lang="en-US" dirty="0" smtClean="0"/>
+              <a:t>As a result, relying heavily on these can result in a much slower expression evaluation</a:t>
+            </a:r>
+          </a:p>
+          <a:p>
+            <a:r>
+              <a:rPr lang="en-US" dirty="0" smtClean="0"/>
+              <a:t>An example: /</a:t>
+            </a:r>
+            <a:r>
               <a:rPr lang="en-US" dirty="0"/>
-              <a:t>A couple different flavors with differences</a:t>
-            </a:r>
-          </a:p>
-          <a:p>
-            <a:pPr lvl="1"/>
-            <a:r>
-              <a:rPr lang="en-US" dirty="0"/>
-              <a:t>i.e. POSIX has [:alpha:] and [:blank:], vim uses \a and </a:t>
-            </a:r>
-            <a:r>
-              <a:rPr lang="en-US" dirty="0" smtClean="0"/>
-              <a:t>\</a:t>
-            </a:r>
-            <a:r>
-              <a:rPr lang="en-US" dirty="0"/>
-              <a:t>s</a:t>
+              <a:t>q(?!u</a:t>
+            </a:r>
+            <a:r>
+              <a:rPr lang="en-US" dirty="0" smtClean="0"/>
+              <a:t>)/ will match any ‘q’ not followed by a ‘u’ (a feature called </a:t>
+            </a:r>
+            <a:r>
+              <a:rPr lang="en-US" dirty="0" err="1" smtClean="0"/>
+              <a:t>lookahead</a:t>
+            </a:r>
+            <a:r>
+              <a:rPr lang="en-US" dirty="0" smtClean="0"/>
+              <a:t>)</a:t>
             </a:r>
           </a:p>
         </p:txBody>
@@ -5272,7 +6271,7 @@
     </p:spTree>
     <p:extLst>
       <p:ext uri="{BB962C8B-B14F-4D97-AF65-F5344CB8AC3E}">
-        <p14:creationId xmlns:p14="http://schemas.microsoft.com/office/powerpoint/2010/main" val="3192961759"/>
+        <p14:creationId xmlns:p14="http://schemas.microsoft.com/office/powerpoint/2010/main" val="1032991498"/>
       </p:ext>
     </p:extLst>
   </p:cSld>
@@ -5347,75 +6346,106 @@
           <a:lstStyle/>
           <a:p>
             <a:r>
-              <a:rPr lang="en-US" dirty="0">
+              <a:rPr lang="en-US" sz="2800" dirty="0">
                 <a:hlinkClick r:id="rId2"/>
               </a:rPr>
-              <a:t>http://www.regular-expressions.info</a:t>
-            </a:r>
-            <a:r>
-              <a:rPr lang="en-US" dirty="0" smtClean="0">
+              <a:t>http://regexr.com/</a:t>
+            </a:r>
+          </a:p>
+          <a:p>
+            <a:r>
+              <a:rPr lang="en-US" sz="2800" dirty="0">
+                <a:hlinkClick r:id="rId2"/>
+              </a:rPr>
+              <a:t>https://github.com/aloisdg/awesome-regex</a:t>
+            </a:r>
+          </a:p>
+          <a:p>
+            <a:r>
+              <a:rPr lang="en-US" sz="2800" dirty="0" smtClean="0">
+                <a:hlinkClick r:id="rId2"/>
+              </a:rPr>
+              <a:t>http</a:t>
+            </a:r>
+            <a:r>
+              <a:rPr lang="en-US" sz="2800" dirty="0">
+                <a:hlinkClick r:id="rId2"/>
+              </a:rPr>
+              <a:t>://www.regular-expressions.info</a:t>
+            </a:r>
+            <a:r>
+              <a:rPr lang="en-US" sz="2800" dirty="0" smtClean="0">
                 <a:hlinkClick r:id="rId2"/>
               </a:rPr>
               <a:t>/</a:t>
             </a:r>
-            <a:endParaRPr lang="en-US" dirty="0" smtClean="0"/>
-          </a:p>
-          <a:p>
-            <a:r>
-              <a:rPr lang="en-US" dirty="0">
+            <a:endParaRPr lang="en-US" sz="2800" dirty="0" smtClean="0"/>
+          </a:p>
+          <a:p>
+            <a:r>
+              <a:rPr lang="en-US" sz="2800" dirty="0">
                 <a:hlinkClick r:id="rId3"/>
               </a:rPr>
               <a:t>http://</a:t>
             </a:r>
             <a:r>
-              <a:rPr lang="en-US" dirty="0" smtClean="0">
+              <a:rPr lang="en-US" sz="2800" dirty="0" smtClean="0">
                 <a:hlinkClick r:id="rId3"/>
               </a:rPr>
               <a:t>www.zytrax.com/tech/web/regex.htm</a:t>
             </a:r>
             <a:r>
-              <a:rPr lang="en-US" dirty="0" smtClean="0"/>
+              <a:rPr lang="en-US" sz="2800" dirty="0" smtClean="0"/>
               <a:t> </a:t>
             </a:r>
-          </a:p>
-          <a:p>
-            <a:r>
-              <a:rPr lang="en-US" dirty="0">
+            <a:endParaRPr lang="en-US" sz="2800" dirty="0" smtClean="0">
+              <a:hlinkClick r:id="rId4"/>
+            </a:endParaRPr>
+          </a:p>
+          <a:p>
+            <a:r>
+              <a:rPr lang="en-US" sz="2800" dirty="0" smtClean="0">
                 <a:hlinkClick r:id="rId4"/>
               </a:rPr>
-              <a:t>https://www.gnu.org/software/gawk/manual</a:t>
-            </a:r>
-            <a:r>
-              <a:rPr lang="en-US" dirty="0" smtClean="0">
+              <a:t>https</a:t>
+            </a:r>
+            <a:r>
+              <a:rPr lang="en-US" sz="2800" dirty="0">
+                <a:hlinkClick r:id="rId4"/>
+              </a:rPr>
+              <a:t>://www.gnu.org/software/gawk/manual</a:t>
+            </a:r>
+            <a:r>
+              <a:rPr lang="en-US" sz="2800" dirty="0" smtClean="0">
                 <a:hlinkClick r:id="rId4"/>
               </a:rPr>
               <a:t>/</a:t>
             </a:r>
-            <a:endParaRPr lang="en-US" dirty="0" smtClean="0"/>
-          </a:p>
-          <a:p>
-            <a:r>
-              <a:rPr lang="en-US" dirty="0" smtClean="0">
+            <a:endParaRPr lang="en-US" sz="2800" dirty="0" smtClean="0"/>
+          </a:p>
+          <a:p>
+            <a:r>
+              <a:rPr lang="en-US" sz="2800" dirty="0" smtClean="0">
                 <a:hlinkClick r:id="rId5"/>
               </a:rPr>
               <a:t>https</a:t>
             </a:r>
             <a:r>
-              <a:rPr lang="en-US" dirty="0">
+              <a:rPr lang="en-US" sz="2800" dirty="0">
                 <a:hlinkClick r:id="rId5"/>
               </a:rPr>
               <a:t>://</a:t>
             </a:r>
             <a:r>
-              <a:rPr lang="en-US" dirty="0" smtClean="0">
+              <a:rPr lang="en-US" sz="2800" dirty="0" smtClean="0">
                 <a:hlinkClick r:id="rId5"/>
               </a:rPr>
               <a:t>docs.python.org/3/library/re.html</a:t>
             </a:r>
-            <a:endParaRPr lang="en-US" dirty="0" smtClean="0"/>
-          </a:p>
-          <a:p>
-            <a:endParaRPr lang="en-US" dirty="0" smtClean="0"/>
+            <a:endParaRPr lang="en-US" sz="2800" dirty="0" smtClean="0"/>
+          </a:p>
+          <a:p>
+            <a:endParaRPr lang="en-US" sz="2800" dirty="0" smtClean="0"/>
           </a:p>
         </p:txBody>
       </p:sp>
@@ -5497,7 +6527,7 @@
           <a:lstStyle/>
           <a:p>
             <a:r>
-              <a:rPr lang="en-US" dirty="0">
+              <a:rPr lang="en-US" sz="2800" dirty="0">
                 <a:hlinkClick r:id="rId2"/>
               </a:rPr>
               <a:t>https://swtch.com/~rsc/regexp/regexp1.html</a:t>
@@ -5505,30 +6535,30 @@
           </a:p>
           <a:p>
             <a:r>
-              <a:rPr lang="en-US" dirty="0" smtClean="0">
+              <a:rPr lang="en-US" sz="2800" dirty="0" smtClean="0">
                 <a:hlinkClick r:id="rId2"/>
               </a:rPr>
               <a:t>https</a:t>
             </a:r>
             <a:r>
-              <a:rPr lang="en-US" dirty="0">
+              <a:rPr lang="en-US" sz="2800" dirty="0">
                 <a:hlinkClick r:id="rId2"/>
               </a:rPr>
               <a:t>://www.gamedev.net/resources/_/</a:t>
             </a:r>
             <a:r>
-              <a:rPr lang="en-US" dirty="0" smtClean="0">
+              <a:rPr lang="en-US" sz="2800" dirty="0" smtClean="0">
                 <a:hlinkClick r:id="rId2"/>
               </a:rPr>
               <a:t>technical/general-programming/finite-state-machines-and-regular-expressions-r3176</a:t>
             </a:r>
             <a:r>
-              <a:rPr lang="en-US" dirty="0" smtClean="0"/>
+              <a:rPr lang="en-US" sz="2800" dirty="0" smtClean="0"/>
               <a:t> </a:t>
             </a:r>
           </a:p>
           <a:p>
-            <a:endParaRPr lang="en-US" dirty="0" smtClean="0"/>
+            <a:endParaRPr lang="en-US" sz="2800" dirty="0" smtClean="0"/>
           </a:p>
         </p:txBody>
       </p:sp>
@@ -6038,7 +7068,177 @@
   <p:timing>
     <p:tnLst>
       <p:par>
-        <p:cTn id="1" dur="indefinite" restart="never" nodeType="tmRoot"/>
+        <p:cTn id="1" dur="indefinite" restart="never" nodeType="tmRoot">
+          <p:childTnLst>
+            <p:seq concurrent="1" nextAc="seek">
+              <p:cTn id="2" dur="indefinite" nodeType="mainSeq">
+                <p:childTnLst>
+                  <p:par>
+                    <p:cTn id="3" fill="hold">
+                      <p:stCondLst>
+                        <p:cond delay="indefinite"/>
+                      </p:stCondLst>
+                      <p:childTnLst>
+                        <p:par>
+                          <p:cTn id="4" fill="hold">
+                            <p:stCondLst>
+                              <p:cond delay="0"/>
+                            </p:stCondLst>
+                            <p:childTnLst>
+                              <p:par>
+                                <p:cTn id="5" presetID="1" presetClass="entr" presetSubtype="0" fill="hold" nodeType="clickEffect">
+                                  <p:stCondLst>
+                                    <p:cond delay="0"/>
+                                  </p:stCondLst>
+                                  <p:childTnLst>
+                                    <p:set>
+                                      <p:cBhvr>
+                                        <p:cTn id="6" dur="1" fill="hold">
+                                          <p:stCondLst>
+                                            <p:cond delay="0"/>
+                                          </p:stCondLst>
+                                        </p:cTn>
+                                        <p:tgtEl>
+                                          <p:spTgt spid="3">
+                                            <p:txEl>
+                                              <p:pRg st="1" end="1"/>
+                                            </p:txEl>
+                                          </p:spTgt>
+                                        </p:tgtEl>
+                                        <p:attrNameLst>
+                                          <p:attrName>style.visibility</p:attrName>
+                                        </p:attrNameLst>
+                                      </p:cBhvr>
+                                      <p:to>
+                                        <p:strVal val="visible"/>
+                                      </p:to>
+                                    </p:set>
+                                  </p:childTnLst>
+                                </p:cTn>
+                              </p:par>
+                            </p:childTnLst>
+                          </p:cTn>
+                        </p:par>
+                      </p:childTnLst>
+                    </p:cTn>
+                  </p:par>
+                  <p:par>
+                    <p:cTn id="7" fill="hold">
+                      <p:stCondLst>
+                        <p:cond delay="indefinite"/>
+                      </p:stCondLst>
+                      <p:childTnLst>
+                        <p:par>
+                          <p:cTn id="8" fill="hold">
+                            <p:stCondLst>
+                              <p:cond delay="0"/>
+                            </p:stCondLst>
+                            <p:childTnLst>
+                              <p:par>
+                                <p:cTn id="9" presetID="1" presetClass="entr" presetSubtype="0" fill="hold" nodeType="clickEffect">
+                                  <p:stCondLst>
+                                    <p:cond delay="0"/>
+                                  </p:stCondLst>
+                                  <p:childTnLst>
+                                    <p:set>
+                                      <p:cBhvr>
+                                        <p:cTn id="10" dur="1" fill="hold">
+                                          <p:stCondLst>
+                                            <p:cond delay="0"/>
+                                          </p:stCondLst>
+                                        </p:cTn>
+                                        <p:tgtEl>
+                                          <p:spTgt spid="3">
+                                            <p:txEl>
+                                              <p:pRg st="2" end="2"/>
+                                            </p:txEl>
+                                          </p:spTgt>
+                                        </p:tgtEl>
+                                        <p:attrNameLst>
+                                          <p:attrName>style.visibility</p:attrName>
+                                        </p:attrNameLst>
+                                      </p:cBhvr>
+                                      <p:to>
+                                        <p:strVal val="visible"/>
+                                      </p:to>
+                                    </p:set>
+                                  </p:childTnLst>
+                                </p:cTn>
+                              </p:par>
+                            </p:childTnLst>
+                          </p:cTn>
+                        </p:par>
+                      </p:childTnLst>
+                    </p:cTn>
+                  </p:par>
+                  <p:par>
+                    <p:cTn id="11" fill="hold">
+                      <p:stCondLst>
+                        <p:cond delay="indefinite"/>
+                      </p:stCondLst>
+                      <p:childTnLst>
+                        <p:par>
+                          <p:cTn id="12" fill="hold">
+                            <p:stCondLst>
+                              <p:cond delay="0"/>
+                            </p:stCondLst>
+                            <p:childTnLst>
+                              <p:par>
+                                <p:cTn id="13" presetID="1" presetClass="entr" presetSubtype="0" fill="hold" nodeType="clickEffect">
+                                  <p:stCondLst>
+                                    <p:cond delay="0"/>
+                                  </p:stCondLst>
+                                  <p:childTnLst>
+                                    <p:set>
+                                      <p:cBhvr>
+                                        <p:cTn id="14" dur="1" fill="hold">
+                                          <p:stCondLst>
+                                            <p:cond delay="0"/>
+                                          </p:stCondLst>
+                                        </p:cTn>
+                                        <p:tgtEl>
+                                          <p:spTgt spid="3">
+                                            <p:txEl>
+                                              <p:pRg st="3" end="3"/>
+                                            </p:txEl>
+                                          </p:spTgt>
+                                        </p:tgtEl>
+                                        <p:attrNameLst>
+                                          <p:attrName>style.visibility</p:attrName>
+                                        </p:attrNameLst>
+                                      </p:cBhvr>
+                                      <p:to>
+                                        <p:strVal val="visible"/>
+                                      </p:to>
+                                    </p:set>
+                                  </p:childTnLst>
+                                </p:cTn>
+                              </p:par>
+                            </p:childTnLst>
+                          </p:cTn>
+                        </p:par>
+                      </p:childTnLst>
+                    </p:cTn>
+                  </p:par>
+                </p:childTnLst>
+              </p:cTn>
+              <p:prevCondLst>
+                <p:cond evt="onPrev" delay="0">
+                  <p:tgtEl>
+                    <p:sldTgt/>
+                  </p:tgtEl>
+                </p:cond>
+              </p:prevCondLst>
+              <p:nextCondLst>
+                <p:cond evt="onNext" delay="0">
+                  <p:tgtEl>
+                    <p:sldTgt/>
+                  </p:tgtEl>
+                </p:cond>
+              </p:nextCondLst>
+            </p:seq>
+          </p:childTnLst>
+        </p:cTn>
       </p:par>
     </p:tnLst>
   </p:timing>
@@ -6155,7 +7355,79 @@
   <p:timing>
     <p:tnLst>
       <p:par>
-        <p:cTn id="1" dur="indefinite" restart="never" nodeType="tmRoot"/>
+        <p:cTn id="1" dur="indefinite" restart="never" nodeType="tmRoot">
+          <p:childTnLst>
+            <p:seq concurrent="1" nextAc="seek">
+              <p:cTn id="2" dur="indefinite" nodeType="mainSeq">
+                <p:childTnLst>
+                  <p:par>
+                    <p:cTn id="3" fill="hold">
+                      <p:stCondLst>
+                        <p:cond delay="indefinite"/>
+                      </p:stCondLst>
+                      <p:childTnLst>
+                        <p:par>
+                          <p:cTn id="4" fill="hold">
+                            <p:stCondLst>
+                              <p:cond delay="0"/>
+                            </p:stCondLst>
+                            <p:childTnLst>
+                              <p:par>
+                                <p:cTn id="5" presetID="1" presetClass="entr" presetSubtype="0" fill="hold" nodeType="clickEffect">
+                                  <p:stCondLst>
+                                    <p:cond delay="0"/>
+                                  </p:stCondLst>
+                                  <p:childTnLst>
+                                    <p:set>
+                                      <p:cBhvr>
+                                        <p:cTn id="6" dur="1" fill="hold">
+                                          <p:stCondLst>
+                                            <p:cond delay="0"/>
+                                          </p:stCondLst>
+                                        </p:cTn>
+                                        <p:tgtEl>
+                                          <p:spTgt spid="3">
+                                            <p:txEl>
+                                              <p:pRg st="2" end="2"/>
+                                            </p:txEl>
+                                          </p:spTgt>
+                                        </p:tgtEl>
+                                        <p:attrNameLst>
+                                          <p:attrName>style.visibility</p:attrName>
+                                        </p:attrNameLst>
+                                      </p:cBhvr>
+                                      <p:to>
+                                        <p:strVal val="visible"/>
+                                      </p:to>
+                                    </p:set>
+                                  </p:childTnLst>
+                                </p:cTn>
+                              </p:par>
+                            </p:childTnLst>
+                          </p:cTn>
+                        </p:par>
+                      </p:childTnLst>
+                    </p:cTn>
+                  </p:par>
+                </p:childTnLst>
+              </p:cTn>
+              <p:prevCondLst>
+                <p:cond evt="onPrev" delay="0">
+                  <p:tgtEl>
+                    <p:sldTgt/>
+                  </p:tgtEl>
+                </p:cond>
+              </p:prevCondLst>
+              <p:nextCondLst>
+                <p:cond evt="onNext" delay="0">
+                  <p:tgtEl>
+                    <p:sldTgt/>
+                  </p:tgtEl>
+                </p:cond>
+              </p:nextCondLst>
+            </p:seq>
+          </p:childTnLst>
+        </p:cTn>
       </p:par>
     </p:tnLst>
   </p:timing>
@@ -6227,16 +7499,32 @@
           <a:p>
             <a:pPr lvl="1"/>
             <a:r>
-              <a:rPr lang="en-US" dirty="0" smtClean="0"/>
+              <a:rPr lang="en-US" dirty="0" smtClean="0">
+                <a:solidFill>
+                  <a:schemeClr val="tx2"/>
+                </a:solidFill>
+              </a:rPr>
               <a:t>/</a:t>
             </a:r>
             <a:r>
-              <a:rPr lang="en-US" dirty="0" err="1" smtClean="0"/>
+              <a:rPr lang="en-US" dirty="0" err="1" smtClean="0">
+                <a:solidFill>
+                  <a:schemeClr val="tx2"/>
+                </a:solidFill>
+              </a:rPr>
               <a:t>grey|gray</a:t>
             </a:r>
             <a:r>
-              <a:rPr lang="en-US" dirty="0" smtClean="0"/>
-              <a:t>/ defines the set containing the strings “grey” and “gray”</a:t>
+              <a:rPr lang="en-US" dirty="0" smtClean="0">
+                <a:solidFill>
+                  <a:schemeClr val="tx2"/>
+                </a:solidFill>
+              </a:rPr>
+              <a:t>/</a:t>
+            </a:r>
+            <a:r>
+              <a:rPr lang="en-US" dirty="0" smtClean="0"/>
+              <a:t> defines the set containing the strings “grey” and “gray”</a:t>
             </a:r>
           </a:p>
           <a:p>
@@ -6253,28 +7541,68 @@
           <a:p>
             <a:pPr lvl="1"/>
             <a:r>
-              <a:rPr lang="en-US" dirty="0"/>
+              <a:rPr lang="en-US" dirty="0">
+                <a:solidFill>
+                  <a:schemeClr val="tx2"/>
+                </a:solidFill>
+              </a:rPr>
               <a:t>/</a:t>
             </a:r>
             <a:r>
-              <a:rPr lang="en-US" dirty="0" smtClean="0"/>
+              <a:rPr lang="en-US" dirty="0" smtClean="0">
+                <a:solidFill>
+                  <a:schemeClr val="tx2"/>
+                </a:solidFill>
+              </a:rPr>
               <a:t>gr[</a:t>
             </a:r>
             <a:r>
-              <a:rPr lang="en-US" dirty="0" err="1" smtClean="0"/>
+              <a:rPr lang="en-US" dirty="0" err="1" smtClean="0">
+                <a:solidFill>
+                  <a:schemeClr val="tx2"/>
+                </a:solidFill>
+              </a:rPr>
               <a:t>ea</a:t>
             </a:r>
             <a:r>
-              <a:rPr lang="en-US" dirty="0" smtClean="0"/>
-              <a:t>]y/ and /gr(</a:t>
-            </a:r>
-            <a:r>
-              <a:rPr lang="en-US" dirty="0" err="1" smtClean="0"/>
+              <a:rPr lang="en-US" dirty="0" smtClean="0">
+                <a:solidFill>
+                  <a:schemeClr val="tx2"/>
+                </a:solidFill>
+              </a:rPr>
+              <a:t>]y/ </a:t>
+            </a:r>
+            <a:r>
+              <a:rPr lang="en-US" dirty="0" smtClean="0"/>
+              <a:t>and </a:t>
+            </a:r>
+            <a:r>
+              <a:rPr lang="en-US" dirty="0" smtClean="0">
+                <a:solidFill>
+                  <a:schemeClr val="tx2"/>
+                </a:solidFill>
+              </a:rPr>
+              <a:t>/gr(</a:t>
+            </a:r>
+            <a:r>
+              <a:rPr lang="en-US" dirty="0" err="1" smtClean="0">
+                <a:solidFill>
+                  <a:schemeClr val="tx2"/>
+                </a:solidFill>
+              </a:rPr>
               <a:t>e|a</a:t>
             </a:r>
             <a:r>
-              <a:rPr lang="en-US" dirty="0" smtClean="0"/>
-              <a:t>)y/ define the same set of strings!</a:t>
+              <a:rPr lang="en-US" dirty="0" smtClean="0">
+                <a:solidFill>
+                  <a:schemeClr val="tx2"/>
+                </a:solidFill>
+              </a:rPr>
+              <a:t>)y/ </a:t>
+            </a:r>
+            <a:r>
+              <a:rPr lang="en-US" dirty="0" smtClean="0"/>
+              <a:t>define the same set of strings!</a:t>
             </a:r>
             <a:endParaRPr lang="en-US" dirty="0"/>
           </a:p>
@@ -6297,7 +7625,159 @@
   <p:timing>
     <p:tnLst>
       <p:par>
-        <p:cTn id="1" dur="indefinite" restart="never" nodeType="tmRoot"/>
+        <p:cTn id="1" dur="indefinite" restart="never" nodeType="tmRoot">
+          <p:childTnLst>
+            <p:seq concurrent="1" nextAc="seek">
+              <p:cTn id="2" dur="indefinite" nodeType="mainSeq">
+                <p:childTnLst>
+                  <p:par>
+                    <p:cTn id="3" fill="hold">
+                      <p:stCondLst>
+                        <p:cond delay="indefinite"/>
+                      </p:stCondLst>
+                      <p:childTnLst>
+                        <p:par>
+                          <p:cTn id="4" fill="hold">
+                            <p:stCondLst>
+                              <p:cond delay="0"/>
+                            </p:stCondLst>
+                            <p:childTnLst>
+                              <p:par>
+                                <p:cTn id="5" presetID="1" presetClass="entr" presetSubtype="0" fill="hold" nodeType="clickEffect">
+                                  <p:stCondLst>
+                                    <p:cond delay="0"/>
+                                  </p:stCondLst>
+                                  <p:childTnLst>
+                                    <p:set>
+                                      <p:cBhvr>
+                                        <p:cTn id="6" dur="1" fill="hold">
+                                          <p:stCondLst>
+                                            <p:cond delay="0"/>
+                                          </p:stCondLst>
+                                        </p:cTn>
+                                        <p:tgtEl>
+                                          <p:spTgt spid="3">
+                                            <p:txEl>
+                                              <p:pRg st="1" end="1"/>
+                                            </p:txEl>
+                                          </p:spTgt>
+                                        </p:tgtEl>
+                                        <p:attrNameLst>
+                                          <p:attrName>style.visibility</p:attrName>
+                                        </p:attrNameLst>
+                                      </p:cBhvr>
+                                      <p:to>
+                                        <p:strVal val="visible"/>
+                                      </p:to>
+                                    </p:set>
+                                  </p:childTnLst>
+                                </p:cTn>
+                              </p:par>
+                            </p:childTnLst>
+                          </p:cTn>
+                        </p:par>
+                      </p:childTnLst>
+                    </p:cTn>
+                  </p:par>
+                  <p:par>
+                    <p:cTn id="7" fill="hold">
+                      <p:stCondLst>
+                        <p:cond delay="indefinite"/>
+                      </p:stCondLst>
+                      <p:childTnLst>
+                        <p:par>
+                          <p:cTn id="8" fill="hold">
+                            <p:stCondLst>
+                              <p:cond delay="0"/>
+                            </p:stCondLst>
+                            <p:childTnLst>
+                              <p:par>
+                                <p:cTn id="9" presetID="1" presetClass="entr" presetSubtype="0" fill="hold" nodeType="clickEffect">
+                                  <p:stCondLst>
+                                    <p:cond delay="0"/>
+                                  </p:stCondLst>
+                                  <p:childTnLst>
+                                    <p:set>
+                                      <p:cBhvr>
+                                        <p:cTn id="10" dur="1" fill="hold">
+                                          <p:stCondLst>
+                                            <p:cond delay="0"/>
+                                          </p:stCondLst>
+                                        </p:cTn>
+                                        <p:tgtEl>
+                                          <p:spTgt spid="3">
+                                            <p:txEl>
+                                              <p:pRg st="2" end="2"/>
+                                            </p:txEl>
+                                          </p:spTgt>
+                                        </p:tgtEl>
+                                        <p:attrNameLst>
+                                          <p:attrName>style.visibility</p:attrName>
+                                        </p:attrNameLst>
+                                      </p:cBhvr>
+                                      <p:to>
+                                        <p:strVal val="visible"/>
+                                      </p:to>
+                                    </p:set>
+                                  </p:childTnLst>
+                                </p:cTn>
+                              </p:par>
+                              <p:par>
+                                <p:cTn id="11" presetID="1" presetClass="entr" presetSubtype="0" fill="hold" nodeType="withEffect">
+                                  <p:stCondLst>
+                                    <p:cond delay="0"/>
+                                  </p:stCondLst>
+                                  <p:childTnLst>
+                                    <p:set>
+                                      <p:cBhvr>
+                                        <p:cTn id="12" dur="1" fill="hold">
+                                          <p:stCondLst>
+                                            <p:cond delay="0"/>
+                                          </p:stCondLst>
+                                        </p:cTn>
+                                        <p:tgtEl>
+                                          <p:spTgt spid="3">
+                                            <p:txEl>
+                                              <p:pRg st="3" end="3"/>
+                                            </p:txEl>
+                                          </p:spTgt>
+                                        </p:tgtEl>
+                                        <p:attrNameLst>
+                                          <p:attrName>style.visibility</p:attrName>
+                                        </p:attrNameLst>
+                                      </p:cBhvr>
+                                      <p:to>
+                                        <p:strVal val="visible"/>
+                                      </p:to>
+                                    </p:set>
+                                  </p:childTnLst>
+                                </p:cTn>
+                              </p:par>
+                            </p:childTnLst>
+                          </p:cTn>
+                        </p:par>
+                      </p:childTnLst>
+                    </p:cTn>
+                  </p:par>
+                </p:childTnLst>
+              </p:cTn>
+              <p:prevCondLst>
+                <p:cond evt="onPrev" delay="0">
+                  <p:tgtEl>
+                    <p:sldTgt/>
+                  </p:tgtEl>
+                </p:cond>
+              </p:prevCondLst>
+              <p:nextCondLst>
+                <p:cond evt="onNext" delay="0">
+                  <p:tgtEl>
+                    <p:sldTgt/>
+                  </p:tgtEl>
+                </p:cond>
+              </p:nextCondLst>
+            </p:seq>
+          </p:childTnLst>
+        </p:cTn>
       </p:par>
     </p:tnLst>
   </p:timing>
@@ -6362,7 +7842,7 @@
           <a:lstStyle/>
           <a:p>
             <a:r>
-              <a:rPr lang="en-US" dirty="0" err="1" smtClean="0"/>
+              <a:rPr lang="en-US" u="sng" dirty="0" err="1" smtClean="0"/>
               <a:t>Metacharacters</a:t>
             </a:r>
             <a:r>
@@ -6381,16 +7861,32 @@
           <a:p>
             <a:pPr lvl="1"/>
             <a:r>
-              <a:rPr lang="en-US" dirty="0" smtClean="0"/>
+              <a:rPr lang="en-US" dirty="0" smtClean="0">
+                <a:solidFill>
+                  <a:schemeClr val="tx2"/>
+                </a:solidFill>
+              </a:rPr>
               <a:t>/</a:t>
             </a:r>
             <a:r>
-              <a:rPr lang="en-US" dirty="0" err="1" smtClean="0"/>
+              <a:rPr lang="en-US" dirty="0" err="1" smtClean="0">
+                <a:solidFill>
+                  <a:schemeClr val="tx2"/>
+                </a:solidFill>
+              </a:rPr>
               <a:t>Galile</a:t>
             </a:r>
             <a:r>
-              <a:rPr lang="en-US" dirty="0" smtClean="0"/>
-              <a:t>./ matches “</a:t>
+              <a:rPr lang="en-US" dirty="0" smtClean="0">
+                <a:solidFill>
+                  <a:schemeClr val="tx2"/>
+                </a:solidFill>
+              </a:rPr>
+              <a:t>./ </a:t>
+            </a:r>
+            <a:r>
+              <a:rPr lang="en-US" dirty="0" smtClean="0"/>
+              <a:t>matches “</a:t>
             </a:r>
             <a:r>
               <a:rPr lang="en-US" i="1" dirty="0" smtClean="0"/>
@@ -6476,7 +7972,79 @@
   <p:timing>
     <p:tnLst>
       <p:par>
-        <p:cTn id="1" dur="indefinite" restart="never" nodeType="tmRoot"/>
+        <p:cTn id="1" dur="indefinite" restart="never" nodeType="tmRoot">
+          <p:childTnLst>
+            <p:seq concurrent="1" nextAc="seek">
+              <p:cTn id="2" dur="indefinite" nodeType="mainSeq">
+                <p:childTnLst>
+                  <p:par>
+                    <p:cTn id="3" fill="hold">
+                      <p:stCondLst>
+                        <p:cond delay="indefinite"/>
+                      </p:stCondLst>
+                      <p:childTnLst>
+                        <p:par>
+                          <p:cTn id="4" fill="hold">
+                            <p:stCondLst>
+                              <p:cond delay="0"/>
+                            </p:stCondLst>
+                            <p:childTnLst>
+                              <p:par>
+                                <p:cTn id="5" presetID="1" presetClass="entr" presetSubtype="0" fill="hold" nodeType="clickEffect">
+                                  <p:stCondLst>
+                                    <p:cond delay="0"/>
+                                  </p:stCondLst>
+                                  <p:childTnLst>
+                                    <p:set>
+                                      <p:cBhvr>
+                                        <p:cTn id="6" dur="1" fill="hold">
+                                          <p:stCondLst>
+                                            <p:cond delay="0"/>
+                                          </p:stCondLst>
+                                        </p:cTn>
+                                        <p:tgtEl>
+                                          <p:spTgt spid="3">
+                                            <p:txEl>
+                                              <p:pRg st="1" end="1"/>
+                                            </p:txEl>
+                                          </p:spTgt>
+                                        </p:tgtEl>
+                                        <p:attrNameLst>
+                                          <p:attrName>style.visibility</p:attrName>
+                                        </p:attrNameLst>
+                                      </p:cBhvr>
+                                      <p:to>
+                                        <p:strVal val="visible"/>
+                                      </p:to>
+                                    </p:set>
+                                  </p:childTnLst>
+                                </p:cTn>
+                              </p:par>
+                            </p:childTnLst>
+                          </p:cTn>
+                        </p:par>
+                      </p:childTnLst>
+                    </p:cTn>
+                  </p:par>
+                </p:childTnLst>
+              </p:cTn>
+              <p:prevCondLst>
+                <p:cond evt="onPrev" delay="0">
+                  <p:tgtEl>
+                    <p:sldTgt/>
+                  </p:tgtEl>
+                </p:cond>
+              </p:prevCondLst>
+              <p:nextCondLst>
+                <p:cond evt="onNext" delay="0">
+                  <p:tgtEl>
+                    <p:sldTgt/>
+                  </p:tgtEl>
+                </p:cond>
+              </p:nextCondLst>
+            </p:seq>
+          </p:childTnLst>
+        </p:cTn>
       </p:par>
     </p:tnLst>
   </p:timing>
@@ -6541,7 +8109,7 @@
           <a:lstStyle/>
           <a:p>
             <a:r>
-              <a:rPr lang="en-US" dirty="0" err="1" smtClean="0"/>
+              <a:rPr lang="en-US" u="sng" dirty="0" err="1" smtClean="0"/>
               <a:t>Metacharacters</a:t>
             </a:r>
             <a:r>
@@ -6560,16 +8128,32 @@
           <a:p>
             <a:pPr lvl="1"/>
             <a:r>
+              <a:rPr lang="en-US" dirty="0">
+                <a:solidFill>
+                  <a:schemeClr val="tx2"/>
+                </a:solidFill>
+              </a:rPr>
+              <a:t>/</a:t>
+            </a:r>
+            <a:r>
+              <a:rPr lang="en-US" dirty="0" err="1">
+                <a:solidFill>
+                  <a:schemeClr val="tx2"/>
+                </a:solidFill>
+              </a:rPr>
+              <a:t>Galile</a:t>
+            </a:r>
+            <a:r>
+              <a:rPr lang="en-US" dirty="0">
+                <a:solidFill>
+                  <a:schemeClr val="tx2"/>
+                </a:solidFill>
+              </a:rPr>
+              <a:t>.*/ </a:t>
+            </a:r>
+            <a:r>
               <a:rPr lang="en-US" dirty="0"/>
-              <a:t>/</a:t>
-            </a:r>
-            <a:r>
-              <a:rPr lang="en-US" dirty="0" err="1"/>
-              <a:t>Galile</a:t>
-            </a:r>
-            <a:r>
-              <a:rPr lang="en-US" dirty="0"/>
-              <a:t>.*/ matches </a:t>
+              <a:t>matches </a:t>
             </a:r>
             <a:r>
               <a:rPr lang="en-US" i="1" dirty="0"/>

</xml_diff>

<commit_message>
Clear up description of * metacharacter
</commit_message>
<xml_diff>
--- a/2017/computing_workgroup/regex/regular_expressions.pptx
+++ b/2017/computing_workgroup/regex/regular_expressions.pptx
@@ -2997,10 +2997,6 @@
               </a:rPr>
               <a:t>Jan 26, 2017</a:t>
             </a:r>
-            <a:endParaRPr lang="en-US" sz="1600" dirty="0" smtClean="0">
-              <a:latin typeface="Miriam" panose="020B0502050101010101" pitchFamily="34" charset="-79"/>
-              <a:cs typeface="Miriam" panose="020B0502050101010101" pitchFamily="34" charset="-79"/>
-            </a:endParaRPr>
           </a:p>
         </p:txBody>
       </p:sp>
@@ -8181,7 +8177,15 @@
             </a:r>
             <a:r>
               <a:rPr lang="en-US" u="sng" dirty="0"/>
-              <a:t>any number of repeats</a:t>
+              <a:t>any </a:t>
+            </a:r>
+            <a:r>
+              <a:rPr lang="en-US" u="sng" dirty="0" smtClean="0"/>
+              <a:t>number</a:t>
+            </a:r>
+            <a:r>
+              <a:rPr lang="en-US" dirty="0" smtClean="0"/>
+              <a:t> of the previous match.</a:t>
             </a:r>
             <a:endParaRPr lang="en-US" dirty="0"/>
           </a:p>

</xml_diff>